<commit_message>
increased precision by 10%
</commit_message>
<xml_diff>
--- a/Information Retrieval System.pptx
+++ b/Information Retrieval System.pptx
@@ -112,6 +112,11 @@
       </a:defRPr>
     </a:lvl9pPr>
   </p:defaultTextStyle>
+  <p:extLst>
+    <p:ext uri="{EFAFB233-063F-42B5-8137-9DF3F51BA10A}">
+      <p15:sldGuideLst xmlns:p15="http://schemas.microsoft.com/office/powerpoint/2012/main"/>
+    </p:ext>
+  </p:extLst>
 </p:presentation>
 </file>
 
@@ -4651,26 +4656,6 @@
         </dgm:presLayoutVars>
       </dgm:prSet>
       <dgm:spPr/>
-    </dgm:pt>
-    <dgm:pt modelId="{2A2D0A1F-DF5B-4D62-8359-75FED3464955}" type="pres">
-      <dgm:prSet presAssocID="{9D2A9343-514F-42AD-8709-9CF866F8BCB7}" presName="hierRoot1" presStyleCnt="0"/>
-      <dgm:spPr/>
-    </dgm:pt>
-    <dgm:pt modelId="{67DE11BD-B662-4088-8777-35F65D0117A2}" type="pres">
-      <dgm:prSet presAssocID="{9D2A9343-514F-42AD-8709-9CF866F8BCB7}" presName="composite" presStyleCnt="0"/>
-      <dgm:spPr/>
-    </dgm:pt>
-    <dgm:pt modelId="{E9198AC2-9187-42A7-8316-2334E731B4D9}" type="pres">
-      <dgm:prSet presAssocID="{9D2A9343-514F-42AD-8709-9CF866F8BCB7}" presName="background" presStyleLbl="node0" presStyleIdx="0" presStyleCnt="1"/>
-      <dgm:spPr/>
-    </dgm:pt>
-    <dgm:pt modelId="{1BED93CD-BA7B-4499-826C-20AE6140A068}" type="pres">
-      <dgm:prSet presAssocID="{9D2A9343-514F-42AD-8709-9CF866F8BCB7}" presName="text" presStyleLbl="fgAcc0" presStyleIdx="0" presStyleCnt="1">
-        <dgm:presLayoutVars>
-          <dgm:chPref val="3"/>
-        </dgm:presLayoutVars>
-      </dgm:prSet>
-      <dgm:spPr/>
       <dgm:t>
         <a:bodyPr/>
         <a:lstStyle/>
@@ -4679,84 +4664,20 @@
         </a:p>
       </dgm:t>
     </dgm:pt>
-    <dgm:pt modelId="{106D85AC-B89C-441A-A093-C690B8A40C10}" type="pres">
-      <dgm:prSet presAssocID="{9D2A9343-514F-42AD-8709-9CF866F8BCB7}" presName="hierChild2" presStyleCnt="0"/>
-      <dgm:spPr/>
-    </dgm:pt>
-    <dgm:pt modelId="{C18B3AE3-C56B-4C46-B2FE-8FC0FF516083}" type="pres">
-      <dgm:prSet presAssocID="{2943FB02-01BF-4826-82C4-C47541C199F8}" presName="Name10" presStyleLbl="parChTrans1D2" presStyleIdx="0" presStyleCnt="3"/>
-      <dgm:spPr/>
-    </dgm:pt>
-    <dgm:pt modelId="{DE6675B3-14DB-4FEE-9B01-0C9CD90D5550}" type="pres">
-      <dgm:prSet presAssocID="{09A54D86-7716-42F8-9270-26C5A7FB1AB5}" presName="hierRoot2" presStyleCnt="0"/>
-      <dgm:spPr/>
-    </dgm:pt>
-    <dgm:pt modelId="{1C1140BA-586B-4D14-B29D-0094D68507D5}" type="pres">
-      <dgm:prSet presAssocID="{09A54D86-7716-42F8-9270-26C5A7FB1AB5}" presName="composite2" presStyleCnt="0"/>
-      <dgm:spPr/>
-    </dgm:pt>
-    <dgm:pt modelId="{0FAC0412-8017-4535-AC2C-8A81766BC88D}" type="pres">
-      <dgm:prSet presAssocID="{09A54D86-7716-42F8-9270-26C5A7FB1AB5}" presName="background2" presStyleLbl="node2" presStyleIdx="0" presStyleCnt="3"/>
-      <dgm:spPr/>
-    </dgm:pt>
-    <dgm:pt modelId="{6E6EC764-966F-4CBB-8AD4-11EFBFEC79FB}" type="pres">
-      <dgm:prSet presAssocID="{09A54D86-7716-42F8-9270-26C5A7FB1AB5}" presName="text2" presStyleLbl="fgAcc2" presStyleIdx="0" presStyleCnt="3">
-        <dgm:presLayoutVars>
-          <dgm:chPref val="3"/>
-        </dgm:presLayoutVars>
-      </dgm:prSet>
-      <dgm:spPr/>
-    </dgm:pt>
-    <dgm:pt modelId="{6E2EFEBF-C1AB-468A-B69E-A9A276A22E79}" type="pres">
-      <dgm:prSet presAssocID="{09A54D86-7716-42F8-9270-26C5A7FB1AB5}" presName="hierChild3" presStyleCnt="0"/>
-      <dgm:spPr/>
-    </dgm:pt>
-    <dgm:pt modelId="{9D46FDFC-20E4-417D-9CF1-5E98325195CA}" type="pres">
-      <dgm:prSet presAssocID="{7C659F5E-D353-4CF5-B948-914073F6DCF2}" presName="Name17" presStyleLbl="parChTrans1D3" presStyleIdx="0" presStyleCnt="8"/>
-      <dgm:spPr/>
-    </dgm:pt>
-    <dgm:pt modelId="{DB50B143-1F51-4322-85D4-EA3F72BDEACF}" type="pres">
-      <dgm:prSet presAssocID="{54C6BB90-3D9C-4A89-9930-42026D0D5674}" presName="hierRoot3" presStyleCnt="0"/>
-      <dgm:spPr/>
-    </dgm:pt>
-    <dgm:pt modelId="{4305F2D6-890D-46F7-80AD-190B976259D5}" type="pres">
-      <dgm:prSet presAssocID="{54C6BB90-3D9C-4A89-9930-42026D0D5674}" presName="composite3" presStyleCnt="0"/>
-      <dgm:spPr/>
-    </dgm:pt>
-    <dgm:pt modelId="{540F10CB-3AD1-4872-8218-73A8FAB9770B}" type="pres">
-      <dgm:prSet presAssocID="{54C6BB90-3D9C-4A89-9930-42026D0D5674}" presName="background3" presStyleLbl="node3" presStyleIdx="0" presStyleCnt="8"/>
-      <dgm:spPr/>
-    </dgm:pt>
-    <dgm:pt modelId="{139687CB-FA19-419B-A506-F4C782B93EE8}" type="pres">
-      <dgm:prSet presAssocID="{54C6BB90-3D9C-4A89-9930-42026D0D5674}" presName="text3" presStyleLbl="fgAcc3" presStyleIdx="0" presStyleCnt="8">
-        <dgm:presLayoutVars>
-          <dgm:chPref val="3"/>
-        </dgm:presLayoutVars>
-      </dgm:prSet>
-      <dgm:spPr/>
-    </dgm:pt>
-    <dgm:pt modelId="{06E8A232-451F-48BC-B493-E9078323718E}" type="pres">
-      <dgm:prSet presAssocID="{54C6BB90-3D9C-4A89-9930-42026D0D5674}" presName="hierChild4" presStyleCnt="0"/>
-      <dgm:spPr/>
-    </dgm:pt>
-    <dgm:pt modelId="{251684E0-5257-4EAB-92E2-A7CDFF9667C4}" type="pres">
-      <dgm:prSet presAssocID="{1031EEA1-B52A-44C7-A9DC-2B9C5AD68E07}" presName="Name23" presStyleLbl="parChTrans1D4" presStyleIdx="0" presStyleCnt="9"/>
-      <dgm:spPr/>
-    </dgm:pt>
-    <dgm:pt modelId="{5AA945E0-F531-4BF1-B61A-D3CFC51D4A37}" type="pres">
-      <dgm:prSet presAssocID="{89E670CB-FC26-442F-9EC0-7897B9C461CA}" presName="hierRoot4" presStyleCnt="0"/>
-      <dgm:spPr/>
-    </dgm:pt>
-    <dgm:pt modelId="{3967B028-FCE6-4F7C-AA8D-F0F404414757}" type="pres">
-      <dgm:prSet presAssocID="{89E670CB-FC26-442F-9EC0-7897B9C461CA}" presName="composite4" presStyleCnt="0"/>
-      <dgm:spPr/>
-    </dgm:pt>
-    <dgm:pt modelId="{B63C81AE-0D7A-453A-B8C6-05A4735C5D13}" type="pres">
-      <dgm:prSet presAssocID="{89E670CB-FC26-442F-9EC0-7897B9C461CA}" presName="background4" presStyleLbl="node4" presStyleIdx="0" presStyleCnt="9"/>
-      <dgm:spPr/>
-    </dgm:pt>
-    <dgm:pt modelId="{4E14D5CA-2CCD-4705-BE9B-2DADBEB928AB}" type="pres">
-      <dgm:prSet presAssocID="{89E670CB-FC26-442F-9EC0-7897B9C461CA}" presName="text4" presStyleLbl="fgAcc4" presStyleIdx="0" presStyleCnt="9">
+    <dgm:pt modelId="{2A2D0A1F-DF5B-4D62-8359-75FED3464955}" type="pres">
+      <dgm:prSet presAssocID="{9D2A9343-514F-42AD-8709-9CF866F8BCB7}" presName="hierRoot1" presStyleCnt="0"/>
+      <dgm:spPr/>
+    </dgm:pt>
+    <dgm:pt modelId="{67DE11BD-B662-4088-8777-35F65D0117A2}" type="pres">
+      <dgm:prSet presAssocID="{9D2A9343-514F-42AD-8709-9CF866F8BCB7}" presName="composite" presStyleCnt="0"/>
+      <dgm:spPr/>
+    </dgm:pt>
+    <dgm:pt modelId="{E9198AC2-9187-42A7-8316-2334E731B4D9}" type="pres">
+      <dgm:prSet presAssocID="{9D2A9343-514F-42AD-8709-9CF866F8BCB7}" presName="background" presStyleLbl="node0" presStyleIdx="0" presStyleCnt="1"/>
+      <dgm:spPr/>
+    </dgm:pt>
+    <dgm:pt modelId="{1BED93CD-BA7B-4499-826C-20AE6140A068}" type="pres">
+      <dgm:prSet presAssocID="{9D2A9343-514F-42AD-8709-9CF866F8BCB7}" presName="text" presStyleLbl="fgAcc0" presStyleIdx="0" presStyleCnt="1">
         <dgm:presLayoutVars>
           <dgm:chPref val="3"/>
         </dgm:presLayoutVars>
@@ -4770,116 +4691,12 @@
         </a:p>
       </dgm:t>
     </dgm:pt>
-    <dgm:pt modelId="{E3A3112A-1A93-4C44-9F9F-DC9C7F8D38BF}" type="pres">
-      <dgm:prSet presAssocID="{89E670CB-FC26-442F-9EC0-7897B9C461CA}" presName="hierChild5" presStyleCnt="0"/>
-      <dgm:spPr/>
-    </dgm:pt>
-    <dgm:pt modelId="{E98A6A60-0C29-4EEF-8400-0A7B65646E0C}" type="pres">
-      <dgm:prSet presAssocID="{C5A8DAA0-4B18-4426-8C7F-462FA4648194}" presName="Name23" presStyleLbl="parChTrans1D4" presStyleIdx="1" presStyleCnt="9"/>
-      <dgm:spPr/>
-    </dgm:pt>
-    <dgm:pt modelId="{D03F3C9A-67EC-42A0-9148-5534224A9B91}" type="pres">
-      <dgm:prSet presAssocID="{18BBD30F-9172-4E7D-BCD3-A823A8A46FAB}" presName="hierRoot4" presStyleCnt="0"/>
-      <dgm:spPr/>
-    </dgm:pt>
-    <dgm:pt modelId="{6EE4C178-B499-4FE9-A36F-9A4196FC7145}" type="pres">
-      <dgm:prSet presAssocID="{18BBD30F-9172-4E7D-BCD3-A823A8A46FAB}" presName="composite4" presStyleCnt="0"/>
-      <dgm:spPr/>
-    </dgm:pt>
-    <dgm:pt modelId="{EB40EDAB-DFC2-4049-A491-FD26BF6A68A0}" type="pres">
-      <dgm:prSet presAssocID="{18BBD30F-9172-4E7D-BCD3-A823A8A46FAB}" presName="background4" presStyleLbl="node4" presStyleIdx="1" presStyleCnt="9"/>
-      <dgm:spPr/>
-    </dgm:pt>
-    <dgm:pt modelId="{E655C419-8C5B-41BD-B382-ADDB1BF775E2}" type="pres">
-      <dgm:prSet presAssocID="{18BBD30F-9172-4E7D-BCD3-A823A8A46FAB}" presName="text4" presStyleLbl="fgAcc4" presStyleIdx="1" presStyleCnt="9">
-        <dgm:presLayoutVars>
-          <dgm:chPref val="3"/>
-        </dgm:presLayoutVars>
-      </dgm:prSet>
-      <dgm:spPr/>
-    </dgm:pt>
-    <dgm:pt modelId="{5A748A01-C71C-4476-AE89-9ADA5DC3160E}" type="pres">
-      <dgm:prSet presAssocID="{18BBD30F-9172-4E7D-BCD3-A823A8A46FAB}" presName="hierChild5" presStyleCnt="0"/>
-      <dgm:spPr/>
-    </dgm:pt>
-    <dgm:pt modelId="{170E11C5-0055-4400-9473-98D537C6E739}" type="pres">
-      <dgm:prSet presAssocID="{7ED6A327-88D1-46FF-A3E8-603F61FADD33}" presName="Name17" presStyleLbl="parChTrans1D3" presStyleIdx="1" presStyleCnt="8"/>
-      <dgm:spPr/>
-    </dgm:pt>
-    <dgm:pt modelId="{0BE96676-2729-4BD5-9DA3-A62322F6E494}" type="pres">
-      <dgm:prSet presAssocID="{0A62678E-4B8E-46FF-879A-8D0F44F69EE8}" presName="hierRoot3" presStyleCnt="0"/>
-      <dgm:spPr/>
-    </dgm:pt>
-    <dgm:pt modelId="{02A5A050-3E1B-4641-A7A0-FBFB861DF75C}" type="pres">
-      <dgm:prSet presAssocID="{0A62678E-4B8E-46FF-879A-8D0F44F69EE8}" presName="composite3" presStyleCnt="0"/>
-      <dgm:spPr/>
-    </dgm:pt>
-    <dgm:pt modelId="{695A07D6-E589-4D78-AECF-ED4A3C5A6FBE}" type="pres">
-      <dgm:prSet presAssocID="{0A62678E-4B8E-46FF-879A-8D0F44F69EE8}" presName="background3" presStyleLbl="node3" presStyleIdx="1" presStyleCnt="8"/>
-      <dgm:spPr/>
-    </dgm:pt>
-    <dgm:pt modelId="{D16EF9B5-7DF2-4D26-95CE-4462A6160C00}" type="pres">
-      <dgm:prSet presAssocID="{0A62678E-4B8E-46FF-879A-8D0F44F69EE8}" presName="text3" presStyleLbl="fgAcc3" presStyleIdx="1" presStyleCnt="8">
-        <dgm:presLayoutVars>
-          <dgm:chPref val="3"/>
-        </dgm:presLayoutVars>
-      </dgm:prSet>
-      <dgm:spPr/>
-    </dgm:pt>
-    <dgm:pt modelId="{CD588C5E-990A-450E-8A07-846B2C600417}" type="pres">
-      <dgm:prSet presAssocID="{0A62678E-4B8E-46FF-879A-8D0F44F69EE8}" presName="hierChild4" presStyleCnt="0"/>
-      <dgm:spPr/>
-    </dgm:pt>
-    <dgm:pt modelId="{A20323C0-B8E1-46AD-98C8-3C462D62EC3D}" type="pres">
-      <dgm:prSet presAssocID="{9584E3D9-C2FC-43BF-B271-EDFDC2B8A33B}" presName="Name23" presStyleLbl="parChTrans1D4" presStyleIdx="2" presStyleCnt="9"/>
-      <dgm:spPr/>
-    </dgm:pt>
-    <dgm:pt modelId="{99C883F0-3F2B-4532-873B-FC1702FD976B}" type="pres">
-      <dgm:prSet presAssocID="{14CFBF8C-E5C8-41C3-B10F-823F08537A30}" presName="hierRoot4" presStyleCnt="0"/>
-      <dgm:spPr/>
-    </dgm:pt>
-    <dgm:pt modelId="{ECE80B83-6D71-46B8-8AAD-0AA0EFBDEEF0}" type="pres">
-      <dgm:prSet presAssocID="{14CFBF8C-E5C8-41C3-B10F-823F08537A30}" presName="composite4" presStyleCnt="0"/>
-      <dgm:spPr/>
-    </dgm:pt>
-    <dgm:pt modelId="{52325DA5-DD7E-462E-A9DC-2C2F16B1BA3C}" type="pres">
-      <dgm:prSet presAssocID="{14CFBF8C-E5C8-41C3-B10F-823F08537A30}" presName="background4" presStyleLbl="node4" presStyleIdx="2" presStyleCnt="9"/>
-      <dgm:spPr/>
-    </dgm:pt>
-    <dgm:pt modelId="{D141A3F7-7E44-4D07-A3E8-0F0B66B87235}" type="pres">
-      <dgm:prSet presAssocID="{14CFBF8C-E5C8-41C3-B10F-823F08537A30}" presName="text4" presStyleLbl="fgAcc4" presStyleIdx="2" presStyleCnt="9">
-        <dgm:presLayoutVars>
-          <dgm:chPref val="3"/>
-        </dgm:presLayoutVars>
-      </dgm:prSet>
-      <dgm:spPr/>
-    </dgm:pt>
-    <dgm:pt modelId="{2BD5923D-F8E9-4F6D-BF43-B95D3C59904C}" type="pres">
-      <dgm:prSet presAssocID="{14CFBF8C-E5C8-41C3-B10F-823F08537A30}" presName="hierChild5" presStyleCnt="0"/>
-      <dgm:spPr/>
-    </dgm:pt>
-    <dgm:pt modelId="{F56E999E-66FD-4637-AD33-5AC8B79F1842}" type="pres">
-      <dgm:prSet presAssocID="{78BC4A45-6F56-4B87-AD3D-8766ED12A7E9}" presName="Name17" presStyleLbl="parChTrans1D3" presStyleIdx="2" presStyleCnt="8"/>
-      <dgm:spPr/>
-    </dgm:pt>
-    <dgm:pt modelId="{B6638D92-2FBA-4C12-A490-4C9FCAE716A5}" type="pres">
-      <dgm:prSet presAssocID="{2F0FB5DE-5A9D-4D3D-A583-7FA014441C51}" presName="hierRoot3" presStyleCnt="0"/>
-      <dgm:spPr/>
-    </dgm:pt>
-    <dgm:pt modelId="{6FD56B1B-E08A-4ADC-AC54-FD7C3C4FEF16}" type="pres">
-      <dgm:prSet presAssocID="{2F0FB5DE-5A9D-4D3D-A583-7FA014441C51}" presName="composite3" presStyleCnt="0"/>
-      <dgm:spPr/>
-    </dgm:pt>
-    <dgm:pt modelId="{D903AFF5-E5F6-4466-924A-0B5E49DA2031}" type="pres">
-      <dgm:prSet presAssocID="{2F0FB5DE-5A9D-4D3D-A583-7FA014441C51}" presName="background3" presStyleLbl="node3" presStyleIdx="2" presStyleCnt="8"/>
-      <dgm:spPr/>
-    </dgm:pt>
-    <dgm:pt modelId="{23EF96DB-4BC4-4BFF-A0F6-595B9165E4CE}" type="pres">
-      <dgm:prSet presAssocID="{2F0FB5DE-5A9D-4D3D-A583-7FA014441C51}" presName="text3" presStyleLbl="fgAcc3" presStyleIdx="2" presStyleCnt="8">
-        <dgm:presLayoutVars>
-          <dgm:chPref val="3"/>
-        </dgm:presLayoutVars>
-      </dgm:prSet>
+    <dgm:pt modelId="{106D85AC-B89C-441A-A093-C690B8A40C10}" type="pres">
+      <dgm:prSet presAssocID="{9D2A9343-514F-42AD-8709-9CF866F8BCB7}" presName="hierChild2" presStyleCnt="0"/>
+      <dgm:spPr/>
+    </dgm:pt>
+    <dgm:pt modelId="{C18B3AE3-C56B-4C46-B2FE-8FC0FF516083}" type="pres">
+      <dgm:prSet presAssocID="{2943FB02-01BF-4826-82C4-C47541C199F8}" presName="Name10" presStyleLbl="parChTrans1D2" presStyleIdx="0" presStyleCnt="3"/>
       <dgm:spPr/>
       <dgm:t>
         <a:bodyPr/>
@@ -4889,112 +4706,20 @@
         </a:p>
       </dgm:t>
     </dgm:pt>
-    <dgm:pt modelId="{F6DBD380-BAE3-4AE9-8336-45705DE240C3}" type="pres">
-      <dgm:prSet presAssocID="{2F0FB5DE-5A9D-4D3D-A583-7FA014441C51}" presName="hierChild4" presStyleCnt="0"/>
-      <dgm:spPr/>
-    </dgm:pt>
-    <dgm:pt modelId="{F9404CB4-28B5-4983-A516-3F7A94617B67}" type="pres">
-      <dgm:prSet presAssocID="{95EA9144-B8E2-463C-B4F4-77B55A351B27}" presName="Name23" presStyleLbl="parChTrans1D4" presStyleIdx="3" presStyleCnt="9"/>
-      <dgm:spPr/>
-    </dgm:pt>
-    <dgm:pt modelId="{1B725075-70F9-4A0C-AC8F-4DB3427A3707}" type="pres">
-      <dgm:prSet presAssocID="{A9C2D848-281E-42B3-84EF-C2D5CFE7CF11}" presName="hierRoot4" presStyleCnt="0"/>
-      <dgm:spPr/>
-    </dgm:pt>
-    <dgm:pt modelId="{BBECFC40-0CF1-46A5-91DB-AEE8B855E0FA}" type="pres">
-      <dgm:prSet presAssocID="{A9C2D848-281E-42B3-84EF-C2D5CFE7CF11}" presName="composite4" presStyleCnt="0"/>
-      <dgm:spPr/>
-    </dgm:pt>
-    <dgm:pt modelId="{4F97DA0F-CA2C-4DFC-94D7-D273FB7AF9D3}" type="pres">
-      <dgm:prSet presAssocID="{A9C2D848-281E-42B3-84EF-C2D5CFE7CF11}" presName="background4" presStyleLbl="node4" presStyleIdx="3" presStyleCnt="9"/>
-      <dgm:spPr/>
-    </dgm:pt>
-    <dgm:pt modelId="{1DA59ED9-F503-4A52-82DA-D69BBEAAF564}" type="pres">
-      <dgm:prSet presAssocID="{A9C2D848-281E-42B3-84EF-C2D5CFE7CF11}" presName="text4" presStyleLbl="fgAcc4" presStyleIdx="3" presStyleCnt="9">
-        <dgm:presLayoutVars>
-          <dgm:chPref val="3"/>
-        </dgm:presLayoutVars>
-      </dgm:prSet>
-      <dgm:spPr/>
-    </dgm:pt>
-    <dgm:pt modelId="{889553DA-DBD6-4F6E-AD63-8C2DBAF05D8D}" type="pres">
-      <dgm:prSet presAssocID="{A9C2D848-281E-42B3-84EF-C2D5CFE7CF11}" presName="hierChild5" presStyleCnt="0"/>
-      <dgm:spPr/>
-    </dgm:pt>
-    <dgm:pt modelId="{F402A8AC-4543-4936-9679-A33E5C50761A}" type="pres">
-      <dgm:prSet presAssocID="{5B4241F5-0257-4789-809D-0F69B968803A}" presName="Name23" presStyleLbl="parChTrans1D4" presStyleIdx="4" presStyleCnt="9"/>
-      <dgm:spPr/>
-    </dgm:pt>
-    <dgm:pt modelId="{75307070-9502-4B08-8140-4F05F4B2C2D5}" type="pres">
-      <dgm:prSet presAssocID="{FD61C736-F33D-4CBD-AEF7-A4086FCC0359}" presName="hierRoot4" presStyleCnt="0"/>
-      <dgm:spPr/>
-    </dgm:pt>
-    <dgm:pt modelId="{ADE0F9DF-9E8E-48B5-839D-0A0548D54374}" type="pres">
-      <dgm:prSet presAssocID="{FD61C736-F33D-4CBD-AEF7-A4086FCC0359}" presName="composite4" presStyleCnt="0"/>
-      <dgm:spPr/>
-    </dgm:pt>
-    <dgm:pt modelId="{ECE2A336-ECD9-4924-80DD-3628EF9943D5}" type="pres">
-      <dgm:prSet presAssocID="{FD61C736-F33D-4CBD-AEF7-A4086FCC0359}" presName="background4" presStyleLbl="node4" presStyleIdx="4" presStyleCnt="9"/>
-      <dgm:spPr/>
-    </dgm:pt>
-    <dgm:pt modelId="{A0AA38E3-68DF-4A84-9E54-694EC5B5A638}" type="pres">
-      <dgm:prSet presAssocID="{FD61C736-F33D-4CBD-AEF7-A4086FCC0359}" presName="text4" presStyleLbl="fgAcc4" presStyleIdx="4" presStyleCnt="9">
-        <dgm:presLayoutVars>
-          <dgm:chPref val="3"/>
-        </dgm:presLayoutVars>
-      </dgm:prSet>
-      <dgm:spPr/>
-    </dgm:pt>
-    <dgm:pt modelId="{56ECB6FA-F104-466A-97C9-3CCDE12C1719}" type="pres">
-      <dgm:prSet presAssocID="{FD61C736-F33D-4CBD-AEF7-A4086FCC0359}" presName="hierChild5" presStyleCnt="0"/>
-      <dgm:spPr/>
-    </dgm:pt>
-    <dgm:pt modelId="{F7BF62A1-678B-4CCF-AAF7-B49A244B354C}" type="pres">
-      <dgm:prSet presAssocID="{C40A0E85-1A5D-4901-B167-5B8066C24751}" presName="Name10" presStyleLbl="parChTrans1D2" presStyleIdx="1" presStyleCnt="3"/>
-      <dgm:spPr/>
-    </dgm:pt>
-    <dgm:pt modelId="{0C594343-283A-47AD-9201-696347826E59}" type="pres">
-      <dgm:prSet presAssocID="{8BC64FAF-A813-4AD4-8191-6615C237CB0B}" presName="hierRoot2" presStyleCnt="0"/>
-      <dgm:spPr/>
-    </dgm:pt>
-    <dgm:pt modelId="{61D72423-3781-4859-BA6D-A9C5C7253D66}" type="pres">
-      <dgm:prSet presAssocID="{8BC64FAF-A813-4AD4-8191-6615C237CB0B}" presName="composite2" presStyleCnt="0"/>
-      <dgm:spPr/>
-    </dgm:pt>
-    <dgm:pt modelId="{6EA619A8-7B85-4C52-BF8D-6C1E6FC32702}" type="pres">
-      <dgm:prSet presAssocID="{8BC64FAF-A813-4AD4-8191-6615C237CB0B}" presName="background2" presStyleLbl="node2" presStyleIdx="1" presStyleCnt="3"/>
-      <dgm:spPr/>
-    </dgm:pt>
-    <dgm:pt modelId="{CEEDCDF0-077E-4F45-98D0-D3D7D3E62473}" type="pres">
-      <dgm:prSet presAssocID="{8BC64FAF-A813-4AD4-8191-6615C237CB0B}" presName="text2" presStyleLbl="fgAcc2" presStyleIdx="1" presStyleCnt="3">
-        <dgm:presLayoutVars>
-          <dgm:chPref val="3"/>
-        </dgm:presLayoutVars>
-      </dgm:prSet>
-      <dgm:spPr/>
-    </dgm:pt>
-    <dgm:pt modelId="{B377FF55-92AC-4FFD-BAC1-79DB9A3AF273}" type="pres">
-      <dgm:prSet presAssocID="{8BC64FAF-A813-4AD4-8191-6615C237CB0B}" presName="hierChild3" presStyleCnt="0"/>
-      <dgm:spPr/>
-    </dgm:pt>
-    <dgm:pt modelId="{AAC1BB25-EDC3-49E7-8EE3-F3937B2DD4A6}" type="pres">
-      <dgm:prSet presAssocID="{882C303E-623C-4775-B440-F78631A171CF}" presName="Name17" presStyleLbl="parChTrans1D3" presStyleIdx="3" presStyleCnt="8"/>
-      <dgm:spPr/>
-    </dgm:pt>
-    <dgm:pt modelId="{B45D964E-3CB7-409E-AEDF-8D5D6E2BC3D9}" type="pres">
-      <dgm:prSet presAssocID="{01CE2920-4FF8-4F06-B54F-C866A23161AF}" presName="hierRoot3" presStyleCnt="0"/>
-      <dgm:spPr/>
-    </dgm:pt>
-    <dgm:pt modelId="{A31D2B6A-30AE-45EF-B94C-B2FABFD89412}" type="pres">
-      <dgm:prSet presAssocID="{01CE2920-4FF8-4F06-B54F-C866A23161AF}" presName="composite3" presStyleCnt="0"/>
-      <dgm:spPr/>
-    </dgm:pt>
-    <dgm:pt modelId="{5FAE5D1D-EB25-4037-809D-95AA0CC9973E}" type="pres">
-      <dgm:prSet presAssocID="{01CE2920-4FF8-4F06-B54F-C866A23161AF}" presName="background3" presStyleLbl="node3" presStyleIdx="3" presStyleCnt="8"/>
-      <dgm:spPr/>
-    </dgm:pt>
-    <dgm:pt modelId="{2BC45593-C227-45A5-81B8-5F15154DD736}" type="pres">
-      <dgm:prSet presAssocID="{01CE2920-4FF8-4F06-B54F-C866A23161AF}" presName="text3" presStyleLbl="fgAcc3" presStyleIdx="3" presStyleCnt="8">
+    <dgm:pt modelId="{DE6675B3-14DB-4FEE-9B01-0C9CD90D5550}" type="pres">
+      <dgm:prSet presAssocID="{09A54D86-7716-42F8-9270-26C5A7FB1AB5}" presName="hierRoot2" presStyleCnt="0"/>
+      <dgm:spPr/>
+    </dgm:pt>
+    <dgm:pt modelId="{1C1140BA-586B-4D14-B29D-0094D68507D5}" type="pres">
+      <dgm:prSet presAssocID="{09A54D86-7716-42F8-9270-26C5A7FB1AB5}" presName="composite2" presStyleCnt="0"/>
+      <dgm:spPr/>
+    </dgm:pt>
+    <dgm:pt modelId="{0FAC0412-8017-4535-AC2C-8A81766BC88D}" type="pres">
+      <dgm:prSet presAssocID="{09A54D86-7716-42F8-9270-26C5A7FB1AB5}" presName="background2" presStyleLbl="node2" presStyleIdx="0" presStyleCnt="3"/>
+      <dgm:spPr/>
+    </dgm:pt>
+    <dgm:pt modelId="{6E6EC764-966F-4CBB-8AD4-11EFBFEC79FB}" type="pres">
+      <dgm:prSet presAssocID="{09A54D86-7716-42F8-9270-26C5A7FB1AB5}" presName="text2" presStyleLbl="fgAcc2" presStyleIdx="0" presStyleCnt="3">
         <dgm:presLayoutVars>
           <dgm:chPref val="3"/>
         </dgm:presLayoutVars>
@@ -5008,32 +4733,12 @@
         </a:p>
       </dgm:t>
     </dgm:pt>
-    <dgm:pt modelId="{483F8853-739C-4EA6-AD9D-51D7E4108419}" type="pres">
-      <dgm:prSet presAssocID="{01CE2920-4FF8-4F06-B54F-C866A23161AF}" presName="hierChild4" presStyleCnt="0"/>
-      <dgm:spPr/>
-    </dgm:pt>
-    <dgm:pt modelId="{AB53B3F7-4ADE-4D73-B93A-EA9B9713E1BD}" type="pres">
-      <dgm:prSet presAssocID="{DE0F42CF-E108-4814-A7F2-EDC93A86437C}" presName="Name17" presStyleLbl="parChTrans1D3" presStyleIdx="4" presStyleCnt="8"/>
-      <dgm:spPr/>
-    </dgm:pt>
-    <dgm:pt modelId="{59F46CD4-0ACC-46A5-BC89-049DD9962F18}" type="pres">
-      <dgm:prSet presAssocID="{3CADED54-B4D3-4261-A1AD-541372B12D05}" presName="hierRoot3" presStyleCnt="0"/>
-      <dgm:spPr/>
-    </dgm:pt>
-    <dgm:pt modelId="{87721D3E-4C10-4E55-9F64-CA86EDBF6E7C}" type="pres">
-      <dgm:prSet presAssocID="{3CADED54-B4D3-4261-A1AD-541372B12D05}" presName="composite3" presStyleCnt="0"/>
-      <dgm:spPr/>
-    </dgm:pt>
-    <dgm:pt modelId="{9AD66726-A16D-4893-A1F0-B4A1BECC9424}" type="pres">
-      <dgm:prSet presAssocID="{3CADED54-B4D3-4261-A1AD-541372B12D05}" presName="background3" presStyleLbl="node3" presStyleIdx="4" presStyleCnt="8"/>
-      <dgm:spPr/>
-    </dgm:pt>
-    <dgm:pt modelId="{90BE0797-6E29-4F8F-AE1C-BBD0830C2A76}" type="pres">
-      <dgm:prSet presAssocID="{3CADED54-B4D3-4261-A1AD-541372B12D05}" presName="text3" presStyleLbl="fgAcc3" presStyleIdx="4" presStyleCnt="8">
-        <dgm:presLayoutVars>
-          <dgm:chPref val="3"/>
-        </dgm:presLayoutVars>
-      </dgm:prSet>
+    <dgm:pt modelId="{6E2EFEBF-C1AB-468A-B69E-A9A276A22E79}" type="pres">
+      <dgm:prSet presAssocID="{09A54D86-7716-42F8-9270-26C5A7FB1AB5}" presName="hierChild3" presStyleCnt="0"/>
+      <dgm:spPr/>
+    </dgm:pt>
+    <dgm:pt modelId="{9D46FDFC-20E4-417D-9CF1-5E98325195CA}" type="pres">
+      <dgm:prSet presAssocID="{7C659F5E-D353-4CF5-B948-914073F6DCF2}" presName="Name17" presStyleLbl="parChTrans1D3" presStyleIdx="0" presStyleCnt="8"/>
       <dgm:spPr/>
       <dgm:t>
         <a:bodyPr/>
@@ -5043,84 +4748,20 @@
         </a:p>
       </dgm:t>
     </dgm:pt>
-    <dgm:pt modelId="{40FDE411-75E1-47AC-B43D-32F33D637A5E}" type="pres">
-      <dgm:prSet presAssocID="{3CADED54-B4D3-4261-A1AD-541372B12D05}" presName="hierChild4" presStyleCnt="0"/>
-      <dgm:spPr/>
-    </dgm:pt>
-    <dgm:pt modelId="{E4C5F0FD-1D15-431E-A26A-4A8BBF1C5A2A}" type="pres">
-      <dgm:prSet presAssocID="{12C8207D-EC38-4E58-85E9-76B29A6DE692}" presName="Name23" presStyleLbl="parChTrans1D4" presStyleIdx="5" presStyleCnt="9"/>
-      <dgm:spPr/>
-    </dgm:pt>
-    <dgm:pt modelId="{90A2F293-5F20-4EBD-A792-BE9FF0F2EC7D}" type="pres">
-      <dgm:prSet presAssocID="{0512A5C5-BAFE-453C-A72D-17CF9942141F}" presName="hierRoot4" presStyleCnt="0"/>
-      <dgm:spPr/>
-    </dgm:pt>
-    <dgm:pt modelId="{88D51329-9F07-461F-9B7E-BC3AE56041B6}" type="pres">
-      <dgm:prSet presAssocID="{0512A5C5-BAFE-453C-A72D-17CF9942141F}" presName="composite4" presStyleCnt="0"/>
-      <dgm:spPr/>
-    </dgm:pt>
-    <dgm:pt modelId="{5B870DCB-F586-443B-ABCE-B577FA4C8F61}" type="pres">
-      <dgm:prSet presAssocID="{0512A5C5-BAFE-453C-A72D-17CF9942141F}" presName="background4" presStyleLbl="node4" presStyleIdx="5" presStyleCnt="9"/>
-      <dgm:spPr/>
-    </dgm:pt>
-    <dgm:pt modelId="{4E505D1B-0D9F-4C67-92E2-E88607025BC9}" type="pres">
-      <dgm:prSet presAssocID="{0512A5C5-BAFE-453C-A72D-17CF9942141F}" presName="text4" presStyleLbl="fgAcc4" presStyleIdx="5" presStyleCnt="9">
-        <dgm:presLayoutVars>
-          <dgm:chPref val="3"/>
-        </dgm:presLayoutVars>
-      </dgm:prSet>
-      <dgm:spPr/>
-    </dgm:pt>
-    <dgm:pt modelId="{CE40990E-0494-47F8-887D-F4CFAE870C2E}" type="pres">
-      <dgm:prSet presAssocID="{0512A5C5-BAFE-453C-A72D-17CF9942141F}" presName="hierChild5" presStyleCnt="0"/>
-      <dgm:spPr/>
-    </dgm:pt>
-    <dgm:pt modelId="{5496AA36-6C29-4402-87AE-3BA3F7F7FB10}" type="pres">
-      <dgm:prSet presAssocID="{B01C31C9-35B1-41F1-BCF9-106809662280}" presName="Name10" presStyleLbl="parChTrans1D2" presStyleIdx="2" presStyleCnt="3"/>
-      <dgm:spPr/>
-    </dgm:pt>
-    <dgm:pt modelId="{58841F15-3EB7-41D3-9DF7-7216900091F0}" type="pres">
-      <dgm:prSet presAssocID="{138477FA-333B-4AB0-980B-48446CB1EFD2}" presName="hierRoot2" presStyleCnt="0"/>
-      <dgm:spPr/>
-    </dgm:pt>
-    <dgm:pt modelId="{D92DC0EA-997F-46D2-A194-A91315686FA1}" type="pres">
-      <dgm:prSet presAssocID="{138477FA-333B-4AB0-980B-48446CB1EFD2}" presName="composite2" presStyleCnt="0"/>
-      <dgm:spPr/>
-    </dgm:pt>
-    <dgm:pt modelId="{989D2EA1-9439-4DA1-8943-DD924ED047AB}" type="pres">
-      <dgm:prSet presAssocID="{138477FA-333B-4AB0-980B-48446CB1EFD2}" presName="background2" presStyleLbl="node2" presStyleIdx="2" presStyleCnt="3"/>
-      <dgm:spPr/>
-    </dgm:pt>
-    <dgm:pt modelId="{A16E1DCD-7FAB-448D-A679-39CB0A27E971}" type="pres">
-      <dgm:prSet presAssocID="{138477FA-333B-4AB0-980B-48446CB1EFD2}" presName="text2" presStyleLbl="fgAcc2" presStyleIdx="2" presStyleCnt="3">
-        <dgm:presLayoutVars>
-          <dgm:chPref val="3"/>
-        </dgm:presLayoutVars>
-      </dgm:prSet>
-      <dgm:spPr/>
-    </dgm:pt>
-    <dgm:pt modelId="{42307C8F-5818-451A-A249-204823F3327D}" type="pres">
-      <dgm:prSet presAssocID="{138477FA-333B-4AB0-980B-48446CB1EFD2}" presName="hierChild3" presStyleCnt="0"/>
-      <dgm:spPr/>
-    </dgm:pt>
-    <dgm:pt modelId="{88AA3B31-4916-4739-A91F-200CD5999CC5}" type="pres">
-      <dgm:prSet presAssocID="{B920770E-FA6C-460C-B769-CE9556253D2A}" presName="Name17" presStyleLbl="parChTrans1D3" presStyleIdx="5" presStyleCnt="8"/>
-      <dgm:spPr/>
-    </dgm:pt>
-    <dgm:pt modelId="{7A62CE34-34F0-4A5B-A775-C6CDDD12CE09}" type="pres">
-      <dgm:prSet presAssocID="{7B798475-BD83-4D0F-AFB1-5F910C81D0AD}" presName="hierRoot3" presStyleCnt="0"/>
-      <dgm:spPr/>
-    </dgm:pt>
-    <dgm:pt modelId="{50050CCE-A93E-4616-AA1B-9FED14252389}" type="pres">
-      <dgm:prSet presAssocID="{7B798475-BD83-4D0F-AFB1-5F910C81D0AD}" presName="composite3" presStyleCnt="0"/>
-      <dgm:spPr/>
-    </dgm:pt>
-    <dgm:pt modelId="{BE0F4356-4497-4A9D-B2D8-75D6AF017A6D}" type="pres">
-      <dgm:prSet presAssocID="{7B798475-BD83-4D0F-AFB1-5F910C81D0AD}" presName="background3" presStyleLbl="node3" presStyleIdx="5" presStyleCnt="8"/>
-      <dgm:spPr/>
-    </dgm:pt>
-    <dgm:pt modelId="{54800A50-E45A-4E50-BBB4-0B1F2216D06C}" type="pres">
-      <dgm:prSet presAssocID="{7B798475-BD83-4D0F-AFB1-5F910C81D0AD}" presName="text3" presStyleLbl="fgAcc3" presStyleIdx="5" presStyleCnt="8">
+    <dgm:pt modelId="{DB50B143-1F51-4322-85D4-EA3F72BDEACF}" type="pres">
+      <dgm:prSet presAssocID="{54C6BB90-3D9C-4A89-9930-42026D0D5674}" presName="hierRoot3" presStyleCnt="0"/>
+      <dgm:spPr/>
+    </dgm:pt>
+    <dgm:pt modelId="{4305F2D6-890D-46F7-80AD-190B976259D5}" type="pres">
+      <dgm:prSet presAssocID="{54C6BB90-3D9C-4A89-9930-42026D0D5674}" presName="composite3" presStyleCnt="0"/>
+      <dgm:spPr/>
+    </dgm:pt>
+    <dgm:pt modelId="{540F10CB-3AD1-4872-8218-73A8FAB9770B}" type="pres">
+      <dgm:prSet presAssocID="{54C6BB90-3D9C-4A89-9930-42026D0D5674}" presName="background3" presStyleLbl="node3" presStyleIdx="0" presStyleCnt="8"/>
+      <dgm:spPr/>
+    </dgm:pt>
+    <dgm:pt modelId="{139687CB-FA19-419B-A506-F4C782B93EE8}" type="pres">
+      <dgm:prSet presAssocID="{54C6BB90-3D9C-4A89-9930-42026D0D5674}" presName="text3" presStyleLbl="fgAcc3" presStyleIdx="0" presStyleCnt="8">
         <dgm:presLayoutVars>
           <dgm:chPref val="3"/>
         </dgm:presLayoutVars>
@@ -5134,60 +4775,12 @@
         </a:p>
       </dgm:t>
     </dgm:pt>
-    <dgm:pt modelId="{92BAE2F8-CDE5-4050-B8BD-B42E6FD9625F}" type="pres">
-      <dgm:prSet presAssocID="{7B798475-BD83-4D0F-AFB1-5F910C81D0AD}" presName="hierChild4" presStyleCnt="0"/>
-      <dgm:spPr/>
-    </dgm:pt>
-    <dgm:pt modelId="{D582469F-B300-4441-8B7A-811F2944BE7C}" type="pres">
-      <dgm:prSet presAssocID="{B59F3437-6872-40D3-9770-9B57C873B960}" presName="Name17" presStyleLbl="parChTrans1D3" presStyleIdx="6" presStyleCnt="8"/>
-      <dgm:spPr/>
-    </dgm:pt>
-    <dgm:pt modelId="{137CD1A6-429F-4472-8075-2AAC931240C2}" type="pres">
-      <dgm:prSet presAssocID="{2B827F71-BD4B-4C27-994F-A9FD012AAF72}" presName="hierRoot3" presStyleCnt="0"/>
-      <dgm:spPr/>
-    </dgm:pt>
-    <dgm:pt modelId="{1AA004FF-A80C-47ED-BE42-2811F0A92588}" type="pres">
-      <dgm:prSet presAssocID="{2B827F71-BD4B-4C27-994F-A9FD012AAF72}" presName="composite3" presStyleCnt="0"/>
-      <dgm:spPr/>
-    </dgm:pt>
-    <dgm:pt modelId="{0F62097E-E899-413A-B307-BD360315F6A4}" type="pres">
-      <dgm:prSet presAssocID="{2B827F71-BD4B-4C27-994F-A9FD012AAF72}" presName="background3" presStyleLbl="node3" presStyleIdx="6" presStyleCnt="8"/>
-      <dgm:spPr/>
-    </dgm:pt>
-    <dgm:pt modelId="{1BD4006F-235B-45D5-96E7-76BD89EC9013}" type="pres">
-      <dgm:prSet presAssocID="{2B827F71-BD4B-4C27-994F-A9FD012AAF72}" presName="text3" presStyleLbl="fgAcc3" presStyleIdx="6" presStyleCnt="8">
-        <dgm:presLayoutVars>
-          <dgm:chPref val="3"/>
-        </dgm:presLayoutVars>
-      </dgm:prSet>
-      <dgm:spPr/>
-    </dgm:pt>
-    <dgm:pt modelId="{41E9E1B3-C577-4E7F-86D7-C65D8EC836C8}" type="pres">
-      <dgm:prSet presAssocID="{2B827F71-BD4B-4C27-994F-A9FD012AAF72}" presName="hierChild4" presStyleCnt="0"/>
-      <dgm:spPr/>
-    </dgm:pt>
-    <dgm:pt modelId="{9EF4A443-C70D-4105-BD5C-F7BFE8A59D1C}" type="pres">
-      <dgm:prSet presAssocID="{DAFBFE8A-DC9A-4C1B-A964-65303BD5683E}" presName="Name23" presStyleLbl="parChTrans1D4" presStyleIdx="6" presStyleCnt="9"/>
-      <dgm:spPr/>
-    </dgm:pt>
-    <dgm:pt modelId="{967BB5FB-045C-4B28-8F80-DE32BBA7265B}" type="pres">
-      <dgm:prSet presAssocID="{2D822117-3A27-43A1-8EFC-B38E86E130F6}" presName="hierRoot4" presStyleCnt="0"/>
-      <dgm:spPr/>
-    </dgm:pt>
-    <dgm:pt modelId="{BEB9CFB5-B327-4AD3-8D91-322532D2D027}" type="pres">
-      <dgm:prSet presAssocID="{2D822117-3A27-43A1-8EFC-B38E86E130F6}" presName="composite4" presStyleCnt="0"/>
-      <dgm:spPr/>
-    </dgm:pt>
-    <dgm:pt modelId="{041018A3-45AF-4699-B093-C1C72B2C10F1}" type="pres">
-      <dgm:prSet presAssocID="{2D822117-3A27-43A1-8EFC-B38E86E130F6}" presName="background4" presStyleLbl="node4" presStyleIdx="6" presStyleCnt="9"/>
-      <dgm:spPr/>
-    </dgm:pt>
-    <dgm:pt modelId="{20B38A1F-0061-41D4-BFF1-0B59440F0B20}" type="pres">
-      <dgm:prSet presAssocID="{2D822117-3A27-43A1-8EFC-B38E86E130F6}" presName="text4" presStyleLbl="fgAcc4" presStyleIdx="6" presStyleCnt="9">
-        <dgm:presLayoutVars>
-          <dgm:chPref val="3"/>
-        </dgm:presLayoutVars>
-      </dgm:prSet>
+    <dgm:pt modelId="{06E8A232-451F-48BC-B493-E9078323718E}" type="pres">
+      <dgm:prSet presAssocID="{54C6BB90-3D9C-4A89-9930-42026D0D5674}" presName="hierChild4" presStyleCnt="0"/>
+      <dgm:spPr/>
+    </dgm:pt>
+    <dgm:pt modelId="{251684E0-5257-4EAB-92E2-A7CDFF9667C4}" type="pres">
+      <dgm:prSet presAssocID="{1031EEA1-B52A-44C7-A9DC-2B9C5AD68E07}" presName="Name23" presStyleLbl="parChTrans1D4" presStyleIdx="0" presStyleCnt="9"/>
       <dgm:spPr/>
       <dgm:t>
         <a:bodyPr/>
@@ -5197,6 +4790,621 @@
         </a:p>
       </dgm:t>
     </dgm:pt>
+    <dgm:pt modelId="{5AA945E0-F531-4BF1-B61A-D3CFC51D4A37}" type="pres">
+      <dgm:prSet presAssocID="{89E670CB-FC26-442F-9EC0-7897B9C461CA}" presName="hierRoot4" presStyleCnt="0"/>
+      <dgm:spPr/>
+    </dgm:pt>
+    <dgm:pt modelId="{3967B028-FCE6-4F7C-AA8D-F0F404414757}" type="pres">
+      <dgm:prSet presAssocID="{89E670CB-FC26-442F-9EC0-7897B9C461CA}" presName="composite4" presStyleCnt="0"/>
+      <dgm:spPr/>
+    </dgm:pt>
+    <dgm:pt modelId="{B63C81AE-0D7A-453A-B8C6-05A4735C5D13}" type="pres">
+      <dgm:prSet presAssocID="{89E670CB-FC26-442F-9EC0-7897B9C461CA}" presName="background4" presStyleLbl="node4" presStyleIdx="0" presStyleCnt="9"/>
+      <dgm:spPr/>
+    </dgm:pt>
+    <dgm:pt modelId="{4E14D5CA-2CCD-4705-BE9B-2DADBEB928AB}" type="pres">
+      <dgm:prSet presAssocID="{89E670CB-FC26-442F-9EC0-7897B9C461CA}" presName="text4" presStyleLbl="fgAcc4" presStyleIdx="0" presStyleCnt="9">
+        <dgm:presLayoutVars>
+          <dgm:chPref val="3"/>
+        </dgm:presLayoutVars>
+      </dgm:prSet>
+      <dgm:spPr/>
+      <dgm:t>
+        <a:bodyPr/>
+        <a:lstStyle/>
+        <a:p>
+          <a:endParaRPr lang="en-US"/>
+        </a:p>
+      </dgm:t>
+    </dgm:pt>
+    <dgm:pt modelId="{E3A3112A-1A93-4C44-9F9F-DC9C7F8D38BF}" type="pres">
+      <dgm:prSet presAssocID="{89E670CB-FC26-442F-9EC0-7897B9C461CA}" presName="hierChild5" presStyleCnt="0"/>
+      <dgm:spPr/>
+    </dgm:pt>
+    <dgm:pt modelId="{E98A6A60-0C29-4EEF-8400-0A7B65646E0C}" type="pres">
+      <dgm:prSet presAssocID="{C5A8DAA0-4B18-4426-8C7F-462FA4648194}" presName="Name23" presStyleLbl="parChTrans1D4" presStyleIdx="1" presStyleCnt="9"/>
+      <dgm:spPr/>
+      <dgm:t>
+        <a:bodyPr/>
+        <a:lstStyle/>
+        <a:p>
+          <a:endParaRPr lang="en-US"/>
+        </a:p>
+      </dgm:t>
+    </dgm:pt>
+    <dgm:pt modelId="{D03F3C9A-67EC-42A0-9148-5534224A9B91}" type="pres">
+      <dgm:prSet presAssocID="{18BBD30F-9172-4E7D-BCD3-A823A8A46FAB}" presName="hierRoot4" presStyleCnt="0"/>
+      <dgm:spPr/>
+    </dgm:pt>
+    <dgm:pt modelId="{6EE4C178-B499-4FE9-A36F-9A4196FC7145}" type="pres">
+      <dgm:prSet presAssocID="{18BBD30F-9172-4E7D-BCD3-A823A8A46FAB}" presName="composite4" presStyleCnt="0"/>
+      <dgm:spPr/>
+    </dgm:pt>
+    <dgm:pt modelId="{EB40EDAB-DFC2-4049-A491-FD26BF6A68A0}" type="pres">
+      <dgm:prSet presAssocID="{18BBD30F-9172-4E7D-BCD3-A823A8A46FAB}" presName="background4" presStyleLbl="node4" presStyleIdx="1" presStyleCnt="9"/>
+      <dgm:spPr/>
+    </dgm:pt>
+    <dgm:pt modelId="{E655C419-8C5B-41BD-B382-ADDB1BF775E2}" type="pres">
+      <dgm:prSet presAssocID="{18BBD30F-9172-4E7D-BCD3-A823A8A46FAB}" presName="text4" presStyleLbl="fgAcc4" presStyleIdx="1" presStyleCnt="9">
+        <dgm:presLayoutVars>
+          <dgm:chPref val="3"/>
+        </dgm:presLayoutVars>
+      </dgm:prSet>
+      <dgm:spPr/>
+      <dgm:t>
+        <a:bodyPr/>
+        <a:lstStyle/>
+        <a:p>
+          <a:endParaRPr lang="en-US"/>
+        </a:p>
+      </dgm:t>
+    </dgm:pt>
+    <dgm:pt modelId="{5A748A01-C71C-4476-AE89-9ADA5DC3160E}" type="pres">
+      <dgm:prSet presAssocID="{18BBD30F-9172-4E7D-BCD3-A823A8A46FAB}" presName="hierChild5" presStyleCnt="0"/>
+      <dgm:spPr/>
+    </dgm:pt>
+    <dgm:pt modelId="{170E11C5-0055-4400-9473-98D537C6E739}" type="pres">
+      <dgm:prSet presAssocID="{7ED6A327-88D1-46FF-A3E8-603F61FADD33}" presName="Name17" presStyleLbl="parChTrans1D3" presStyleIdx="1" presStyleCnt="8"/>
+      <dgm:spPr/>
+      <dgm:t>
+        <a:bodyPr/>
+        <a:lstStyle/>
+        <a:p>
+          <a:endParaRPr lang="en-US"/>
+        </a:p>
+      </dgm:t>
+    </dgm:pt>
+    <dgm:pt modelId="{0BE96676-2729-4BD5-9DA3-A62322F6E494}" type="pres">
+      <dgm:prSet presAssocID="{0A62678E-4B8E-46FF-879A-8D0F44F69EE8}" presName="hierRoot3" presStyleCnt="0"/>
+      <dgm:spPr/>
+    </dgm:pt>
+    <dgm:pt modelId="{02A5A050-3E1B-4641-A7A0-FBFB861DF75C}" type="pres">
+      <dgm:prSet presAssocID="{0A62678E-4B8E-46FF-879A-8D0F44F69EE8}" presName="composite3" presStyleCnt="0"/>
+      <dgm:spPr/>
+    </dgm:pt>
+    <dgm:pt modelId="{695A07D6-E589-4D78-AECF-ED4A3C5A6FBE}" type="pres">
+      <dgm:prSet presAssocID="{0A62678E-4B8E-46FF-879A-8D0F44F69EE8}" presName="background3" presStyleLbl="node3" presStyleIdx="1" presStyleCnt="8"/>
+      <dgm:spPr/>
+    </dgm:pt>
+    <dgm:pt modelId="{D16EF9B5-7DF2-4D26-95CE-4462A6160C00}" type="pres">
+      <dgm:prSet presAssocID="{0A62678E-4B8E-46FF-879A-8D0F44F69EE8}" presName="text3" presStyleLbl="fgAcc3" presStyleIdx="1" presStyleCnt="8">
+        <dgm:presLayoutVars>
+          <dgm:chPref val="3"/>
+        </dgm:presLayoutVars>
+      </dgm:prSet>
+      <dgm:spPr/>
+      <dgm:t>
+        <a:bodyPr/>
+        <a:lstStyle/>
+        <a:p>
+          <a:endParaRPr lang="en-US"/>
+        </a:p>
+      </dgm:t>
+    </dgm:pt>
+    <dgm:pt modelId="{CD588C5E-990A-450E-8A07-846B2C600417}" type="pres">
+      <dgm:prSet presAssocID="{0A62678E-4B8E-46FF-879A-8D0F44F69EE8}" presName="hierChild4" presStyleCnt="0"/>
+      <dgm:spPr/>
+    </dgm:pt>
+    <dgm:pt modelId="{A20323C0-B8E1-46AD-98C8-3C462D62EC3D}" type="pres">
+      <dgm:prSet presAssocID="{9584E3D9-C2FC-43BF-B271-EDFDC2B8A33B}" presName="Name23" presStyleLbl="parChTrans1D4" presStyleIdx="2" presStyleCnt="9"/>
+      <dgm:spPr/>
+      <dgm:t>
+        <a:bodyPr/>
+        <a:lstStyle/>
+        <a:p>
+          <a:endParaRPr lang="en-US"/>
+        </a:p>
+      </dgm:t>
+    </dgm:pt>
+    <dgm:pt modelId="{99C883F0-3F2B-4532-873B-FC1702FD976B}" type="pres">
+      <dgm:prSet presAssocID="{14CFBF8C-E5C8-41C3-B10F-823F08537A30}" presName="hierRoot4" presStyleCnt="0"/>
+      <dgm:spPr/>
+    </dgm:pt>
+    <dgm:pt modelId="{ECE80B83-6D71-46B8-8AAD-0AA0EFBDEEF0}" type="pres">
+      <dgm:prSet presAssocID="{14CFBF8C-E5C8-41C3-B10F-823F08537A30}" presName="composite4" presStyleCnt="0"/>
+      <dgm:spPr/>
+    </dgm:pt>
+    <dgm:pt modelId="{52325DA5-DD7E-462E-A9DC-2C2F16B1BA3C}" type="pres">
+      <dgm:prSet presAssocID="{14CFBF8C-E5C8-41C3-B10F-823F08537A30}" presName="background4" presStyleLbl="node4" presStyleIdx="2" presStyleCnt="9"/>
+      <dgm:spPr/>
+    </dgm:pt>
+    <dgm:pt modelId="{D141A3F7-7E44-4D07-A3E8-0F0B66B87235}" type="pres">
+      <dgm:prSet presAssocID="{14CFBF8C-E5C8-41C3-B10F-823F08537A30}" presName="text4" presStyleLbl="fgAcc4" presStyleIdx="2" presStyleCnt="9">
+        <dgm:presLayoutVars>
+          <dgm:chPref val="3"/>
+        </dgm:presLayoutVars>
+      </dgm:prSet>
+      <dgm:spPr/>
+      <dgm:t>
+        <a:bodyPr/>
+        <a:lstStyle/>
+        <a:p>
+          <a:endParaRPr lang="en-US"/>
+        </a:p>
+      </dgm:t>
+    </dgm:pt>
+    <dgm:pt modelId="{2BD5923D-F8E9-4F6D-BF43-B95D3C59904C}" type="pres">
+      <dgm:prSet presAssocID="{14CFBF8C-E5C8-41C3-B10F-823F08537A30}" presName="hierChild5" presStyleCnt="0"/>
+      <dgm:spPr/>
+    </dgm:pt>
+    <dgm:pt modelId="{F56E999E-66FD-4637-AD33-5AC8B79F1842}" type="pres">
+      <dgm:prSet presAssocID="{78BC4A45-6F56-4B87-AD3D-8766ED12A7E9}" presName="Name17" presStyleLbl="parChTrans1D3" presStyleIdx="2" presStyleCnt="8"/>
+      <dgm:spPr/>
+      <dgm:t>
+        <a:bodyPr/>
+        <a:lstStyle/>
+        <a:p>
+          <a:endParaRPr lang="en-US"/>
+        </a:p>
+      </dgm:t>
+    </dgm:pt>
+    <dgm:pt modelId="{B6638D92-2FBA-4C12-A490-4C9FCAE716A5}" type="pres">
+      <dgm:prSet presAssocID="{2F0FB5DE-5A9D-4D3D-A583-7FA014441C51}" presName="hierRoot3" presStyleCnt="0"/>
+      <dgm:spPr/>
+    </dgm:pt>
+    <dgm:pt modelId="{6FD56B1B-E08A-4ADC-AC54-FD7C3C4FEF16}" type="pres">
+      <dgm:prSet presAssocID="{2F0FB5DE-5A9D-4D3D-A583-7FA014441C51}" presName="composite3" presStyleCnt="0"/>
+      <dgm:spPr/>
+    </dgm:pt>
+    <dgm:pt modelId="{D903AFF5-E5F6-4466-924A-0B5E49DA2031}" type="pres">
+      <dgm:prSet presAssocID="{2F0FB5DE-5A9D-4D3D-A583-7FA014441C51}" presName="background3" presStyleLbl="node3" presStyleIdx="2" presStyleCnt="8"/>
+      <dgm:spPr/>
+    </dgm:pt>
+    <dgm:pt modelId="{23EF96DB-4BC4-4BFF-A0F6-595B9165E4CE}" type="pres">
+      <dgm:prSet presAssocID="{2F0FB5DE-5A9D-4D3D-A583-7FA014441C51}" presName="text3" presStyleLbl="fgAcc3" presStyleIdx="2" presStyleCnt="8">
+        <dgm:presLayoutVars>
+          <dgm:chPref val="3"/>
+        </dgm:presLayoutVars>
+      </dgm:prSet>
+      <dgm:spPr/>
+      <dgm:t>
+        <a:bodyPr/>
+        <a:lstStyle/>
+        <a:p>
+          <a:endParaRPr lang="en-US"/>
+        </a:p>
+      </dgm:t>
+    </dgm:pt>
+    <dgm:pt modelId="{F6DBD380-BAE3-4AE9-8336-45705DE240C3}" type="pres">
+      <dgm:prSet presAssocID="{2F0FB5DE-5A9D-4D3D-A583-7FA014441C51}" presName="hierChild4" presStyleCnt="0"/>
+      <dgm:spPr/>
+    </dgm:pt>
+    <dgm:pt modelId="{F9404CB4-28B5-4983-A516-3F7A94617B67}" type="pres">
+      <dgm:prSet presAssocID="{95EA9144-B8E2-463C-B4F4-77B55A351B27}" presName="Name23" presStyleLbl="parChTrans1D4" presStyleIdx="3" presStyleCnt="9"/>
+      <dgm:spPr/>
+      <dgm:t>
+        <a:bodyPr/>
+        <a:lstStyle/>
+        <a:p>
+          <a:endParaRPr lang="en-US"/>
+        </a:p>
+      </dgm:t>
+    </dgm:pt>
+    <dgm:pt modelId="{1B725075-70F9-4A0C-AC8F-4DB3427A3707}" type="pres">
+      <dgm:prSet presAssocID="{A9C2D848-281E-42B3-84EF-C2D5CFE7CF11}" presName="hierRoot4" presStyleCnt="0"/>
+      <dgm:spPr/>
+    </dgm:pt>
+    <dgm:pt modelId="{BBECFC40-0CF1-46A5-91DB-AEE8B855E0FA}" type="pres">
+      <dgm:prSet presAssocID="{A9C2D848-281E-42B3-84EF-C2D5CFE7CF11}" presName="composite4" presStyleCnt="0"/>
+      <dgm:spPr/>
+    </dgm:pt>
+    <dgm:pt modelId="{4F97DA0F-CA2C-4DFC-94D7-D273FB7AF9D3}" type="pres">
+      <dgm:prSet presAssocID="{A9C2D848-281E-42B3-84EF-C2D5CFE7CF11}" presName="background4" presStyleLbl="node4" presStyleIdx="3" presStyleCnt="9"/>
+      <dgm:spPr/>
+    </dgm:pt>
+    <dgm:pt modelId="{1DA59ED9-F503-4A52-82DA-D69BBEAAF564}" type="pres">
+      <dgm:prSet presAssocID="{A9C2D848-281E-42B3-84EF-C2D5CFE7CF11}" presName="text4" presStyleLbl="fgAcc4" presStyleIdx="3" presStyleCnt="9">
+        <dgm:presLayoutVars>
+          <dgm:chPref val="3"/>
+        </dgm:presLayoutVars>
+      </dgm:prSet>
+      <dgm:spPr/>
+      <dgm:t>
+        <a:bodyPr/>
+        <a:lstStyle/>
+        <a:p>
+          <a:endParaRPr lang="en-US"/>
+        </a:p>
+      </dgm:t>
+    </dgm:pt>
+    <dgm:pt modelId="{889553DA-DBD6-4F6E-AD63-8C2DBAF05D8D}" type="pres">
+      <dgm:prSet presAssocID="{A9C2D848-281E-42B3-84EF-C2D5CFE7CF11}" presName="hierChild5" presStyleCnt="0"/>
+      <dgm:spPr/>
+    </dgm:pt>
+    <dgm:pt modelId="{F402A8AC-4543-4936-9679-A33E5C50761A}" type="pres">
+      <dgm:prSet presAssocID="{5B4241F5-0257-4789-809D-0F69B968803A}" presName="Name23" presStyleLbl="parChTrans1D4" presStyleIdx="4" presStyleCnt="9"/>
+      <dgm:spPr/>
+      <dgm:t>
+        <a:bodyPr/>
+        <a:lstStyle/>
+        <a:p>
+          <a:endParaRPr lang="en-US"/>
+        </a:p>
+      </dgm:t>
+    </dgm:pt>
+    <dgm:pt modelId="{75307070-9502-4B08-8140-4F05F4B2C2D5}" type="pres">
+      <dgm:prSet presAssocID="{FD61C736-F33D-4CBD-AEF7-A4086FCC0359}" presName="hierRoot4" presStyleCnt="0"/>
+      <dgm:spPr/>
+    </dgm:pt>
+    <dgm:pt modelId="{ADE0F9DF-9E8E-48B5-839D-0A0548D54374}" type="pres">
+      <dgm:prSet presAssocID="{FD61C736-F33D-4CBD-AEF7-A4086FCC0359}" presName="composite4" presStyleCnt="0"/>
+      <dgm:spPr/>
+    </dgm:pt>
+    <dgm:pt modelId="{ECE2A336-ECD9-4924-80DD-3628EF9943D5}" type="pres">
+      <dgm:prSet presAssocID="{FD61C736-F33D-4CBD-AEF7-A4086FCC0359}" presName="background4" presStyleLbl="node4" presStyleIdx="4" presStyleCnt="9"/>
+      <dgm:spPr/>
+    </dgm:pt>
+    <dgm:pt modelId="{A0AA38E3-68DF-4A84-9E54-694EC5B5A638}" type="pres">
+      <dgm:prSet presAssocID="{FD61C736-F33D-4CBD-AEF7-A4086FCC0359}" presName="text4" presStyleLbl="fgAcc4" presStyleIdx="4" presStyleCnt="9">
+        <dgm:presLayoutVars>
+          <dgm:chPref val="3"/>
+        </dgm:presLayoutVars>
+      </dgm:prSet>
+      <dgm:spPr/>
+      <dgm:t>
+        <a:bodyPr/>
+        <a:lstStyle/>
+        <a:p>
+          <a:endParaRPr lang="en-US"/>
+        </a:p>
+      </dgm:t>
+    </dgm:pt>
+    <dgm:pt modelId="{56ECB6FA-F104-466A-97C9-3CCDE12C1719}" type="pres">
+      <dgm:prSet presAssocID="{FD61C736-F33D-4CBD-AEF7-A4086FCC0359}" presName="hierChild5" presStyleCnt="0"/>
+      <dgm:spPr/>
+    </dgm:pt>
+    <dgm:pt modelId="{F7BF62A1-678B-4CCF-AAF7-B49A244B354C}" type="pres">
+      <dgm:prSet presAssocID="{C40A0E85-1A5D-4901-B167-5B8066C24751}" presName="Name10" presStyleLbl="parChTrans1D2" presStyleIdx="1" presStyleCnt="3"/>
+      <dgm:spPr/>
+      <dgm:t>
+        <a:bodyPr/>
+        <a:lstStyle/>
+        <a:p>
+          <a:endParaRPr lang="en-US"/>
+        </a:p>
+      </dgm:t>
+    </dgm:pt>
+    <dgm:pt modelId="{0C594343-283A-47AD-9201-696347826E59}" type="pres">
+      <dgm:prSet presAssocID="{8BC64FAF-A813-4AD4-8191-6615C237CB0B}" presName="hierRoot2" presStyleCnt="0"/>
+      <dgm:spPr/>
+    </dgm:pt>
+    <dgm:pt modelId="{61D72423-3781-4859-BA6D-A9C5C7253D66}" type="pres">
+      <dgm:prSet presAssocID="{8BC64FAF-A813-4AD4-8191-6615C237CB0B}" presName="composite2" presStyleCnt="0"/>
+      <dgm:spPr/>
+    </dgm:pt>
+    <dgm:pt modelId="{6EA619A8-7B85-4C52-BF8D-6C1E6FC32702}" type="pres">
+      <dgm:prSet presAssocID="{8BC64FAF-A813-4AD4-8191-6615C237CB0B}" presName="background2" presStyleLbl="node2" presStyleIdx="1" presStyleCnt="3"/>
+      <dgm:spPr/>
+    </dgm:pt>
+    <dgm:pt modelId="{CEEDCDF0-077E-4F45-98D0-D3D7D3E62473}" type="pres">
+      <dgm:prSet presAssocID="{8BC64FAF-A813-4AD4-8191-6615C237CB0B}" presName="text2" presStyleLbl="fgAcc2" presStyleIdx="1" presStyleCnt="3">
+        <dgm:presLayoutVars>
+          <dgm:chPref val="3"/>
+        </dgm:presLayoutVars>
+      </dgm:prSet>
+      <dgm:spPr/>
+      <dgm:t>
+        <a:bodyPr/>
+        <a:lstStyle/>
+        <a:p>
+          <a:endParaRPr lang="en-US"/>
+        </a:p>
+      </dgm:t>
+    </dgm:pt>
+    <dgm:pt modelId="{B377FF55-92AC-4FFD-BAC1-79DB9A3AF273}" type="pres">
+      <dgm:prSet presAssocID="{8BC64FAF-A813-4AD4-8191-6615C237CB0B}" presName="hierChild3" presStyleCnt="0"/>
+      <dgm:spPr/>
+    </dgm:pt>
+    <dgm:pt modelId="{AAC1BB25-EDC3-49E7-8EE3-F3937B2DD4A6}" type="pres">
+      <dgm:prSet presAssocID="{882C303E-623C-4775-B440-F78631A171CF}" presName="Name17" presStyleLbl="parChTrans1D3" presStyleIdx="3" presStyleCnt="8"/>
+      <dgm:spPr/>
+      <dgm:t>
+        <a:bodyPr/>
+        <a:lstStyle/>
+        <a:p>
+          <a:endParaRPr lang="en-US"/>
+        </a:p>
+      </dgm:t>
+    </dgm:pt>
+    <dgm:pt modelId="{B45D964E-3CB7-409E-AEDF-8D5D6E2BC3D9}" type="pres">
+      <dgm:prSet presAssocID="{01CE2920-4FF8-4F06-B54F-C866A23161AF}" presName="hierRoot3" presStyleCnt="0"/>
+      <dgm:spPr/>
+    </dgm:pt>
+    <dgm:pt modelId="{A31D2B6A-30AE-45EF-B94C-B2FABFD89412}" type="pres">
+      <dgm:prSet presAssocID="{01CE2920-4FF8-4F06-B54F-C866A23161AF}" presName="composite3" presStyleCnt="0"/>
+      <dgm:spPr/>
+    </dgm:pt>
+    <dgm:pt modelId="{5FAE5D1D-EB25-4037-809D-95AA0CC9973E}" type="pres">
+      <dgm:prSet presAssocID="{01CE2920-4FF8-4F06-B54F-C866A23161AF}" presName="background3" presStyleLbl="node3" presStyleIdx="3" presStyleCnt="8"/>
+      <dgm:spPr/>
+    </dgm:pt>
+    <dgm:pt modelId="{2BC45593-C227-45A5-81B8-5F15154DD736}" type="pres">
+      <dgm:prSet presAssocID="{01CE2920-4FF8-4F06-B54F-C866A23161AF}" presName="text3" presStyleLbl="fgAcc3" presStyleIdx="3" presStyleCnt="8">
+        <dgm:presLayoutVars>
+          <dgm:chPref val="3"/>
+        </dgm:presLayoutVars>
+      </dgm:prSet>
+      <dgm:spPr/>
+      <dgm:t>
+        <a:bodyPr/>
+        <a:lstStyle/>
+        <a:p>
+          <a:endParaRPr lang="en-US"/>
+        </a:p>
+      </dgm:t>
+    </dgm:pt>
+    <dgm:pt modelId="{483F8853-739C-4EA6-AD9D-51D7E4108419}" type="pres">
+      <dgm:prSet presAssocID="{01CE2920-4FF8-4F06-B54F-C866A23161AF}" presName="hierChild4" presStyleCnt="0"/>
+      <dgm:spPr/>
+    </dgm:pt>
+    <dgm:pt modelId="{AB53B3F7-4ADE-4D73-B93A-EA9B9713E1BD}" type="pres">
+      <dgm:prSet presAssocID="{DE0F42CF-E108-4814-A7F2-EDC93A86437C}" presName="Name17" presStyleLbl="parChTrans1D3" presStyleIdx="4" presStyleCnt="8"/>
+      <dgm:spPr/>
+      <dgm:t>
+        <a:bodyPr/>
+        <a:lstStyle/>
+        <a:p>
+          <a:endParaRPr lang="en-US"/>
+        </a:p>
+      </dgm:t>
+    </dgm:pt>
+    <dgm:pt modelId="{59F46CD4-0ACC-46A5-BC89-049DD9962F18}" type="pres">
+      <dgm:prSet presAssocID="{3CADED54-B4D3-4261-A1AD-541372B12D05}" presName="hierRoot3" presStyleCnt="0"/>
+      <dgm:spPr/>
+    </dgm:pt>
+    <dgm:pt modelId="{87721D3E-4C10-4E55-9F64-CA86EDBF6E7C}" type="pres">
+      <dgm:prSet presAssocID="{3CADED54-B4D3-4261-A1AD-541372B12D05}" presName="composite3" presStyleCnt="0"/>
+      <dgm:spPr/>
+    </dgm:pt>
+    <dgm:pt modelId="{9AD66726-A16D-4893-A1F0-B4A1BECC9424}" type="pres">
+      <dgm:prSet presAssocID="{3CADED54-B4D3-4261-A1AD-541372B12D05}" presName="background3" presStyleLbl="node3" presStyleIdx="4" presStyleCnt="8"/>
+      <dgm:spPr/>
+    </dgm:pt>
+    <dgm:pt modelId="{90BE0797-6E29-4F8F-AE1C-BBD0830C2A76}" type="pres">
+      <dgm:prSet presAssocID="{3CADED54-B4D3-4261-A1AD-541372B12D05}" presName="text3" presStyleLbl="fgAcc3" presStyleIdx="4" presStyleCnt="8">
+        <dgm:presLayoutVars>
+          <dgm:chPref val="3"/>
+        </dgm:presLayoutVars>
+      </dgm:prSet>
+      <dgm:spPr/>
+      <dgm:t>
+        <a:bodyPr/>
+        <a:lstStyle/>
+        <a:p>
+          <a:endParaRPr lang="en-US"/>
+        </a:p>
+      </dgm:t>
+    </dgm:pt>
+    <dgm:pt modelId="{40FDE411-75E1-47AC-B43D-32F33D637A5E}" type="pres">
+      <dgm:prSet presAssocID="{3CADED54-B4D3-4261-A1AD-541372B12D05}" presName="hierChild4" presStyleCnt="0"/>
+      <dgm:spPr/>
+    </dgm:pt>
+    <dgm:pt modelId="{E4C5F0FD-1D15-431E-A26A-4A8BBF1C5A2A}" type="pres">
+      <dgm:prSet presAssocID="{12C8207D-EC38-4E58-85E9-76B29A6DE692}" presName="Name23" presStyleLbl="parChTrans1D4" presStyleIdx="5" presStyleCnt="9"/>
+      <dgm:spPr/>
+      <dgm:t>
+        <a:bodyPr/>
+        <a:lstStyle/>
+        <a:p>
+          <a:endParaRPr lang="en-US"/>
+        </a:p>
+      </dgm:t>
+    </dgm:pt>
+    <dgm:pt modelId="{90A2F293-5F20-4EBD-A792-BE9FF0F2EC7D}" type="pres">
+      <dgm:prSet presAssocID="{0512A5C5-BAFE-453C-A72D-17CF9942141F}" presName="hierRoot4" presStyleCnt="0"/>
+      <dgm:spPr/>
+    </dgm:pt>
+    <dgm:pt modelId="{88D51329-9F07-461F-9B7E-BC3AE56041B6}" type="pres">
+      <dgm:prSet presAssocID="{0512A5C5-BAFE-453C-A72D-17CF9942141F}" presName="composite4" presStyleCnt="0"/>
+      <dgm:spPr/>
+    </dgm:pt>
+    <dgm:pt modelId="{5B870DCB-F586-443B-ABCE-B577FA4C8F61}" type="pres">
+      <dgm:prSet presAssocID="{0512A5C5-BAFE-453C-A72D-17CF9942141F}" presName="background4" presStyleLbl="node4" presStyleIdx="5" presStyleCnt="9"/>
+      <dgm:spPr/>
+    </dgm:pt>
+    <dgm:pt modelId="{4E505D1B-0D9F-4C67-92E2-E88607025BC9}" type="pres">
+      <dgm:prSet presAssocID="{0512A5C5-BAFE-453C-A72D-17CF9942141F}" presName="text4" presStyleLbl="fgAcc4" presStyleIdx="5" presStyleCnt="9">
+        <dgm:presLayoutVars>
+          <dgm:chPref val="3"/>
+        </dgm:presLayoutVars>
+      </dgm:prSet>
+      <dgm:spPr/>
+      <dgm:t>
+        <a:bodyPr/>
+        <a:lstStyle/>
+        <a:p>
+          <a:endParaRPr lang="en-US"/>
+        </a:p>
+      </dgm:t>
+    </dgm:pt>
+    <dgm:pt modelId="{CE40990E-0494-47F8-887D-F4CFAE870C2E}" type="pres">
+      <dgm:prSet presAssocID="{0512A5C5-BAFE-453C-A72D-17CF9942141F}" presName="hierChild5" presStyleCnt="0"/>
+      <dgm:spPr/>
+    </dgm:pt>
+    <dgm:pt modelId="{5496AA36-6C29-4402-87AE-3BA3F7F7FB10}" type="pres">
+      <dgm:prSet presAssocID="{B01C31C9-35B1-41F1-BCF9-106809662280}" presName="Name10" presStyleLbl="parChTrans1D2" presStyleIdx="2" presStyleCnt="3"/>
+      <dgm:spPr/>
+      <dgm:t>
+        <a:bodyPr/>
+        <a:lstStyle/>
+        <a:p>
+          <a:endParaRPr lang="en-US"/>
+        </a:p>
+      </dgm:t>
+    </dgm:pt>
+    <dgm:pt modelId="{58841F15-3EB7-41D3-9DF7-7216900091F0}" type="pres">
+      <dgm:prSet presAssocID="{138477FA-333B-4AB0-980B-48446CB1EFD2}" presName="hierRoot2" presStyleCnt="0"/>
+      <dgm:spPr/>
+    </dgm:pt>
+    <dgm:pt modelId="{D92DC0EA-997F-46D2-A194-A91315686FA1}" type="pres">
+      <dgm:prSet presAssocID="{138477FA-333B-4AB0-980B-48446CB1EFD2}" presName="composite2" presStyleCnt="0"/>
+      <dgm:spPr/>
+    </dgm:pt>
+    <dgm:pt modelId="{989D2EA1-9439-4DA1-8943-DD924ED047AB}" type="pres">
+      <dgm:prSet presAssocID="{138477FA-333B-4AB0-980B-48446CB1EFD2}" presName="background2" presStyleLbl="node2" presStyleIdx="2" presStyleCnt="3"/>
+      <dgm:spPr/>
+    </dgm:pt>
+    <dgm:pt modelId="{A16E1DCD-7FAB-448D-A679-39CB0A27E971}" type="pres">
+      <dgm:prSet presAssocID="{138477FA-333B-4AB0-980B-48446CB1EFD2}" presName="text2" presStyleLbl="fgAcc2" presStyleIdx="2" presStyleCnt="3">
+        <dgm:presLayoutVars>
+          <dgm:chPref val="3"/>
+        </dgm:presLayoutVars>
+      </dgm:prSet>
+      <dgm:spPr/>
+      <dgm:t>
+        <a:bodyPr/>
+        <a:lstStyle/>
+        <a:p>
+          <a:endParaRPr lang="en-US"/>
+        </a:p>
+      </dgm:t>
+    </dgm:pt>
+    <dgm:pt modelId="{42307C8F-5818-451A-A249-204823F3327D}" type="pres">
+      <dgm:prSet presAssocID="{138477FA-333B-4AB0-980B-48446CB1EFD2}" presName="hierChild3" presStyleCnt="0"/>
+      <dgm:spPr/>
+    </dgm:pt>
+    <dgm:pt modelId="{88AA3B31-4916-4739-A91F-200CD5999CC5}" type="pres">
+      <dgm:prSet presAssocID="{B920770E-FA6C-460C-B769-CE9556253D2A}" presName="Name17" presStyleLbl="parChTrans1D3" presStyleIdx="5" presStyleCnt="8"/>
+      <dgm:spPr/>
+      <dgm:t>
+        <a:bodyPr/>
+        <a:lstStyle/>
+        <a:p>
+          <a:endParaRPr lang="en-US"/>
+        </a:p>
+      </dgm:t>
+    </dgm:pt>
+    <dgm:pt modelId="{7A62CE34-34F0-4A5B-A775-C6CDDD12CE09}" type="pres">
+      <dgm:prSet presAssocID="{7B798475-BD83-4D0F-AFB1-5F910C81D0AD}" presName="hierRoot3" presStyleCnt="0"/>
+      <dgm:spPr/>
+    </dgm:pt>
+    <dgm:pt modelId="{50050CCE-A93E-4616-AA1B-9FED14252389}" type="pres">
+      <dgm:prSet presAssocID="{7B798475-BD83-4D0F-AFB1-5F910C81D0AD}" presName="composite3" presStyleCnt="0"/>
+      <dgm:spPr/>
+    </dgm:pt>
+    <dgm:pt modelId="{BE0F4356-4497-4A9D-B2D8-75D6AF017A6D}" type="pres">
+      <dgm:prSet presAssocID="{7B798475-BD83-4D0F-AFB1-5F910C81D0AD}" presName="background3" presStyleLbl="node3" presStyleIdx="5" presStyleCnt="8"/>
+      <dgm:spPr/>
+    </dgm:pt>
+    <dgm:pt modelId="{54800A50-E45A-4E50-BBB4-0B1F2216D06C}" type="pres">
+      <dgm:prSet presAssocID="{7B798475-BD83-4D0F-AFB1-5F910C81D0AD}" presName="text3" presStyleLbl="fgAcc3" presStyleIdx="5" presStyleCnt="8">
+        <dgm:presLayoutVars>
+          <dgm:chPref val="3"/>
+        </dgm:presLayoutVars>
+      </dgm:prSet>
+      <dgm:spPr/>
+      <dgm:t>
+        <a:bodyPr/>
+        <a:lstStyle/>
+        <a:p>
+          <a:endParaRPr lang="en-US"/>
+        </a:p>
+      </dgm:t>
+    </dgm:pt>
+    <dgm:pt modelId="{92BAE2F8-CDE5-4050-B8BD-B42E6FD9625F}" type="pres">
+      <dgm:prSet presAssocID="{7B798475-BD83-4D0F-AFB1-5F910C81D0AD}" presName="hierChild4" presStyleCnt="0"/>
+      <dgm:spPr/>
+    </dgm:pt>
+    <dgm:pt modelId="{D582469F-B300-4441-8B7A-811F2944BE7C}" type="pres">
+      <dgm:prSet presAssocID="{B59F3437-6872-40D3-9770-9B57C873B960}" presName="Name17" presStyleLbl="parChTrans1D3" presStyleIdx="6" presStyleCnt="8"/>
+      <dgm:spPr/>
+      <dgm:t>
+        <a:bodyPr/>
+        <a:lstStyle/>
+        <a:p>
+          <a:endParaRPr lang="en-US"/>
+        </a:p>
+      </dgm:t>
+    </dgm:pt>
+    <dgm:pt modelId="{137CD1A6-429F-4472-8075-2AAC931240C2}" type="pres">
+      <dgm:prSet presAssocID="{2B827F71-BD4B-4C27-994F-A9FD012AAF72}" presName="hierRoot3" presStyleCnt="0"/>
+      <dgm:spPr/>
+    </dgm:pt>
+    <dgm:pt modelId="{1AA004FF-A80C-47ED-BE42-2811F0A92588}" type="pres">
+      <dgm:prSet presAssocID="{2B827F71-BD4B-4C27-994F-A9FD012AAF72}" presName="composite3" presStyleCnt="0"/>
+      <dgm:spPr/>
+    </dgm:pt>
+    <dgm:pt modelId="{0F62097E-E899-413A-B307-BD360315F6A4}" type="pres">
+      <dgm:prSet presAssocID="{2B827F71-BD4B-4C27-994F-A9FD012AAF72}" presName="background3" presStyleLbl="node3" presStyleIdx="6" presStyleCnt="8"/>
+      <dgm:spPr/>
+    </dgm:pt>
+    <dgm:pt modelId="{1BD4006F-235B-45D5-96E7-76BD89EC9013}" type="pres">
+      <dgm:prSet presAssocID="{2B827F71-BD4B-4C27-994F-A9FD012AAF72}" presName="text3" presStyleLbl="fgAcc3" presStyleIdx="6" presStyleCnt="8">
+        <dgm:presLayoutVars>
+          <dgm:chPref val="3"/>
+        </dgm:presLayoutVars>
+      </dgm:prSet>
+      <dgm:spPr/>
+      <dgm:t>
+        <a:bodyPr/>
+        <a:lstStyle/>
+        <a:p>
+          <a:endParaRPr lang="en-US"/>
+        </a:p>
+      </dgm:t>
+    </dgm:pt>
+    <dgm:pt modelId="{41E9E1B3-C577-4E7F-86D7-C65D8EC836C8}" type="pres">
+      <dgm:prSet presAssocID="{2B827F71-BD4B-4C27-994F-A9FD012AAF72}" presName="hierChild4" presStyleCnt="0"/>
+      <dgm:spPr/>
+    </dgm:pt>
+    <dgm:pt modelId="{9EF4A443-C70D-4105-BD5C-F7BFE8A59D1C}" type="pres">
+      <dgm:prSet presAssocID="{DAFBFE8A-DC9A-4C1B-A964-65303BD5683E}" presName="Name23" presStyleLbl="parChTrans1D4" presStyleIdx="6" presStyleCnt="9"/>
+      <dgm:spPr/>
+      <dgm:t>
+        <a:bodyPr/>
+        <a:lstStyle/>
+        <a:p>
+          <a:endParaRPr lang="en-US"/>
+        </a:p>
+      </dgm:t>
+    </dgm:pt>
+    <dgm:pt modelId="{967BB5FB-045C-4B28-8F80-DE32BBA7265B}" type="pres">
+      <dgm:prSet presAssocID="{2D822117-3A27-43A1-8EFC-B38E86E130F6}" presName="hierRoot4" presStyleCnt="0"/>
+      <dgm:spPr/>
+    </dgm:pt>
+    <dgm:pt modelId="{BEB9CFB5-B327-4AD3-8D91-322532D2D027}" type="pres">
+      <dgm:prSet presAssocID="{2D822117-3A27-43A1-8EFC-B38E86E130F6}" presName="composite4" presStyleCnt="0"/>
+      <dgm:spPr/>
+    </dgm:pt>
+    <dgm:pt modelId="{041018A3-45AF-4699-B093-C1C72B2C10F1}" type="pres">
+      <dgm:prSet presAssocID="{2D822117-3A27-43A1-8EFC-B38E86E130F6}" presName="background4" presStyleLbl="node4" presStyleIdx="6" presStyleCnt="9"/>
+      <dgm:spPr/>
+    </dgm:pt>
+    <dgm:pt modelId="{20B38A1F-0061-41D4-BFF1-0B59440F0B20}" type="pres">
+      <dgm:prSet presAssocID="{2D822117-3A27-43A1-8EFC-B38E86E130F6}" presName="text4" presStyleLbl="fgAcc4" presStyleIdx="6" presStyleCnt="9">
+        <dgm:presLayoutVars>
+          <dgm:chPref val="3"/>
+        </dgm:presLayoutVars>
+      </dgm:prSet>
+      <dgm:spPr/>
+      <dgm:t>
+        <a:bodyPr/>
+        <a:lstStyle/>
+        <a:p>
+          <a:endParaRPr lang="en-US"/>
+        </a:p>
+      </dgm:t>
+    </dgm:pt>
     <dgm:pt modelId="{C8A786B1-8048-4925-8823-5A61E999D4FE}" type="pres">
       <dgm:prSet presAssocID="{2D822117-3A27-43A1-8EFC-B38E86E130F6}" presName="hierChild5" presStyleCnt="0"/>
       <dgm:spPr/>
@@ -5204,6 +5412,13 @@
     <dgm:pt modelId="{D11E734E-FAAA-4665-B742-408D48ED0D2E}" type="pres">
       <dgm:prSet presAssocID="{02BD72B2-4324-4F61-83C5-0DFF67562C8C}" presName="Name23" presStyleLbl="parChTrans1D4" presStyleIdx="7" presStyleCnt="9"/>
       <dgm:spPr/>
+      <dgm:t>
+        <a:bodyPr/>
+        <a:lstStyle/>
+        <a:p>
+          <a:endParaRPr lang="en-US"/>
+        </a:p>
+      </dgm:t>
     </dgm:pt>
     <dgm:pt modelId="{8A04CED9-F4FD-4809-A6DB-543821E2C10B}" type="pres">
       <dgm:prSet presAssocID="{1D7B47C1-CE9C-4145-8E3E-F5FE9E4B38C8}" presName="hierRoot4" presStyleCnt="0"/>
@@ -5224,6 +5439,13 @@
         </dgm:presLayoutVars>
       </dgm:prSet>
       <dgm:spPr/>
+      <dgm:t>
+        <a:bodyPr/>
+        <a:lstStyle/>
+        <a:p>
+          <a:endParaRPr lang="en-US"/>
+        </a:p>
+      </dgm:t>
     </dgm:pt>
     <dgm:pt modelId="{C88432AB-59D3-4C3B-BB71-CEDEB87C876F}" type="pres">
       <dgm:prSet presAssocID="{1D7B47C1-CE9C-4145-8E3E-F5FE9E4B38C8}" presName="hierChild5" presStyleCnt="0"/>
@@ -5232,6 +5454,13 @@
     <dgm:pt modelId="{55D60E9B-AA3B-4454-9CBC-34D34BF82E6C}" type="pres">
       <dgm:prSet presAssocID="{F2866581-3AC7-4ED0-BC0F-D23939985090}" presName="Name17" presStyleLbl="parChTrans1D3" presStyleIdx="7" presStyleCnt="8"/>
       <dgm:spPr/>
+      <dgm:t>
+        <a:bodyPr/>
+        <a:lstStyle/>
+        <a:p>
+          <a:endParaRPr lang="en-US"/>
+        </a:p>
+      </dgm:t>
     </dgm:pt>
     <dgm:pt modelId="{2BD5B36F-B9E3-4ED9-92F2-25C20428608F}" type="pres">
       <dgm:prSet presAssocID="{ACE10917-B30B-4146-83EA-C9F0A592E227}" presName="hierRoot3" presStyleCnt="0"/>
@@ -5252,6 +5481,13 @@
         </dgm:presLayoutVars>
       </dgm:prSet>
       <dgm:spPr/>
+      <dgm:t>
+        <a:bodyPr/>
+        <a:lstStyle/>
+        <a:p>
+          <a:endParaRPr lang="en-US"/>
+        </a:p>
+      </dgm:t>
     </dgm:pt>
     <dgm:pt modelId="{6D646E5B-8328-4592-91DF-364D445A5FDD}" type="pres">
       <dgm:prSet presAssocID="{ACE10917-B30B-4146-83EA-C9F0A592E227}" presName="hierChild4" presStyleCnt="0"/>
@@ -5260,6 +5496,13 @@
     <dgm:pt modelId="{23AB0446-5AE6-457A-B0A7-004797AEDDD9}" type="pres">
       <dgm:prSet presAssocID="{1289939D-0C8F-4F06-8AFE-2392844772A4}" presName="Name23" presStyleLbl="parChTrans1D4" presStyleIdx="8" presStyleCnt="9"/>
       <dgm:spPr/>
+      <dgm:t>
+        <a:bodyPr/>
+        <a:lstStyle/>
+        <a:p>
+          <a:endParaRPr lang="en-US"/>
+        </a:p>
+      </dgm:t>
     </dgm:pt>
     <dgm:pt modelId="{6E20DF14-B3A7-45F3-BB83-6DFED4B9B1C6}" type="pres">
       <dgm:prSet presAssocID="{339B05F2-41D5-4412-BA57-1CD5602EFCF9}" presName="hierRoot4" presStyleCnt="0"/>
@@ -5280,6 +5523,13 @@
         </dgm:presLayoutVars>
       </dgm:prSet>
       <dgm:spPr/>
+      <dgm:t>
+        <a:bodyPr/>
+        <a:lstStyle/>
+        <a:p>
+          <a:endParaRPr lang="en-US"/>
+        </a:p>
+      </dgm:t>
     </dgm:pt>
     <dgm:pt modelId="{42F3E630-F586-4423-84DF-6AF51910B493}" type="pres">
       <dgm:prSet presAssocID="{339B05F2-41D5-4412-BA57-1CD5602EFCF9}" presName="hierChild5" presStyleCnt="0"/>
@@ -5287,69 +5537,69 @@
     </dgm:pt>
   </dgm:ptLst>
   <dgm:cxnLst>
+    <dgm:cxn modelId="{B131B415-C377-499C-899D-1AB270CC6269}" srcId="{138477FA-333B-4AB0-980B-48446CB1EFD2}" destId="{2B827F71-BD4B-4C27-994F-A9FD012AAF72}" srcOrd="1" destOrd="0" parTransId="{B59F3437-6872-40D3-9770-9B57C873B960}" sibTransId="{0866DAB3-A626-4CA3-A6C2-FAE162BE0ABC}"/>
+    <dgm:cxn modelId="{384837A1-A162-48EB-BED4-0CDB80A32B54}" type="presOf" srcId="{7ED6A327-88D1-46FF-A3E8-603F61FADD33}" destId="{170E11C5-0055-4400-9473-98D537C6E739}" srcOrd="0" destOrd="0" presId="urn:microsoft.com/office/officeart/2005/8/layout/hierarchy1"/>
+    <dgm:cxn modelId="{FF0A5228-A696-46C0-A751-CA37098747CE}" srcId="{138477FA-333B-4AB0-980B-48446CB1EFD2}" destId="{ACE10917-B30B-4146-83EA-C9F0A592E227}" srcOrd="2" destOrd="0" parTransId="{F2866581-3AC7-4ED0-BC0F-D23939985090}" sibTransId="{862B248F-1056-47B9-BD57-B2A91736E727}"/>
+    <dgm:cxn modelId="{0B61833F-A565-46A6-92D2-4E00C8238B3D}" srcId="{2F0FB5DE-5A9D-4D3D-A583-7FA014441C51}" destId="{FD61C736-F33D-4CBD-AEF7-A4086FCC0359}" srcOrd="1" destOrd="0" parTransId="{5B4241F5-0257-4789-809D-0F69B968803A}" sibTransId="{0663F4C9-0476-4184-ACFD-C2EFC8A87D34}"/>
+    <dgm:cxn modelId="{828853B7-EA12-476F-BB08-994F5B76ED87}" type="presOf" srcId="{DE0F42CF-E108-4814-A7F2-EDC93A86437C}" destId="{AB53B3F7-4ADE-4D73-B93A-EA9B9713E1BD}" srcOrd="0" destOrd="0" presId="urn:microsoft.com/office/officeart/2005/8/layout/hierarchy1"/>
+    <dgm:cxn modelId="{10268D2F-DEE2-44F9-AC02-53D750D18985}" srcId="{2B827F71-BD4B-4C27-994F-A9FD012AAF72}" destId="{1D7B47C1-CE9C-4145-8E3E-F5FE9E4B38C8}" srcOrd="1" destOrd="0" parTransId="{02BD72B2-4324-4F61-83C5-0DFF67562C8C}" sibTransId="{2C1DB7DF-940F-4CDE-9D64-4491F483D566}"/>
+    <dgm:cxn modelId="{BEA3581C-034D-4A45-86AC-D47257C2F415}" type="presOf" srcId="{FD61C736-F33D-4CBD-AEF7-A4086FCC0359}" destId="{A0AA38E3-68DF-4A84-9E54-694EC5B5A638}" srcOrd="0" destOrd="0" presId="urn:microsoft.com/office/officeart/2005/8/layout/hierarchy1"/>
+    <dgm:cxn modelId="{78801215-5AC3-4939-AB8B-4B9209822749}" type="presOf" srcId="{B59F3437-6872-40D3-9770-9B57C873B960}" destId="{D582469F-B300-4441-8B7A-811F2944BE7C}" srcOrd="0" destOrd="0" presId="urn:microsoft.com/office/officeart/2005/8/layout/hierarchy1"/>
+    <dgm:cxn modelId="{E907FC1D-BD75-4FAA-9119-DD97EBB26065}" type="presOf" srcId="{8BC64FAF-A813-4AD4-8191-6615C237CB0B}" destId="{CEEDCDF0-077E-4F45-98D0-D3D7D3E62473}" srcOrd="0" destOrd="0" presId="urn:microsoft.com/office/officeart/2005/8/layout/hierarchy1"/>
+    <dgm:cxn modelId="{6CACE937-C09F-42AE-ADF0-FAFF9355646A}" type="presOf" srcId="{2B827F71-BD4B-4C27-994F-A9FD012AAF72}" destId="{1BD4006F-235B-45D5-96E7-76BD89EC9013}" srcOrd="0" destOrd="0" presId="urn:microsoft.com/office/officeart/2005/8/layout/hierarchy1"/>
+    <dgm:cxn modelId="{E36AE263-C366-4E4B-87AC-B5EAC6247AF4}" type="presOf" srcId="{7B798475-BD83-4D0F-AFB1-5F910C81D0AD}" destId="{54800A50-E45A-4E50-BBB4-0B1F2216D06C}" srcOrd="0" destOrd="0" presId="urn:microsoft.com/office/officeart/2005/8/layout/hierarchy1"/>
+    <dgm:cxn modelId="{7FFB1CCC-01B8-4B00-BAA3-401201861774}" type="presOf" srcId="{01CE2920-4FF8-4F06-B54F-C866A23161AF}" destId="{2BC45593-C227-45A5-81B8-5F15154DD736}" srcOrd="0" destOrd="0" presId="urn:microsoft.com/office/officeart/2005/8/layout/hierarchy1"/>
     <dgm:cxn modelId="{C8FE7269-9645-4BF2-ABCC-FBCA0F4F8824}" srcId="{2B827F71-BD4B-4C27-994F-A9FD012AAF72}" destId="{2D822117-3A27-43A1-8EFC-B38E86E130F6}" srcOrd="0" destOrd="0" parTransId="{DAFBFE8A-DC9A-4C1B-A964-65303BD5683E}" sibTransId="{B03020D9-D812-4ABD-9312-AC7E81C62FB5}"/>
+    <dgm:cxn modelId="{6BBD3971-43DE-4BFC-B5B6-7A8029E2EC56}" type="presOf" srcId="{F2866581-3AC7-4ED0-BC0F-D23939985090}" destId="{55D60E9B-AA3B-4454-9CBC-34D34BF82E6C}" srcOrd="0" destOrd="0" presId="urn:microsoft.com/office/officeart/2005/8/layout/hierarchy1"/>
+    <dgm:cxn modelId="{E6D8CB47-9F4B-4D44-B303-3DBF6ADC057D}" type="presOf" srcId="{2F0FB5DE-5A9D-4D3D-A583-7FA014441C51}" destId="{23EF96DB-4BC4-4BFF-A0F6-595B9165E4CE}" srcOrd="0" destOrd="0" presId="urn:microsoft.com/office/officeart/2005/8/layout/hierarchy1"/>
+    <dgm:cxn modelId="{C3B7B969-55D9-4C76-81ED-3415E4EFCCA6}" type="presOf" srcId="{882C303E-623C-4775-B440-F78631A171CF}" destId="{AAC1BB25-EDC3-49E7-8EE3-F3937B2DD4A6}" srcOrd="0" destOrd="0" presId="urn:microsoft.com/office/officeart/2005/8/layout/hierarchy1"/>
+    <dgm:cxn modelId="{3CB45037-B637-402F-9B9C-D1B379ECF0E4}" type="presOf" srcId="{C40A0E85-1A5D-4901-B167-5B8066C24751}" destId="{F7BF62A1-678B-4CCF-AAF7-B49A244B354C}" srcOrd="0" destOrd="0" presId="urn:microsoft.com/office/officeart/2005/8/layout/hierarchy1"/>
+    <dgm:cxn modelId="{838F96AE-DB51-4F4F-8528-AC917C0D2031}" type="presOf" srcId="{9D2A9343-514F-42AD-8709-9CF866F8BCB7}" destId="{1BED93CD-BA7B-4499-826C-20AE6140A068}" srcOrd="0" destOrd="0" presId="urn:microsoft.com/office/officeart/2005/8/layout/hierarchy1"/>
+    <dgm:cxn modelId="{A482DB0A-238D-4984-BA59-ABFF760224D9}" type="presOf" srcId="{3CADED54-B4D3-4261-A1AD-541372B12D05}" destId="{90BE0797-6E29-4F8F-AE1C-BBD0830C2A76}" srcOrd="0" destOrd="0" presId="urn:microsoft.com/office/officeart/2005/8/layout/hierarchy1"/>
+    <dgm:cxn modelId="{DFC9EF53-5188-41F5-9763-20AF8AE4F120}" type="presOf" srcId="{89E670CB-FC26-442F-9EC0-7897B9C461CA}" destId="{4E14D5CA-2CCD-4705-BE9B-2DADBEB928AB}" srcOrd="0" destOrd="0" presId="urn:microsoft.com/office/officeart/2005/8/layout/hierarchy1"/>
+    <dgm:cxn modelId="{A7DF06D6-66C6-4B88-B7FF-C546FBA4F4C7}" srcId="{9D2A9343-514F-42AD-8709-9CF866F8BCB7}" destId="{8BC64FAF-A813-4AD4-8191-6615C237CB0B}" srcOrd="1" destOrd="0" parTransId="{C40A0E85-1A5D-4901-B167-5B8066C24751}" sibTransId="{7306938F-FCD3-4E81-8EFE-AAF0C6F0ADAE}"/>
+    <dgm:cxn modelId="{392D1A05-5B01-45F3-8F84-36C161FF2B6A}" type="presOf" srcId="{1289939D-0C8F-4F06-8AFE-2392844772A4}" destId="{23AB0446-5AE6-457A-B0A7-004797AEDDD9}" srcOrd="0" destOrd="0" presId="urn:microsoft.com/office/officeart/2005/8/layout/hierarchy1"/>
+    <dgm:cxn modelId="{6B6B19B4-F507-4136-9DD9-8086B996F430}" srcId="{09A54D86-7716-42F8-9270-26C5A7FB1AB5}" destId="{2F0FB5DE-5A9D-4D3D-A583-7FA014441C51}" srcOrd="2" destOrd="0" parTransId="{78BC4A45-6F56-4B87-AD3D-8766ED12A7E9}" sibTransId="{ABC218F2-924F-48AC-A41C-EDBE8497CEFA}"/>
     <dgm:cxn modelId="{528DBD48-EBD5-40C5-BFDB-EA4DF5133D6D}" type="presOf" srcId="{DAFBFE8A-DC9A-4C1B-A964-65303BD5683E}" destId="{9EF4A443-C70D-4105-BD5C-F7BFE8A59D1C}" srcOrd="0" destOrd="0" presId="urn:microsoft.com/office/officeart/2005/8/layout/hierarchy1"/>
-    <dgm:cxn modelId="{0B61833F-A565-46A6-92D2-4E00C8238B3D}" srcId="{2F0FB5DE-5A9D-4D3D-A583-7FA014441C51}" destId="{FD61C736-F33D-4CBD-AEF7-A4086FCC0359}" srcOrd="1" destOrd="0" parTransId="{5B4241F5-0257-4789-809D-0F69B968803A}" sibTransId="{0663F4C9-0476-4184-ACFD-C2EFC8A87D34}"/>
+    <dgm:cxn modelId="{A2381513-6DDC-4B0E-A519-FBC73FB00DB5}" type="presOf" srcId="{14CFBF8C-E5C8-41C3-B10F-823F08537A30}" destId="{D141A3F7-7E44-4D07-A3E8-0F0B66B87235}" srcOrd="0" destOrd="0" presId="urn:microsoft.com/office/officeart/2005/8/layout/hierarchy1"/>
+    <dgm:cxn modelId="{61CBF262-1701-4942-8215-72BAECA4F836}" srcId="{2F0FB5DE-5A9D-4D3D-A583-7FA014441C51}" destId="{A9C2D848-281E-42B3-84EF-C2D5CFE7CF11}" srcOrd="0" destOrd="0" parTransId="{95EA9144-B8E2-463C-B4F4-77B55A351B27}" sibTransId="{A3039733-AC89-4195-BC42-F5D851217324}"/>
+    <dgm:cxn modelId="{A7DF2647-DAF1-4391-9A47-D571679FEC04}" type="presOf" srcId="{B920770E-FA6C-460C-B769-CE9556253D2A}" destId="{88AA3B31-4916-4739-A91F-200CD5999CC5}" srcOrd="0" destOrd="0" presId="urn:microsoft.com/office/officeart/2005/8/layout/hierarchy1"/>
+    <dgm:cxn modelId="{67F027CB-A13F-43F8-BE68-278684D3F700}" type="presOf" srcId="{7C659F5E-D353-4CF5-B948-914073F6DCF2}" destId="{9D46FDFC-20E4-417D-9CF1-5E98325195CA}" srcOrd="0" destOrd="0" presId="urn:microsoft.com/office/officeart/2005/8/layout/hierarchy1"/>
+    <dgm:cxn modelId="{77A301FA-6536-4A26-B293-39A00D0D5266}" srcId="{8BC64FAF-A813-4AD4-8191-6615C237CB0B}" destId="{01CE2920-4FF8-4F06-B54F-C866A23161AF}" srcOrd="0" destOrd="0" parTransId="{882C303E-623C-4775-B440-F78631A171CF}" sibTransId="{A4367CDD-8779-40D5-9DAC-F5C80B734BD1}"/>
+    <dgm:cxn modelId="{7613FA8F-CB54-49A6-9ED0-E657AF8589BE}" type="presOf" srcId="{78BC4A45-6F56-4B87-AD3D-8766ED12A7E9}" destId="{F56E999E-66FD-4637-AD33-5AC8B79F1842}" srcOrd="0" destOrd="0" presId="urn:microsoft.com/office/officeart/2005/8/layout/hierarchy1"/>
+    <dgm:cxn modelId="{60D571CC-24DF-4AB9-818D-2824BB184066}" type="presOf" srcId="{138477FA-333B-4AB0-980B-48446CB1EFD2}" destId="{A16E1DCD-7FAB-448D-A679-39CB0A27E971}" srcOrd="0" destOrd="0" presId="urn:microsoft.com/office/officeart/2005/8/layout/hierarchy1"/>
+    <dgm:cxn modelId="{4518AD20-6361-4899-B623-AB14393967BF}" type="presOf" srcId="{0512A5C5-BAFE-453C-A72D-17CF9942141F}" destId="{4E505D1B-0D9F-4C67-92E2-E88607025BC9}" srcOrd="0" destOrd="0" presId="urn:microsoft.com/office/officeart/2005/8/layout/hierarchy1"/>
+    <dgm:cxn modelId="{F35596FD-9490-43AF-B7A0-8A492ADA5752}" type="presOf" srcId="{C5A8DAA0-4B18-4426-8C7F-462FA4648194}" destId="{E98A6A60-0C29-4EEF-8400-0A7B65646E0C}" srcOrd="0" destOrd="0" presId="urn:microsoft.com/office/officeart/2005/8/layout/hierarchy1"/>
+    <dgm:cxn modelId="{890F1C2E-F4C5-4BC6-A35E-D913FDB2E16F}" type="presOf" srcId="{B01C31C9-35B1-41F1-BCF9-106809662280}" destId="{5496AA36-6C29-4402-87AE-3BA3F7F7FB10}" srcOrd="0" destOrd="0" presId="urn:microsoft.com/office/officeart/2005/8/layout/hierarchy1"/>
+    <dgm:cxn modelId="{B1B38C92-BD8A-499B-86C3-B3CE4DAA9765}" srcId="{BEAA0A0E-16F1-46B3-BD98-AE1752A63BC9}" destId="{9D2A9343-514F-42AD-8709-9CF866F8BCB7}" srcOrd="0" destOrd="0" parTransId="{96054D28-CADE-4A78-B891-56F3D6FFCF15}" sibTransId="{8C62D617-D94B-4FDA-93A5-DCA7BD708CC5}"/>
     <dgm:cxn modelId="{8009B378-1527-47CC-B067-9A41FB6D5F47}" type="presOf" srcId="{339B05F2-41D5-4412-BA57-1CD5602EFCF9}" destId="{99465838-EE7D-4B2A-8919-8987589342F5}" srcOrd="0" destOrd="0" presId="urn:microsoft.com/office/officeart/2005/8/layout/hierarchy1"/>
-    <dgm:cxn modelId="{60D571CC-24DF-4AB9-818D-2824BB184066}" type="presOf" srcId="{138477FA-333B-4AB0-980B-48446CB1EFD2}" destId="{A16E1DCD-7FAB-448D-A679-39CB0A27E971}" srcOrd="0" destOrd="0" presId="urn:microsoft.com/office/officeart/2005/8/layout/hierarchy1"/>
+    <dgm:cxn modelId="{33547988-260D-4418-A2B1-53C131789B24}" srcId="{ACE10917-B30B-4146-83EA-C9F0A592E227}" destId="{339B05F2-41D5-4412-BA57-1CD5602EFCF9}" srcOrd="0" destOrd="0" parTransId="{1289939D-0C8F-4F06-8AFE-2392844772A4}" sibTransId="{65D50297-D684-4E5E-AFC6-8178CABF0EA1}"/>
+    <dgm:cxn modelId="{41C829BD-BEBF-4DA5-A360-8B02F6BE2B9A}" type="presOf" srcId="{ACE10917-B30B-4146-83EA-C9F0A592E227}" destId="{E6BB79A1-F5C2-472E-9DBE-FF68A68660AB}" srcOrd="0" destOrd="0" presId="urn:microsoft.com/office/officeart/2005/8/layout/hierarchy1"/>
+    <dgm:cxn modelId="{7FC39CBF-536A-4E22-A98D-5A4F4DAEB769}" type="presOf" srcId="{18BBD30F-9172-4E7D-BCD3-A823A8A46FAB}" destId="{E655C419-8C5B-41BD-B382-ADDB1BF775E2}" srcOrd="0" destOrd="0" presId="urn:microsoft.com/office/officeart/2005/8/layout/hierarchy1"/>
+    <dgm:cxn modelId="{5E7D29A7-14DA-496D-B5DA-CAFA7C94FB8D}" srcId="{9D2A9343-514F-42AD-8709-9CF866F8BCB7}" destId="{09A54D86-7716-42F8-9270-26C5A7FB1AB5}" srcOrd="0" destOrd="0" parTransId="{2943FB02-01BF-4826-82C4-C47541C199F8}" sibTransId="{14552CD9-63B0-4C89-8D4C-6E71B622B796}"/>
+    <dgm:cxn modelId="{4E0E4CF2-1C6B-4F36-938E-496AB2C18E2F}" type="presOf" srcId="{2D822117-3A27-43A1-8EFC-B38E86E130F6}" destId="{20B38A1F-0061-41D4-BFF1-0B59440F0B20}" srcOrd="0" destOrd="0" presId="urn:microsoft.com/office/officeart/2005/8/layout/hierarchy1"/>
+    <dgm:cxn modelId="{F97BA8FF-79AE-4CB1-A679-7BD31709A0EB}" type="presOf" srcId="{09A54D86-7716-42F8-9270-26C5A7FB1AB5}" destId="{6E6EC764-966F-4CBB-8AD4-11EFBFEC79FB}" srcOrd="0" destOrd="0" presId="urn:microsoft.com/office/officeart/2005/8/layout/hierarchy1"/>
+    <dgm:cxn modelId="{8BCAAC7D-5327-4792-8564-A8CC38C41DB1}" srcId="{0A62678E-4B8E-46FF-879A-8D0F44F69EE8}" destId="{14CFBF8C-E5C8-41C3-B10F-823F08537A30}" srcOrd="0" destOrd="0" parTransId="{9584E3D9-C2FC-43BF-B271-EDFDC2B8A33B}" sibTransId="{8A97D1B0-477E-436C-B094-99996F9CDF78}"/>
+    <dgm:cxn modelId="{038917AC-77B8-4604-BE77-E81CF95DF1E4}" type="presOf" srcId="{12C8207D-EC38-4E58-85E9-76B29A6DE692}" destId="{E4C5F0FD-1D15-431E-A26A-4A8BBF1C5A2A}" srcOrd="0" destOrd="0" presId="urn:microsoft.com/office/officeart/2005/8/layout/hierarchy1"/>
+    <dgm:cxn modelId="{0587B5BE-670F-4C96-AE7D-EFC268C68FC5}" type="presOf" srcId="{BEAA0A0E-16F1-46B3-BD98-AE1752A63BC9}" destId="{62D23EA1-F578-4E79-8C47-28F032438B69}" srcOrd="0" destOrd="0" presId="urn:microsoft.com/office/officeart/2005/8/layout/hierarchy1"/>
+    <dgm:cxn modelId="{24E03485-7239-421A-8285-947313919829}" srcId="{54C6BB90-3D9C-4A89-9930-42026D0D5674}" destId="{18BBD30F-9172-4E7D-BCD3-A823A8A46FAB}" srcOrd="1" destOrd="0" parTransId="{C5A8DAA0-4B18-4426-8C7F-462FA4648194}" sibTransId="{94274BD3-D2B4-47A3-85B8-83BF606F9DC3}"/>
+    <dgm:cxn modelId="{68E9FD7A-05F0-4666-9075-7DFC3A2DBFCC}" srcId="{138477FA-333B-4AB0-980B-48446CB1EFD2}" destId="{7B798475-BD83-4D0F-AFB1-5F910C81D0AD}" srcOrd="0" destOrd="0" parTransId="{B920770E-FA6C-460C-B769-CE9556253D2A}" sibTransId="{C5AE4539-05F1-43C6-B7DF-48767085ADA4}"/>
+    <dgm:cxn modelId="{FA546E11-DB08-4A4F-8A91-895F69507301}" type="presOf" srcId="{9584E3D9-C2FC-43BF-B271-EDFDC2B8A33B}" destId="{A20323C0-B8E1-46AD-98C8-3C462D62EC3D}" srcOrd="0" destOrd="0" presId="urn:microsoft.com/office/officeart/2005/8/layout/hierarchy1"/>
     <dgm:cxn modelId="{620A554B-A187-4531-B4AB-E8D859EB5BFA}" type="presOf" srcId="{A9C2D848-281E-42B3-84EF-C2D5CFE7CF11}" destId="{1DA59ED9-F503-4A52-82DA-D69BBEAAF564}" srcOrd="0" destOrd="0" presId="urn:microsoft.com/office/officeart/2005/8/layout/hierarchy1"/>
-    <dgm:cxn modelId="{E36AE263-C366-4E4B-87AC-B5EAC6247AF4}" type="presOf" srcId="{7B798475-BD83-4D0F-AFB1-5F910C81D0AD}" destId="{54800A50-E45A-4E50-BBB4-0B1F2216D06C}" srcOrd="0" destOrd="0" presId="urn:microsoft.com/office/officeart/2005/8/layout/hierarchy1"/>
+    <dgm:cxn modelId="{75FE6577-651A-47EF-824B-05705CE6FACC}" srcId="{09A54D86-7716-42F8-9270-26C5A7FB1AB5}" destId="{0A62678E-4B8E-46FF-879A-8D0F44F69EE8}" srcOrd="1" destOrd="0" parTransId="{7ED6A327-88D1-46FF-A3E8-603F61FADD33}" sibTransId="{B7B973F8-A825-4E90-8369-052C57BCDE4E}"/>
+    <dgm:cxn modelId="{1EA6EF1C-B9D2-412A-86E6-2E9CF7F6E325}" type="presOf" srcId="{02BD72B2-4324-4F61-83C5-0DFF67562C8C}" destId="{D11E734E-FAAA-4665-B742-408D48ED0D2E}" srcOrd="0" destOrd="0" presId="urn:microsoft.com/office/officeart/2005/8/layout/hierarchy1"/>
+    <dgm:cxn modelId="{54598E3D-9480-4F6D-840A-D0BA40B4AC89}" type="presOf" srcId="{1D7B47C1-CE9C-4145-8E3E-F5FE9E4B38C8}" destId="{EECE5441-8010-4E85-A0EA-4D720BFCD8DD}" srcOrd="0" destOrd="0" presId="urn:microsoft.com/office/officeart/2005/8/layout/hierarchy1"/>
+    <dgm:cxn modelId="{0C02E8B9-ED15-4CAF-B238-FCF4B3215805}" type="presOf" srcId="{0A62678E-4B8E-46FF-879A-8D0F44F69EE8}" destId="{D16EF9B5-7DF2-4D26-95CE-4462A6160C00}" srcOrd="0" destOrd="0" presId="urn:microsoft.com/office/officeart/2005/8/layout/hierarchy1"/>
+    <dgm:cxn modelId="{8C0B0347-51A6-44FB-B2DB-36A1CE16B4EA}" srcId="{09A54D86-7716-42F8-9270-26C5A7FB1AB5}" destId="{54C6BB90-3D9C-4A89-9930-42026D0D5674}" srcOrd="0" destOrd="0" parTransId="{7C659F5E-D353-4CF5-B948-914073F6DCF2}" sibTransId="{FFB717BA-0B30-446E-A839-68D5BFDA2077}"/>
+    <dgm:cxn modelId="{B9DF8F68-AABE-4F07-AC48-384AF332728B}" srcId="{54C6BB90-3D9C-4A89-9930-42026D0D5674}" destId="{89E670CB-FC26-442F-9EC0-7897B9C461CA}" srcOrd="0" destOrd="0" parTransId="{1031EEA1-B52A-44C7-A9DC-2B9C5AD68E07}" sibTransId="{262A8C66-482F-463A-88D1-1F948E5289EF}"/>
+    <dgm:cxn modelId="{93151928-C641-448D-AB2D-314256462064}" srcId="{9D2A9343-514F-42AD-8709-9CF866F8BCB7}" destId="{138477FA-333B-4AB0-980B-48446CB1EFD2}" srcOrd="2" destOrd="0" parTransId="{B01C31C9-35B1-41F1-BCF9-106809662280}" sibTransId="{76334B11-A645-44C1-91E5-27DFE3A69752}"/>
+    <dgm:cxn modelId="{944B1952-0F52-4351-BABC-A706F848D4D9}" srcId="{8BC64FAF-A813-4AD4-8191-6615C237CB0B}" destId="{3CADED54-B4D3-4261-A1AD-541372B12D05}" srcOrd="1" destOrd="0" parTransId="{DE0F42CF-E108-4814-A7F2-EDC93A86437C}" sibTransId="{3C5BD416-71D9-4453-8ABC-13A6E5F56FDA}"/>
     <dgm:cxn modelId="{3ABD9432-AF6A-44AC-92A1-AC88BE01881A}" type="presOf" srcId="{5B4241F5-0257-4789-809D-0F69B968803A}" destId="{F402A8AC-4543-4936-9679-A33E5C50761A}" srcOrd="0" destOrd="0" presId="urn:microsoft.com/office/officeart/2005/8/layout/hierarchy1"/>
-    <dgm:cxn modelId="{038917AC-77B8-4604-BE77-E81CF95DF1E4}" type="presOf" srcId="{12C8207D-EC38-4E58-85E9-76B29A6DE692}" destId="{E4C5F0FD-1D15-431E-A26A-4A8BBF1C5A2A}" srcOrd="0" destOrd="0" presId="urn:microsoft.com/office/officeart/2005/8/layout/hierarchy1"/>
-    <dgm:cxn modelId="{A2381513-6DDC-4B0E-A519-FBC73FB00DB5}" type="presOf" srcId="{14CFBF8C-E5C8-41C3-B10F-823F08537A30}" destId="{D141A3F7-7E44-4D07-A3E8-0F0B66B87235}" srcOrd="0" destOrd="0" presId="urn:microsoft.com/office/officeart/2005/8/layout/hierarchy1"/>
     <dgm:cxn modelId="{BA81B937-FF06-4971-AD51-E9F00A91CDDD}" srcId="{3CADED54-B4D3-4261-A1AD-541372B12D05}" destId="{0512A5C5-BAFE-453C-A72D-17CF9942141F}" srcOrd="0" destOrd="0" parTransId="{12C8207D-EC38-4E58-85E9-76B29A6DE692}" sibTransId="{D10F5B90-8AE4-41BB-807C-19D6AD5F5278}"/>
-    <dgm:cxn modelId="{68E9FD7A-05F0-4666-9075-7DFC3A2DBFCC}" srcId="{138477FA-333B-4AB0-980B-48446CB1EFD2}" destId="{7B798475-BD83-4D0F-AFB1-5F910C81D0AD}" srcOrd="0" destOrd="0" parTransId="{B920770E-FA6C-460C-B769-CE9556253D2A}" sibTransId="{C5AE4539-05F1-43C6-B7DF-48767085ADA4}"/>
-    <dgm:cxn modelId="{54598E3D-9480-4F6D-840A-D0BA40B4AC89}" type="presOf" srcId="{1D7B47C1-CE9C-4145-8E3E-F5FE9E4B38C8}" destId="{EECE5441-8010-4E85-A0EA-4D720BFCD8DD}" srcOrd="0" destOrd="0" presId="urn:microsoft.com/office/officeart/2005/8/layout/hierarchy1"/>
-    <dgm:cxn modelId="{4518AD20-6361-4899-B623-AB14393967BF}" type="presOf" srcId="{0512A5C5-BAFE-453C-A72D-17CF9942141F}" destId="{4E505D1B-0D9F-4C67-92E2-E88607025BC9}" srcOrd="0" destOrd="0" presId="urn:microsoft.com/office/officeart/2005/8/layout/hierarchy1"/>
-    <dgm:cxn modelId="{890F1C2E-F4C5-4BC6-A35E-D913FDB2E16F}" type="presOf" srcId="{B01C31C9-35B1-41F1-BCF9-106809662280}" destId="{5496AA36-6C29-4402-87AE-3BA3F7F7FB10}" srcOrd="0" destOrd="0" presId="urn:microsoft.com/office/officeart/2005/8/layout/hierarchy1"/>
+    <dgm:cxn modelId="{49889051-E407-4EEC-BF06-5184CBA92973}" type="presOf" srcId="{1031EEA1-B52A-44C7-A9DC-2B9C5AD68E07}" destId="{251684E0-5257-4EAB-92E2-A7CDFF9667C4}" srcOrd="0" destOrd="0" presId="urn:microsoft.com/office/officeart/2005/8/layout/hierarchy1"/>
+    <dgm:cxn modelId="{9446B3ED-9692-4C65-8037-35C0635ECDB8}" type="presOf" srcId="{54C6BB90-3D9C-4A89-9930-42026D0D5674}" destId="{139687CB-FA19-419B-A506-F4C782B93EE8}" srcOrd="0" destOrd="0" presId="urn:microsoft.com/office/officeart/2005/8/layout/hierarchy1"/>
+    <dgm:cxn modelId="{B4FDC861-C3A9-4371-ABE2-333AEF38184E}" type="presOf" srcId="{95EA9144-B8E2-463C-B4F4-77B55A351B27}" destId="{F9404CB4-28B5-4983-A516-3F7A94617B67}" srcOrd="0" destOrd="0" presId="urn:microsoft.com/office/officeart/2005/8/layout/hierarchy1"/>
     <dgm:cxn modelId="{B0FD92EB-4D55-41E2-813F-08D01DA30EEB}" type="presOf" srcId="{2943FB02-01BF-4826-82C4-C47541C199F8}" destId="{C18B3AE3-C56B-4C46-B2FE-8FC0FF516083}" srcOrd="0" destOrd="0" presId="urn:microsoft.com/office/officeart/2005/8/layout/hierarchy1"/>
-    <dgm:cxn modelId="{838F96AE-DB51-4F4F-8528-AC917C0D2031}" type="presOf" srcId="{9D2A9343-514F-42AD-8709-9CF866F8BCB7}" destId="{1BED93CD-BA7B-4499-826C-20AE6140A068}" srcOrd="0" destOrd="0" presId="urn:microsoft.com/office/officeart/2005/8/layout/hierarchy1"/>
-    <dgm:cxn modelId="{E907FC1D-BD75-4FAA-9119-DD97EBB26065}" type="presOf" srcId="{8BC64FAF-A813-4AD4-8191-6615C237CB0B}" destId="{CEEDCDF0-077E-4F45-98D0-D3D7D3E62473}" srcOrd="0" destOrd="0" presId="urn:microsoft.com/office/officeart/2005/8/layout/hierarchy1"/>
-    <dgm:cxn modelId="{828853B7-EA12-476F-BB08-994F5B76ED87}" type="presOf" srcId="{DE0F42CF-E108-4814-A7F2-EDC93A86437C}" destId="{AB53B3F7-4ADE-4D73-B93A-EA9B9713E1BD}" srcOrd="0" destOrd="0" presId="urn:microsoft.com/office/officeart/2005/8/layout/hierarchy1"/>
-    <dgm:cxn modelId="{77A301FA-6536-4A26-B293-39A00D0D5266}" srcId="{8BC64FAF-A813-4AD4-8191-6615C237CB0B}" destId="{01CE2920-4FF8-4F06-B54F-C866A23161AF}" srcOrd="0" destOrd="0" parTransId="{882C303E-623C-4775-B440-F78631A171CF}" sibTransId="{A4367CDD-8779-40D5-9DAC-F5C80B734BD1}"/>
-    <dgm:cxn modelId="{3CB45037-B637-402F-9B9C-D1B379ECF0E4}" type="presOf" srcId="{C40A0E85-1A5D-4901-B167-5B8066C24751}" destId="{F7BF62A1-678B-4CCF-AAF7-B49A244B354C}" srcOrd="0" destOrd="0" presId="urn:microsoft.com/office/officeart/2005/8/layout/hierarchy1"/>
-    <dgm:cxn modelId="{67F027CB-A13F-43F8-BE68-278684D3F700}" type="presOf" srcId="{7C659F5E-D353-4CF5-B948-914073F6DCF2}" destId="{9D46FDFC-20E4-417D-9CF1-5E98325195CA}" srcOrd="0" destOrd="0" presId="urn:microsoft.com/office/officeart/2005/8/layout/hierarchy1"/>
-    <dgm:cxn modelId="{7FC39CBF-536A-4E22-A98D-5A4F4DAEB769}" type="presOf" srcId="{18BBD30F-9172-4E7D-BCD3-A823A8A46FAB}" destId="{E655C419-8C5B-41BD-B382-ADDB1BF775E2}" srcOrd="0" destOrd="0" presId="urn:microsoft.com/office/officeart/2005/8/layout/hierarchy1"/>
-    <dgm:cxn modelId="{F35596FD-9490-43AF-B7A0-8A492ADA5752}" type="presOf" srcId="{C5A8DAA0-4B18-4426-8C7F-462FA4648194}" destId="{E98A6A60-0C29-4EEF-8400-0A7B65646E0C}" srcOrd="0" destOrd="0" presId="urn:microsoft.com/office/officeart/2005/8/layout/hierarchy1"/>
-    <dgm:cxn modelId="{5E7D29A7-14DA-496D-B5DA-CAFA7C94FB8D}" srcId="{9D2A9343-514F-42AD-8709-9CF866F8BCB7}" destId="{09A54D86-7716-42F8-9270-26C5A7FB1AB5}" srcOrd="0" destOrd="0" parTransId="{2943FB02-01BF-4826-82C4-C47541C199F8}" sibTransId="{14552CD9-63B0-4C89-8D4C-6E71B622B796}"/>
-    <dgm:cxn modelId="{9446B3ED-9692-4C65-8037-35C0635ECDB8}" type="presOf" srcId="{54C6BB90-3D9C-4A89-9930-42026D0D5674}" destId="{139687CB-FA19-419B-A506-F4C782B93EE8}" srcOrd="0" destOrd="0" presId="urn:microsoft.com/office/officeart/2005/8/layout/hierarchy1"/>
-    <dgm:cxn modelId="{F97BA8FF-79AE-4CB1-A679-7BD31709A0EB}" type="presOf" srcId="{09A54D86-7716-42F8-9270-26C5A7FB1AB5}" destId="{6E6EC764-966F-4CBB-8AD4-11EFBFEC79FB}" srcOrd="0" destOrd="0" presId="urn:microsoft.com/office/officeart/2005/8/layout/hierarchy1"/>
-    <dgm:cxn modelId="{944B1952-0F52-4351-BABC-A706F848D4D9}" srcId="{8BC64FAF-A813-4AD4-8191-6615C237CB0B}" destId="{3CADED54-B4D3-4261-A1AD-541372B12D05}" srcOrd="1" destOrd="0" parTransId="{DE0F42CF-E108-4814-A7F2-EDC93A86437C}" sibTransId="{3C5BD416-71D9-4453-8ABC-13A6E5F56FDA}"/>
-    <dgm:cxn modelId="{BEA3581C-034D-4A45-86AC-D47257C2F415}" type="presOf" srcId="{FD61C736-F33D-4CBD-AEF7-A4086FCC0359}" destId="{A0AA38E3-68DF-4A84-9E54-694EC5B5A638}" srcOrd="0" destOrd="0" presId="urn:microsoft.com/office/officeart/2005/8/layout/hierarchy1"/>
-    <dgm:cxn modelId="{41C829BD-BEBF-4DA5-A360-8B02F6BE2B9A}" type="presOf" srcId="{ACE10917-B30B-4146-83EA-C9F0A592E227}" destId="{E6BB79A1-F5C2-472E-9DBE-FF68A68660AB}" srcOrd="0" destOrd="0" presId="urn:microsoft.com/office/officeart/2005/8/layout/hierarchy1"/>
-    <dgm:cxn modelId="{392D1A05-5B01-45F3-8F84-36C161FF2B6A}" type="presOf" srcId="{1289939D-0C8F-4F06-8AFE-2392844772A4}" destId="{23AB0446-5AE6-457A-B0A7-004797AEDDD9}" srcOrd="0" destOrd="0" presId="urn:microsoft.com/office/officeart/2005/8/layout/hierarchy1"/>
-    <dgm:cxn modelId="{6BBD3971-43DE-4BFC-B5B6-7A8029E2EC56}" type="presOf" srcId="{F2866581-3AC7-4ED0-BC0F-D23939985090}" destId="{55D60E9B-AA3B-4454-9CBC-34D34BF82E6C}" srcOrd="0" destOrd="0" presId="urn:microsoft.com/office/officeart/2005/8/layout/hierarchy1"/>
-    <dgm:cxn modelId="{B4FDC861-C3A9-4371-ABE2-333AEF38184E}" type="presOf" srcId="{95EA9144-B8E2-463C-B4F4-77B55A351B27}" destId="{F9404CB4-28B5-4983-A516-3F7A94617B67}" srcOrd="0" destOrd="0" presId="urn:microsoft.com/office/officeart/2005/8/layout/hierarchy1"/>
-    <dgm:cxn modelId="{93151928-C641-448D-AB2D-314256462064}" srcId="{9D2A9343-514F-42AD-8709-9CF866F8BCB7}" destId="{138477FA-333B-4AB0-980B-48446CB1EFD2}" srcOrd="2" destOrd="0" parTransId="{B01C31C9-35B1-41F1-BCF9-106809662280}" sibTransId="{76334B11-A645-44C1-91E5-27DFE3A69752}"/>
-    <dgm:cxn modelId="{78801215-5AC3-4939-AB8B-4B9209822749}" type="presOf" srcId="{B59F3437-6872-40D3-9770-9B57C873B960}" destId="{D582469F-B300-4441-8B7A-811F2944BE7C}" srcOrd="0" destOrd="0" presId="urn:microsoft.com/office/officeart/2005/8/layout/hierarchy1"/>
-    <dgm:cxn modelId="{B131B415-C377-499C-899D-1AB270CC6269}" srcId="{138477FA-333B-4AB0-980B-48446CB1EFD2}" destId="{2B827F71-BD4B-4C27-994F-A9FD012AAF72}" srcOrd="1" destOrd="0" parTransId="{B59F3437-6872-40D3-9770-9B57C873B960}" sibTransId="{0866DAB3-A626-4CA3-A6C2-FAE162BE0ABC}"/>
-    <dgm:cxn modelId="{10268D2F-DEE2-44F9-AC02-53D750D18985}" srcId="{2B827F71-BD4B-4C27-994F-A9FD012AAF72}" destId="{1D7B47C1-CE9C-4145-8E3E-F5FE9E4B38C8}" srcOrd="1" destOrd="0" parTransId="{02BD72B2-4324-4F61-83C5-0DFF67562C8C}" sibTransId="{2C1DB7DF-940F-4CDE-9D64-4491F483D566}"/>
-    <dgm:cxn modelId="{75FE6577-651A-47EF-824B-05705CE6FACC}" srcId="{09A54D86-7716-42F8-9270-26C5A7FB1AB5}" destId="{0A62678E-4B8E-46FF-879A-8D0F44F69EE8}" srcOrd="1" destOrd="0" parTransId="{7ED6A327-88D1-46FF-A3E8-603F61FADD33}" sibTransId="{B7B973F8-A825-4E90-8369-052C57BCDE4E}"/>
-    <dgm:cxn modelId="{49889051-E407-4EEC-BF06-5184CBA92973}" type="presOf" srcId="{1031EEA1-B52A-44C7-A9DC-2B9C5AD68E07}" destId="{251684E0-5257-4EAB-92E2-A7CDFF9667C4}" srcOrd="0" destOrd="0" presId="urn:microsoft.com/office/officeart/2005/8/layout/hierarchy1"/>
-    <dgm:cxn modelId="{A7DF2647-DAF1-4391-9A47-D571679FEC04}" type="presOf" srcId="{B920770E-FA6C-460C-B769-CE9556253D2A}" destId="{88AA3B31-4916-4739-A91F-200CD5999CC5}" srcOrd="0" destOrd="0" presId="urn:microsoft.com/office/officeart/2005/8/layout/hierarchy1"/>
-    <dgm:cxn modelId="{8C0B0347-51A6-44FB-B2DB-36A1CE16B4EA}" srcId="{09A54D86-7716-42F8-9270-26C5A7FB1AB5}" destId="{54C6BB90-3D9C-4A89-9930-42026D0D5674}" srcOrd="0" destOrd="0" parTransId="{7C659F5E-D353-4CF5-B948-914073F6DCF2}" sibTransId="{FFB717BA-0B30-446E-A839-68D5BFDA2077}"/>
-    <dgm:cxn modelId="{B1B38C92-BD8A-499B-86C3-B3CE4DAA9765}" srcId="{BEAA0A0E-16F1-46B3-BD98-AE1752A63BC9}" destId="{9D2A9343-514F-42AD-8709-9CF866F8BCB7}" srcOrd="0" destOrd="0" parTransId="{96054D28-CADE-4A78-B891-56F3D6FFCF15}" sibTransId="{8C62D617-D94B-4FDA-93A5-DCA7BD708CC5}"/>
-    <dgm:cxn modelId="{B9DF8F68-AABE-4F07-AC48-384AF332728B}" srcId="{54C6BB90-3D9C-4A89-9930-42026D0D5674}" destId="{89E670CB-FC26-442F-9EC0-7897B9C461CA}" srcOrd="0" destOrd="0" parTransId="{1031EEA1-B52A-44C7-A9DC-2B9C5AD68E07}" sibTransId="{262A8C66-482F-463A-88D1-1F948E5289EF}"/>
-    <dgm:cxn modelId="{7613FA8F-CB54-49A6-9ED0-E657AF8589BE}" type="presOf" srcId="{78BC4A45-6F56-4B87-AD3D-8766ED12A7E9}" destId="{F56E999E-66FD-4637-AD33-5AC8B79F1842}" srcOrd="0" destOrd="0" presId="urn:microsoft.com/office/officeart/2005/8/layout/hierarchy1"/>
-    <dgm:cxn modelId="{A7DF06D6-66C6-4B88-B7FF-C546FBA4F4C7}" srcId="{9D2A9343-514F-42AD-8709-9CF866F8BCB7}" destId="{8BC64FAF-A813-4AD4-8191-6615C237CB0B}" srcOrd="1" destOrd="0" parTransId="{C40A0E85-1A5D-4901-B167-5B8066C24751}" sibTransId="{7306938F-FCD3-4E81-8EFE-AAF0C6F0ADAE}"/>
-    <dgm:cxn modelId="{E6D8CB47-9F4B-4D44-B303-3DBF6ADC057D}" type="presOf" srcId="{2F0FB5DE-5A9D-4D3D-A583-7FA014441C51}" destId="{23EF96DB-4BC4-4BFF-A0F6-595B9165E4CE}" srcOrd="0" destOrd="0" presId="urn:microsoft.com/office/officeart/2005/8/layout/hierarchy1"/>
-    <dgm:cxn modelId="{24E03485-7239-421A-8285-947313919829}" srcId="{54C6BB90-3D9C-4A89-9930-42026D0D5674}" destId="{18BBD30F-9172-4E7D-BCD3-A823A8A46FAB}" srcOrd="1" destOrd="0" parTransId="{C5A8DAA0-4B18-4426-8C7F-462FA4648194}" sibTransId="{94274BD3-D2B4-47A3-85B8-83BF606F9DC3}"/>
-    <dgm:cxn modelId="{A482DB0A-238D-4984-BA59-ABFF760224D9}" type="presOf" srcId="{3CADED54-B4D3-4261-A1AD-541372B12D05}" destId="{90BE0797-6E29-4F8F-AE1C-BBD0830C2A76}" srcOrd="0" destOrd="0" presId="urn:microsoft.com/office/officeart/2005/8/layout/hierarchy1"/>
-    <dgm:cxn modelId="{FA546E11-DB08-4A4F-8A91-895F69507301}" type="presOf" srcId="{9584E3D9-C2FC-43BF-B271-EDFDC2B8A33B}" destId="{A20323C0-B8E1-46AD-98C8-3C462D62EC3D}" srcOrd="0" destOrd="0" presId="urn:microsoft.com/office/officeart/2005/8/layout/hierarchy1"/>
-    <dgm:cxn modelId="{0C02E8B9-ED15-4CAF-B238-FCF4B3215805}" type="presOf" srcId="{0A62678E-4B8E-46FF-879A-8D0F44F69EE8}" destId="{D16EF9B5-7DF2-4D26-95CE-4462A6160C00}" srcOrd="0" destOrd="0" presId="urn:microsoft.com/office/officeart/2005/8/layout/hierarchy1"/>
-    <dgm:cxn modelId="{DFC9EF53-5188-41F5-9763-20AF8AE4F120}" type="presOf" srcId="{89E670CB-FC26-442F-9EC0-7897B9C461CA}" destId="{4E14D5CA-2CCD-4705-BE9B-2DADBEB928AB}" srcOrd="0" destOrd="0" presId="urn:microsoft.com/office/officeart/2005/8/layout/hierarchy1"/>
-    <dgm:cxn modelId="{6B6B19B4-F507-4136-9DD9-8086B996F430}" srcId="{09A54D86-7716-42F8-9270-26C5A7FB1AB5}" destId="{2F0FB5DE-5A9D-4D3D-A583-7FA014441C51}" srcOrd="2" destOrd="0" parTransId="{78BC4A45-6F56-4B87-AD3D-8766ED12A7E9}" sibTransId="{ABC218F2-924F-48AC-A41C-EDBE8497CEFA}"/>
-    <dgm:cxn modelId="{C3B7B969-55D9-4C76-81ED-3415E4EFCCA6}" type="presOf" srcId="{882C303E-623C-4775-B440-F78631A171CF}" destId="{AAC1BB25-EDC3-49E7-8EE3-F3937B2DD4A6}" srcOrd="0" destOrd="0" presId="urn:microsoft.com/office/officeart/2005/8/layout/hierarchy1"/>
-    <dgm:cxn modelId="{384837A1-A162-48EB-BED4-0CDB80A32B54}" type="presOf" srcId="{7ED6A327-88D1-46FF-A3E8-603F61FADD33}" destId="{170E11C5-0055-4400-9473-98D537C6E739}" srcOrd="0" destOrd="0" presId="urn:microsoft.com/office/officeart/2005/8/layout/hierarchy1"/>
-    <dgm:cxn modelId="{8BCAAC7D-5327-4792-8564-A8CC38C41DB1}" srcId="{0A62678E-4B8E-46FF-879A-8D0F44F69EE8}" destId="{14CFBF8C-E5C8-41C3-B10F-823F08537A30}" srcOrd="0" destOrd="0" parTransId="{9584E3D9-C2FC-43BF-B271-EDFDC2B8A33B}" sibTransId="{8A97D1B0-477E-436C-B094-99996F9CDF78}"/>
-    <dgm:cxn modelId="{FF0A5228-A696-46C0-A751-CA37098747CE}" srcId="{138477FA-333B-4AB0-980B-48446CB1EFD2}" destId="{ACE10917-B30B-4146-83EA-C9F0A592E227}" srcOrd="2" destOrd="0" parTransId="{F2866581-3AC7-4ED0-BC0F-D23939985090}" sibTransId="{862B248F-1056-47B9-BD57-B2A91736E727}"/>
-    <dgm:cxn modelId="{1EA6EF1C-B9D2-412A-86E6-2E9CF7F6E325}" type="presOf" srcId="{02BD72B2-4324-4F61-83C5-0DFF67562C8C}" destId="{D11E734E-FAAA-4665-B742-408D48ED0D2E}" srcOrd="0" destOrd="0" presId="urn:microsoft.com/office/officeart/2005/8/layout/hierarchy1"/>
-    <dgm:cxn modelId="{7FFB1CCC-01B8-4B00-BAA3-401201861774}" type="presOf" srcId="{01CE2920-4FF8-4F06-B54F-C866A23161AF}" destId="{2BC45593-C227-45A5-81B8-5F15154DD736}" srcOrd="0" destOrd="0" presId="urn:microsoft.com/office/officeart/2005/8/layout/hierarchy1"/>
-    <dgm:cxn modelId="{33547988-260D-4418-A2B1-53C131789B24}" srcId="{ACE10917-B30B-4146-83EA-C9F0A592E227}" destId="{339B05F2-41D5-4412-BA57-1CD5602EFCF9}" srcOrd="0" destOrd="0" parTransId="{1289939D-0C8F-4F06-8AFE-2392844772A4}" sibTransId="{65D50297-D684-4E5E-AFC6-8178CABF0EA1}"/>
-    <dgm:cxn modelId="{6CACE937-C09F-42AE-ADF0-FAFF9355646A}" type="presOf" srcId="{2B827F71-BD4B-4C27-994F-A9FD012AAF72}" destId="{1BD4006F-235B-45D5-96E7-76BD89EC9013}" srcOrd="0" destOrd="0" presId="urn:microsoft.com/office/officeart/2005/8/layout/hierarchy1"/>
-    <dgm:cxn modelId="{0587B5BE-670F-4C96-AE7D-EFC268C68FC5}" type="presOf" srcId="{BEAA0A0E-16F1-46B3-BD98-AE1752A63BC9}" destId="{62D23EA1-F578-4E79-8C47-28F032438B69}" srcOrd="0" destOrd="0" presId="urn:microsoft.com/office/officeart/2005/8/layout/hierarchy1"/>
-    <dgm:cxn modelId="{4E0E4CF2-1C6B-4F36-938E-496AB2C18E2F}" type="presOf" srcId="{2D822117-3A27-43A1-8EFC-B38E86E130F6}" destId="{20B38A1F-0061-41D4-BFF1-0B59440F0B20}" srcOrd="0" destOrd="0" presId="urn:microsoft.com/office/officeart/2005/8/layout/hierarchy1"/>
-    <dgm:cxn modelId="{61CBF262-1701-4942-8215-72BAECA4F836}" srcId="{2F0FB5DE-5A9D-4D3D-A583-7FA014441C51}" destId="{A9C2D848-281E-42B3-84EF-C2D5CFE7CF11}" srcOrd="0" destOrd="0" parTransId="{95EA9144-B8E2-463C-B4F4-77B55A351B27}" sibTransId="{A3039733-AC89-4195-BC42-F5D851217324}"/>
     <dgm:cxn modelId="{25F6DB8A-4910-4A48-B6F5-7221330ACE83}" type="presParOf" srcId="{62D23EA1-F578-4E79-8C47-28F032438B69}" destId="{2A2D0A1F-DF5B-4D62-8359-75FED3464955}" srcOrd="0" destOrd="0" presId="urn:microsoft.com/office/officeart/2005/8/layout/hierarchy1"/>
     <dgm:cxn modelId="{52622570-4CFB-4B51-89EF-94326A200551}" type="presParOf" srcId="{2A2D0A1F-DF5B-4D62-8359-75FED3464955}" destId="{67DE11BD-B662-4088-8777-35F65D0117A2}" srcOrd="0" destOrd="0" presId="urn:microsoft.com/office/officeart/2005/8/layout/hierarchy1"/>
     <dgm:cxn modelId="{DC67793D-254B-40E8-BBBD-5A79CE4F5129}" type="presParOf" srcId="{67DE11BD-B662-4088-8777-35F65D0117A2}" destId="{E9198AC2-9187-42A7-8316-2334E731B4D9}" srcOrd="0" destOrd="0" presId="urn:microsoft.com/office/officeart/2005/8/layout/hierarchy1"/>
@@ -5770,26 +6020,6 @@
         </dgm:presLayoutVars>
       </dgm:prSet>
       <dgm:spPr/>
-    </dgm:pt>
-    <dgm:pt modelId="{2A2D0A1F-DF5B-4D62-8359-75FED3464955}" type="pres">
-      <dgm:prSet presAssocID="{9D2A9343-514F-42AD-8709-9CF866F8BCB7}" presName="hierRoot1" presStyleCnt="0"/>
-      <dgm:spPr/>
-    </dgm:pt>
-    <dgm:pt modelId="{67DE11BD-B662-4088-8777-35F65D0117A2}" type="pres">
-      <dgm:prSet presAssocID="{9D2A9343-514F-42AD-8709-9CF866F8BCB7}" presName="composite" presStyleCnt="0"/>
-      <dgm:spPr/>
-    </dgm:pt>
-    <dgm:pt modelId="{E9198AC2-9187-42A7-8316-2334E731B4D9}" type="pres">
-      <dgm:prSet presAssocID="{9D2A9343-514F-42AD-8709-9CF866F8BCB7}" presName="background" presStyleLbl="node0" presStyleIdx="0" presStyleCnt="1"/>
-      <dgm:spPr/>
-    </dgm:pt>
-    <dgm:pt modelId="{1BED93CD-BA7B-4499-826C-20AE6140A068}" type="pres">
-      <dgm:prSet presAssocID="{9D2A9343-514F-42AD-8709-9CF866F8BCB7}" presName="text" presStyleLbl="fgAcc0" presStyleIdx="0" presStyleCnt="1">
-        <dgm:presLayoutVars>
-          <dgm:chPref val="3"/>
-        </dgm:presLayoutVars>
-      </dgm:prSet>
-      <dgm:spPr/>
       <dgm:t>
         <a:bodyPr/>
         <a:lstStyle/>
@@ -5798,28 +6028,20 @@
         </a:p>
       </dgm:t>
     </dgm:pt>
-    <dgm:pt modelId="{106D85AC-B89C-441A-A093-C690B8A40C10}" type="pres">
-      <dgm:prSet presAssocID="{9D2A9343-514F-42AD-8709-9CF866F8BCB7}" presName="hierChild2" presStyleCnt="0"/>
-      <dgm:spPr/>
-    </dgm:pt>
-    <dgm:pt modelId="{C18B3AE3-C56B-4C46-B2FE-8FC0FF516083}" type="pres">
-      <dgm:prSet presAssocID="{2943FB02-01BF-4826-82C4-C47541C199F8}" presName="Name10" presStyleLbl="parChTrans1D2" presStyleIdx="0" presStyleCnt="2"/>
-      <dgm:spPr/>
-    </dgm:pt>
-    <dgm:pt modelId="{DE6675B3-14DB-4FEE-9B01-0C9CD90D5550}" type="pres">
-      <dgm:prSet presAssocID="{09A54D86-7716-42F8-9270-26C5A7FB1AB5}" presName="hierRoot2" presStyleCnt="0"/>
-      <dgm:spPr/>
-    </dgm:pt>
-    <dgm:pt modelId="{1C1140BA-586B-4D14-B29D-0094D68507D5}" type="pres">
-      <dgm:prSet presAssocID="{09A54D86-7716-42F8-9270-26C5A7FB1AB5}" presName="composite2" presStyleCnt="0"/>
-      <dgm:spPr/>
-    </dgm:pt>
-    <dgm:pt modelId="{0FAC0412-8017-4535-AC2C-8A81766BC88D}" type="pres">
-      <dgm:prSet presAssocID="{09A54D86-7716-42F8-9270-26C5A7FB1AB5}" presName="background2" presStyleLbl="node2" presStyleIdx="0" presStyleCnt="2"/>
-      <dgm:spPr/>
-    </dgm:pt>
-    <dgm:pt modelId="{6E6EC764-966F-4CBB-8AD4-11EFBFEC79FB}" type="pres">
-      <dgm:prSet presAssocID="{09A54D86-7716-42F8-9270-26C5A7FB1AB5}" presName="text2" presStyleLbl="fgAcc2" presStyleIdx="0" presStyleCnt="2">
+    <dgm:pt modelId="{2A2D0A1F-DF5B-4D62-8359-75FED3464955}" type="pres">
+      <dgm:prSet presAssocID="{9D2A9343-514F-42AD-8709-9CF866F8BCB7}" presName="hierRoot1" presStyleCnt="0"/>
+      <dgm:spPr/>
+    </dgm:pt>
+    <dgm:pt modelId="{67DE11BD-B662-4088-8777-35F65D0117A2}" type="pres">
+      <dgm:prSet presAssocID="{9D2A9343-514F-42AD-8709-9CF866F8BCB7}" presName="composite" presStyleCnt="0"/>
+      <dgm:spPr/>
+    </dgm:pt>
+    <dgm:pt modelId="{E9198AC2-9187-42A7-8316-2334E731B4D9}" type="pres">
+      <dgm:prSet presAssocID="{9D2A9343-514F-42AD-8709-9CF866F8BCB7}" presName="background" presStyleLbl="node0" presStyleIdx="0" presStyleCnt="1"/>
+      <dgm:spPr/>
+    </dgm:pt>
+    <dgm:pt modelId="{1BED93CD-BA7B-4499-826C-20AE6140A068}" type="pres">
+      <dgm:prSet presAssocID="{9D2A9343-514F-42AD-8709-9CF866F8BCB7}" presName="text" presStyleLbl="fgAcc0" presStyleIdx="0" presStyleCnt="1">
         <dgm:presLayoutVars>
           <dgm:chPref val="3"/>
         </dgm:presLayoutVars>
@@ -5833,32 +6055,12 @@
         </a:p>
       </dgm:t>
     </dgm:pt>
-    <dgm:pt modelId="{6E2EFEBF-C1AB-468A-B69E-A9A276A22E79}" type="pres">
-      <dgm:prSet presAssocID="{09A54D86-7716-42F8-9270-26C5A7FB1AB5}" presName="hierChild3" presStyleCnt="0"/>
-      <dgm:spPr/>
-    </dgm:pt>
-    <dgm:pt modelId="{F56E999E-66FD-4637-AD33-5AC8B79F1842}" type="pres">
-      <dgm:prSet presAssocID="{78BC4A45-6F56-4B87-AD3D-8766ED12A7E9}" presName="Name17" presStyleLbl="parChTrans1D3" presStyleIdx="0" presStyleCnt="2"/>
-      <dgm:spPr/>
-    </dgm:pt>
-    <dgm:pt modelId="{B6638D92-2FBA-4C12-A490-4C9FCAE716A5}" type="pres">
-      <dgm:prSet presAssocID="{2F0FB5DE-5A9D-4D3D-A583-7FA014441C51}" presName="hierRoot3" presStyleCnt="0"/>
-      <dgm:spPr/>
-    </dgm:pt>
-    <dgm:pt modelId="{6FD56B1B-E08A-4ADC-AC54-FD7C3C4FEF16}" type="pres">
-      <dgm:prSet presAssocID="{2F0FB5DE-5A9D-4D3D-A583-7FA014441C51}" presName="composite3" presStyleCnt="0"/>
-      <dgm:spPr/>
-    </dgm:pt>
-    <dgm:pt modelId="{D903AFF5-E5F6-4466-924A-0B5E49DA2031}" type="pres">
-      <dgm:prSet presAssocID="{2F0FB5DE-5A9D-4D3D-A583-7FA014441C51}" presName="background3" presStyleLbl="node3" presStyleIdx="0" presStyleCnt="2"/>
-      <dgm:spPr/>
-    </dgm:pt>
-    <dgm:pt modelId="{23EF96DB-4BC4-4BFF-A0F6-595B9165E4CE}" type="pres">
-      <dgm:prSet presAssocID="{2F0FB5DE-5A9D-4D3D-A583-7FA014441C51}" presName="text3" presStyleLbl="fgAcc3" presStyleIdx="0" presStyleCnt="2">
-        <dgm:presLayoutVars>
-          <dgm:chPref val="3"/>
-        </dgm:presLayoutVars>
-      </dgm:prSet>
+    <dgm:pt modelId="{106D85AC-B89C-441A-A093-C690B8A40C10}" type="pres">
+      <dgm:prSet presAssocID="{9D2A9343-514F-42AD-8709-9CF866F8BCB7}" presName="hierChild2" presStyleCnt="0"/>
+      <dgm:spPr/>
+    </dgm:pt>
+    <dgm:pt modelId="{C18B3AE3-C56B-4C46-B2FE-8FC0FF516083}" type="pres">
+      <dgm:prSet presAssocID="{2943FB02-01BF-4826-82C4-C47541C199F8}" presName="Name10" presStyleLbl="parChTrans1D2" presStyleIdx="0" presStyleCnt="2"/>
       <dgm:spPr/>
       <dgm:t>
         <a:bodyPr/>
@@ -5868,12 +6070,24 @@
         </a:p>
       </dgm:t>
     </dgm:pt>
-    <dgm:pt modelId="{F6DBD380-BAE3-4AE9-8336-45705DE240C3}" type="pres">
-      <dgm:prSet presAssocID="{2F0FB5DE-5A9D-4D3D-A583-7FA014441C51}" presName="hierChild4" presStyleCnt="0"/>
-      <dgm:spPr/>
-    </dgm:pt>
-    <dgm:pt modelId="{F9404CB4-28B5-4983-A516-3F7A94617B67}" type="pres">
-      <dgm:prSet presAssocID="{95EA9144-B8E2-463C-B4F4-77B55A351B27}" presName="Name23" presStyleLbl="parChTrans1D4" presStyleIdx="0" presStyleCnt="2"/>
+    <dgm:pt modelId="{DE6675B3-14DB-4FEE-9B01-0C9CD90D5550}" type="pres">
+      <dgm:prSet presAssocID="{09A54D86-7716-42F8-9270-26C5A7FB1AB5}" presName="hierRoot2" presStyleCnt="0"/>
+      <dgm:spPr/>
+    </dgm:pt>
+    <dgm:pt modelId="{1C1140BA-586B-4D14-B29D-0094D68507D5}" type="pres">
+      <dgm:prSet presAssocID="{09A54D86-7716-42F8-9270-26C5A7FB1AB5}" presName="composite2" presStyleCnt="0"/>
+      <dgm:spPr/>
+    </dgm:pt>
+    <dgm:pt modelId="{0FAC0412-8017-4535-AC2C-8A81766BC88D}" type="pres">
+      <dgm:prSet presAssocID="{09A54D86-7716-42F8-9270-26C5A7FB1AB5}" presName="background2" presStyleLbl="node2" presStyleIdx="0" presStyleCnt="2"/>
+      <dgm:spPr/>
+    </dgm:pt>
+    <dgm:pt modelId="{6E6EC764-966F-4CBB-8AD4-11EFBFEC79FB}" type="pres">
+      <dgm:prSet presAssocID="{09A54D86-7716-42F8-9270-26C5A7FB1AB5}" presName="text2" presStyleLbl="fgAcc2" presStyleIdx="0" presStyleCnt="2">
+        <dgm:presLayoutVars>
+          <dgm:chPref val="3"/>
+        </dgm:presLayoutVars>
+      </dgm:prSet>
       <dgm:spPr/>
       <dgm:t>
         <a:bodyPr/>
@@ -5883,24 +6097,12 @@
         </a:p>
       </dgm:t>
     </dgm:pt>
-    <dgm:pt modelId="{1B725075-70F9-4A0C-AC8F-4DB3427A3707}" type="pres">
-      <dgm:prSet presAssocID="{A9C2D848-281E-42B3-84EF-C2D5CFE7CF11}" presName="hierRoot4" presStyleCnt="0"/>
-      <dgm:spPr/>
-    </dgm:pt>
-    <dgm:pt modelId="{BBECFC40-0CF1-46A5-91DB-AEE8B855E0FA}" type="pres">
-      <dgm:prSet presAssocID="{A9C2D848-281E-42B3-84EF-C2D5CFE7CF11}" presName="composite4" presStyleCnt="0"/>
-      <dgm:spPr/>
-    </dgm:pt>
-    <dgm:pt modelId="{4F97DA0F-CA2C-4DFC-94D7-D273FB7AF9D3}" type="pres">
-      <dgm:prSet presAssocID="{A9C2D848-281E-42B3-84EF-C2D5CFE7CF11}" presName="background4" presStyleLbl="node4" presStyleIdx="0" presStyleCnt="2"/>
-      <dgm:spPr/>
-    </dgm:pt>
-    <dgm:pt modelId="{1DA59ED9-F503-4A52-82DA-D69BBEAAF564}" type="pres">
-      <dgm:prSet presAssocID="{A9C2D848-281E-42B3-84EF-C2D5CFE7CF11}" presName="text4" presStyleLbl="fgAcc4" presStyleIdx="0" presStyleCnt="2">
-        <dgm:presLayoutVars>
-          <dgm:chPref val="3"/>
-        </dgm:presLayoutVars>
-      </dgm:prSet>
+    <dgm:pt modelId="{6E2EFEBF-C1AB-468A-B69E-A9A276A22E79}" type="pres">
+      <dgm:prSet presAssocID="{09A54D86-7716-42F8-9270-26C5A7FB1AB5}" presName="hierChild3" presStyleCnt="0"/>
+      <dgm:spPr/>
+    </dgm:pt>
+    <dgm:pt modelId="{F56E999E-66FD-4637-AD33-5AC8B79F1842}" type="pres">
+      <dgm:prSet presAssocID="{78BC4A45-6F56-4B87-AD3D-8766ED12A7E9}" presName="Name17" presStyleLbl="parChTrans1D3" presStyleIdx="0" presStyleCnt="2"/>
       <dgm:spPr/>
       <dgm:t>
         <a:bodyPr/>
@@ -5910,6 +6112,75 @@
         </a:p>
       </dgm:t>
     </dgm:pt>
+    <dgm:pt modelId="{B6638D92-2FBA-4C12-A490-4C9FCAE716A5}" type="pres">
+      <dgm:prSet presAssocID="{2F0FB5DE-5A9D-4D3D-A583-7FA014441C51}" presName="hierRoot3" presStyleCnt="0"/>
+      <dgm:spPr/>
+    </dgm:pt>
+    <dgm:pt modelId="{6FD56B1B-E08A-4ADC-AC54-FD7C3C4FEF16}" type="pres">
+      <dgm:prSet presAssocID="{2F0FB5DE-5A9D-4D3D-A583-7FA014441C51}" presName="composite3" presStyleCnt="0"/>
+      <dgm:spPr/>
+    </dgm:pt>
+    <dgm:pt modelId="{D903AFF5-E5F6-4466-924A-0B5E49DA2031}" type="pres">
+      <dgm:prSet presAssocID="{2F0FB5DE-5A9D-4D3D-A583-7FA014441C51}" presName="background3" presStyleLbl="node3" presStyleIdx="0" presStyleCnt="2"/>
+      <dgm:spPr/>
+    </dgm:pt>
+    <dgm:pt modelId="{23EF96DB-4BC4-4BFF-A0F6-595B9165E4CE}" type="pres">
+      <dgm:prSet presAssocID="{2F0FB5DE-5A9D-4D3D-A583-7FA014441C51}" presName="text3" presStyleLbl="fgAcc3" presStyleIdx="0" presStyleCnt="2">
+        <dgm:presLayoutVars>
+          <dgm:chPref val="3"/>
+        </dgm:presLayoutVars>
+      </dgm:prSet>
+      <dgm:spPr/>
+      <dgm:t>
+        <a:bodyPr/>
+        <a:lstStyle/>
+        <a:p>
+          <a:endParaRPr lang="en-US"/>
+        </a:p>
+      </dgm:t>
+    </dgm:pt>
+    <dgm:pt modelId="{F6DBD380-BAE3-4AE9-8336-45705DE240C3}" type="pres">
+      <dgm:prSet presAssocID="{2F0FB5DE-5A9D-4D3D-A583-7FA014441C51}" presName="hierChild4" presStyleCnt="0"/>
+      <dgm:spPr/>
+    </dgm:pt>
+    <dgm:pt modelId="{F9404CB4-28B5-4983-A516-3F7A94617B67}" type="pres">
+      <dgm:prSet presAssocID="{95EA9144-B8E2-463C-B4F4-77B55A351B27}" presName="Name23" presStyleLbl="parChTrans1D4" presStyleIdx="0" presStyleCnt="2"/>
+      <dgm:spPr/>
+      <dgm:t>
+        <a:bodyPr/>
+        <a:lstStyle/>
+        <a:p>
+          <a:endParaRPr lang="en-US"/>
+        </a:p>
+      </dgm:t>
+    </dgm:pt>
+    <dgm:pt modelId="{1B725075-70F9-4A0C-AC8F-4DB3427A3707}" type="pres">
+      <dgm:prSet presAssocID="{A9C2D848-281E-42B3-84EF-C2D5CFE7CF11}" presName="hierRoot4" presStyleCnt="0"/>
+      <dgm:spPr/>
+    </dgm:pt>
+    <dgm:pt modelId="{BBECFC40-0CF1-46A5-91DB-AEE8B855E0FA}" type="pres">
+      <dgm:prSet presAssocID="{A9C2D848-281E-42B3-84EF-C2D5CFE7CF11}" presName="composite4" presStyleCnt="0"/>
+      <dgm:spPr/>
+    </dgm:pt>
+    <dgm:pt modelId="{4F97DA0F-CA2C-4DFC-94D7-D273FB7AF9D3}" type="pres">
+      <dgm:prSet presAssocID="{A9C2D848-281E-42B3-84EF-C2D5CFE7CF11}" presName="background4" presStyleLbl="node4" presStyleIdx="0" presStyleCnt="2"/>
+      <dgm:spPr/>
+    </dgm:pt>
+    <dgm:pt modelId="{1DA59ED9-F503-4A52-82DA-D69BBEAAF564}" type="pres">
+      <dgm:prSet presAssocID="{A9C2D848-281E-42B3-84EF-C2D5CFE7CF11}" presName="text4" presStyleLbl="fgAcc4" presStyleIdx="0" presStyleCnt="2">
+        <dgm:presLayoutVars>
+          <dgm:chPref val="3"/>
+        </dgm:presLayoutVars>
+      </dgm:prSet>
+      <dgm:spPr/>
+      <dgm:t>
+        <a:bodyPr/>
+        <a:lstStyle/>
+        <a:p>
+          <a:endParaRPr lang="en-US"/>
+        </a:p>
+      </dgm:t>
+    </dgm:pt>
     <dgm:pt modelId="{889553DA-DBD6-4F6E-AD63-8C2DBAF05D8D}" type="pres">
       <dgm:prSet presAssocID="{A9C2D848-281E-42B3-84EF-C2D5CFE7CF11}" presName="hierChild5" presStyleCnt="0"/>
       <dgm:spPr/>
@@ -5917,6 +6188,13 @@
     <dgm:pt modelId="{5496AA36-6C29-4402-87AE-3BA3F7F7FB10}" type="pres">
       <dgm:prSet presAssocID="{B01C31C9-35B1-41F1-BCF9-106809662280}" presName="Name10" presStyleLbl="parChTrans1D2" presStyleIdx="1" presStyleCnt="2"/>
       <dgm:spPr/>
+      <dgm:t>
+        <a:bodyPr/>
+        <a:lstStyle/>
+        <a:p>
+          <a:endParaRPr lang="en-US"/>
+        </a:p>
+      </dgm:t>
     </dgm:pt>
     <dgm:pt modelId="{58841F15-3EB7-41D3-9DF7-7216900091F0}" type="pres">
       <dgm:prSet presAssocID="{138477FA-333B-4AB0-980B-48446CB1EFD2}" presName="hierRoot2" presStyleCnt="0"/>
@@ -5937,6 +6215,13 @@
         </dgm:presLayoutVars>
       </dgm:prSet>
       <dgm:spPr/>
+      <dgm:t>
+        <a:bodyPr/>
+        <a:lstStyle/>
+        <a:p>
+          <a:endParaRPr lang="en-US"/>
+        </a:p>
+      </dgm:t>
     </dgm:pt>
     <dgm:pt modelId="{42307C8F-5818-451A-A249-204823F3327D}" type="pres">
       <dgm:prSet presAssocID="{138477FA-333B-4AB0-980B-48446CB1EFD2}" presName="hierChild3" presStyleCnt="0"/>
@@ -5945,6 +6230,13 @@
     <dgm:pt modelId="{D582469F-B300-4441-8B7A-811F2944BE7C}" type="pres">
       <dgm:prSet presAssocID="{B59F3437-6872-40D3-9770-9B57C873B960}" presName="Name17" presStyleLbl="parChTrans1D3" presStyleIdx="1" presStyleCnt="2"/>
       <dgm:spPr/>
+      <dgm:t>
+        <a:bodyPr/>
+        <a:lstStyle/>
+        <a:p>
+          <a:endParaRPr lang="en-US"/>
+        </a:p>
+      </dgm:t>
     </dgm:pt>
     <dgm:pt modelId="{137CD1A6-429F-4472-8075-2AAC931240C2}" type="pres">
       <dgm:prSet presAssocID="{2B827F71-BD4B-4C27-994F-A9FD012AAF72}" presName="hierRoot3" presStyleCnt="0"/>
@@ -5965,6 +6257,13 @@
         </dgm:presLayoutVars>
       </dgm:prSet>
       <dgm:spPr/>
+      <dgm:t>
+        <a:bodyPr/>
+        <a:lstStyle/>
+        <a:p>
+          <a:endParaRPr lang="en-US"/>
+        </a:p>
+      </dgm:t>
     </dgm:pt>
     <dgm:pt modelId="{41E9E1B3-C577-4E7F-86D7-C65D8EC836C8}" type="pres">
       <dgm:prSet presAssocID="{2B827F71-BD4B-4C27-994F-A9FD012AAF72}" presName="hierChild4" presStyleCnt="0"/>
@@ -5973,6 +6272,13 @@
     <dgm:pt modelId="{D11E734E-FAAA-4665-B742-408D48ED0D2E}" type="pres">
       <dgm:prSet presAssocID="{02BD72B2-4324-4F61-83C5-0DFF67562C8C}" presName="Name23" presStyleLbl="parChTrans1D4" presStyleIdx="1" presStyleCnt="2"/>
       <dgm:spPr/>
+      <dgm:t>
+        <a:bodyPr/>
+        <a:lstStyle/>
+        <a:p>
+          <a:endParaRPr lang="en-US"/>
+        </a:p>
+      </dgm:t>
     </dgm:pt>
     <dgm:pt modelId="{8A04CED9-F4FD-4809-A6DB-543821E2C10B}" type="pres">
       <dgm:prSet presAssocID="{1D7B47C1-CE9C-4145-8E3E-F5FE9E4B38C8}" presName="hierRoot4" presStyleCnt="0"/>
@@ -5993,6 +6299,13 @@
         </dgm:presLayoutVars>
       </dgm:prSet>
       <dgm:spPr/>
+      <dgm:t>
+        <a:bodyPr/>
+        <a:lstStyle/>
+        <a:p>
+          <a:endParaRPr lang="en-US"/>
+        </a:p>
+      </dgm:t>
     </dgm:pt>
     <dgm:pt modelId="{C88432AB-59D3-4C3B-BB71-CEDEB87C876F}" type="pres">
       <dgm:prSet presAssocID="{1D7B47C1-CE9C-4145-8E3E-F5FE9E4B38C8}" presName="hierChild5" presStyleCnt="0"/>
@@ -6000,27 +6313,27 @@
     </dgm:pt>
   </dgm:ptLst>
   <dgm:cxnLst>
-    <dgm:cxn modelId="{12F3E830-2359-428E-A1A2-0E64E5C58A4D}" type="presOf" srcId="{2B827F71-BD4B-4C27-994F-A9FD012AAF72}" destId="{1BD4006F-235B-45D5-96E7-76BD89EC9013}" srcOrd="0" destOrd="0" presId="urn:microsoft.com/office/officeart/2005/8/layout/hierarchy1"/>
-    <dgm:cxn modelId="{5E7D29A7-14DA-496D-B5DA-CAFA7C94FB8D}" srcId="{9D2A9343-514F-42AD-8709-9CF866F8BCB7}" destId="{09A54D86-7716-42F8-9270-26C5A7FB1AB5}" srcOrd="0" destOrd="0" parTransId="{2943FB02-01BF-4826-82C4-C47541C199F8}" sibTransId="{14552CD9-63B0-4C89-8D4C-6E71B622B796}"/>
+    <dgm:cxn modelId="{72EF35B7-2892-47C5-BD40-E72AF4B83AC1}" type="presOf" srcId="{B01C31C9-35B1-41F1-BCF9-106809662280}" destId="{5496AA36-6C29-4402-87AE-3BA3F7F7FB10}" srcOrd="0" destOrd="0" presId="urn:microsoft.com/office/officeart/2005/8/layout/hierarchy1"/>
+    <dgm:cxn modelId="{1974D293-3E79-429D-B52D-6A9D961EEF07}" type="presOf" srcId="{9D2A9343-514F-42AD-8709-9CF866F8BCB7}" destId="{1BED93CD-BA7B-4499-826C-20AE6140A068}" srcOrd="0" destOrd="0" presId="urn:microsoft.com/office/officeart/2005/8/layout/hierarchy1"/>
+    <dgm:cxn modelId="{B131B415-C377-499C-899D-1AB270CC6269}" srcId="{138477FA-333B-4AB0-980B-48446CB1EFD2}" destId="{2B827F71-BD4B-4C27-994F-A9FD012AAF72}" srcOrd="0" destOrd="0" parTransId="{B59F3437-6872-40D3-9770-9B57C873B960}" sibTransId="{0866DAB3-A626-4CA3-A6C2-FAE162BE0ABC}"/>
     <dgm:cxn modelId="{B1B38C92-BD8A-499B-86C3-B3CE4DAA9765}" srcId="{BEAA0A0E-16F1-46B3-BD98-AE1752A63BC9}" destId="{9D2A9343-514F-42AD-8709-9CF866F8BCB7}" srcOrd="0" destOrd="0" parTransId="{96054D28-CADE-4A78-B891-56F3D6FFCF15}" sibTransId="{8C62D617-D94B-4FDA-93A5-DCA7BD708CC5}"/>
     <dgm:cxn modelId="{B003625A-A318-4663-874C-BA95E5C8B5C8}" type="presOf" srcId="{09A54D86-7716-42F8-9270-26C5A7FB1AB5}" destId="{6E6EC764-966F-4CBB-8AD4-11EFBFEC79FB}" srcOrd="0" destOrd="0" presId="urn:microsoft.com/office/officeart/2005/8/layout/hierarchy1"/>
+    <dgm:cxn modelId="{6B6B19B4-F507-4136-9DD9-8086B996F430}" srcId="{09A54D86-7716-42F8-9270-26C5A7FB1AB5}" destId="{2F0FB5DE-5A9D-4D3D-A583-7FA014441C51}" srcOrd="0" destOrd="0" parTransId="{78BC4A45-6F56-4B87-AD3D-8766ED12A7E9}" sibTransId="{ABC218F2-924F-48AC-A41C-EDBE8497CEFA}"/>
+    <dgm:cxn modelId="{10268D2F-DEE2-44F9-AC02-53D750D18985}" srcId="{2B827F71-BD4B-4C27-994F-A9FD012AAF72}" destId="{1D7B47C1-CE9C-4145-8E3E-F5FE9E4B38C8}" srcOrd="0" destOrd="0" parTransId="{02BD72B2-4324-4F61-83C5-0DFF67562C8C}" sibTransId="{2C1DB7DF-940F-4CDE-9D64-4491F483D566}"/>
+    <dgm:cxn modelId="{BAB63194-9FC5-482C-8A66-CFE2A15AC9F9}" type="presOf" srcId="{1D7B47C1-CE9C-4145-8E3E-F5FE9E4B38C8}" destId="{EECE5441-8010-4E85-A0EA-4D720BFCD8DD}" srcOrd="0" destOrd="0" presId="urn:microsoft.com/office/officeart/2005/8/layout/hierarchy1"/>
+    <dgm:cxn modelId="{F13DAE28-1604-4F08-A64D-36E8B3EAE03A}" type="presOf" srcId="{2943FB02-01BF-4826-82C4-C47541C199F8}" destId="{C18B3AE3-C56B-4C46-B2FE-8FC0FF516083}" srcOrd="0" destOrd="0" presId="urn:microsoft.com/office/officeart/2005/8/layout/hierarchy1"/>
+    <dgm:cxn modelId="{93151928-C641-448D-AB2D-314256462064}" srcId="{9D2A9343-514F-42AD-8709-9CF866F8BCB7}" destId="{138477FA-333B-4AB0-980B-48446CB1EFD2}" srcOrd="1" destOrd="0" parTransId="{B01C31C9-35B1-41F1-BCF9-106809662280}" sibTransId="{76334B11-A645-44C1-91E5-27DFE3A69752}"/>
+    <dgm:cxn modelId="{D12193BD-1F8D-4581-8978-AA824B5088A7}" type="presOf" srcId="{78BC4A45-6F56-4B87-AD3D-8766ED12A7E9}" destId="{F56E999E-66FD-4637-AD33-5AC8B79F1842}" srcOrd="0" destOrd="0" presId="urn:microsoft.com/office/officeart/2005/8/layout/hierarchy1"/>
+    <dgm:cxn modelId="{5E7D29A7-14DA-496D-B5DA-CAFA7C94FB8D}" srcId="{9D2A9343-514F-42AD-8709-9CF866F8BCB7}" destId="{09A54D86-7716-42F8-9270-26C5A7FB1AB5}" srcOrd="0" destOrd="0" parTransId="{2943FB02-01BF-4826-82C4-C47541C199F8}" sibTransId="{14552CD9-63B0-4C89-8D4C-6E71B622B796}"/>
+    <dgm:cxn modelId="{EC44E52C-ED5C-4879-A600-62969AEC8332}" type="presOf" srcId="{138477FA-333B-4AB0-980B-48446CB1EFD2}" destId="{A16E1DCD-7FAB-448D-A679-39CB0A27E971}" srcOrd="0" destOrd="0" presId="urn:microsoft.com/office/officeart/2005/8/layout/hierarchy1"/>
+    <dgm:cxn modelId="{3576C16D-DF49-44CA-9075-24A9A42B31D4}" type="presOf" srcId="{BEAA0A0E-16F1-46B3-BD98-AE1752A63BC9}" destId="{62D23EA1-F578-4E79-8C47-28F032438B69}" srcOrd="0" destOrd="0" presId="urn:microsoft.com/office/officeart/2005/8/layout/hierarchy1"/>
+    <dgm:cxn modelId="{12F3E830-2359-428E-A1A2-0E64E5C58A4D}" type="presOf" srcId="{2B827F71-BD4B-4C27-994F-A9FD012AAF72}" destId="{1BD4006F-235B-45D5-96E7-76BD89EC9013}" srcOrd="0" destOrd="0" presId="urn:microsoft.com/office/officeart/2005/8/layout/hierarchy1"/>
+    <dgm:cxn modelId="{BFBA3548-B431-4EAE-A420-DC16688A8343}" type="presOf" srcId="{A9C2D848-281E-42B3-84EF-C2D5CFE7CF11}" destId="{1DA59ED9-F503-4A52-82DA-D69BBEAAF564}" srcOrd="0" destOrd="0" presId="urn:microsoft.com/office/officeart/2005/8/layout/hierarchy1"/>
+    <dgm:cxn modelId="{3D8D7E4B-CCCE-46D7-8221-B871CA37B3AC}" type="presOf" srcId="{95EA9144-B8E2-463C-B4F4-77B55A351B27}" destId="{F9404CB4-28B5-4983-A516-3F7A94617B67}" srcOrd="0" destOrd="0" presId="urn:microsoft.com/office/officeart/2005/8/layout/hierarchy1"/>
     <dgm:cxn modelId="{C03B1E54-538D-4218-9AAC-650408E0EECB}" type="presOf" srcId="{B59F3437-6872-40D3-9770-9B57C873B960}" destId="{D582469F-B300-4441-8B7A-811F2944BE7C}" srcOrd="0" destOrd="0" presId="urn:microsoft.com/office/officeart/2005/8/layout/hierarchy1"/>
-    <dgm:cxn modelId="{EC44E52C-ED5C-4879-A600-62969AEC8332}" type="presOf" srcId="{138477FA-333B-4AB0-980B-48446CB1EFD2}" destId="{A16E1DCD-7FAB-448D-A679-39CB0A27E971}" srcOrd="0" destOrd="0" presId="urn:microsoft.com/office/officeart/2005/8/layout/hierarchy1"/>
-    <dgm:cxn modelId="{BFBA3548-B431-4EAE-A420-DC16688A8343}" type="presOf" srcId="{A9C2D848-281E-42B3-84EF-C2D5CFE7CF11}" destId="{1DA59ED9-F503-4A52-82DA-D69BBEAAF564}" srcOrd="0" destOrd="0" presId="urn:microsoft.com/office/officeart/2005/8/layout/hierarchy1"/>
-    <dgm:cxn modelId="{F13DAE28-1604-4F08-A64D-36E8B3EAE03A}" type="presOf" srcId="{2943FB02-01BF-4826-82C4-C47541C199F8}" destId="{C18B3AE3-C56B-4C46-B2FE-8FC0FF516083}" srcOrd="0" destOrd="0" presId="urn:microsoft.com/office/officeart/2005/8/layout/hierarchy1"/>
-    <dgm:cxn modelId="{B131B415-C377-499C-899D-1AB270CC6269}" srcId="{138477FA-333B-4AB0-980B-48446CB1EFD2}" destId="{2B827F71-BD4B-4C27-994F-A9FD012AAF72}" srcOrd="0" destOrd="0" parTransId="{B59F3437-6872-40D3-9770-9B57C873B960}" sibTransId="{0866DAB3-A626-4CA3-A6C2-FAE162BE0ABC}"/>
-    <dgm:cxn modelId="{D12193BD-1F8D-4581-8978-AA824B5088A7}" type="presOf" srcId="{78BC4A45-6F56-4B87-AD3D-8766ED12A7E9}" destId="{F56E999E-66FD-4637-AD33-5AC8B79F1842}" srcOrd="0" destOrd="0" presId="urn:microsoft.com/office/officeart/2005/8/layout/hierarchy1"/>
     <dgm:cxn modelId="{61CBF262-1701-4942-8215-72BAECA4F836}" srcId="{2F0FB5DE-5A9D-4D3D-A583-7FA014441C51}" destId="{A9C2D848-281E-42B3-84EF-C2D5CFE7CF11}" srcOrd="0" destOrd="0" parTransId="{95EA9144-B8E2-463C-B4F4-77B55A351B27}" sibTransId="{A3039733-AC89-4195-BC42-F5D851217324}"/>
-    <dgm:cxn modelId="{1974D293-3E79-429D-B52D-6A9D961EEF07}" type="presOf" srcId="{9D2A9343-514F-42AD-8709-9CF866F8BCB7}" destId="{1BED93CD-BA7B-4499-826C-20AE6140A068}" srcOrd="0" destOrd="0" presId="urn:microsoft.com/office/officeart/2005/8/layout/hierarchy1"/>
-    <dgm:cxn modelId="{6B6B19B4-F507-4136-9DD9-8086B996F430}" srcId="{09A54D86-7716-42F8-9270-26C5A7FB1AB5}" destId="{2F0FB5DE-5A9D-4D3D-A583-7FA014441C51}" srcOrd="0" destOrd="0" parTransId="{78BC4A45-6F56-4B87-AD3D-8766ED12A7E9}" sibTransId="{ABC218F2-924F-48AC-A41C-EDBE8497CEFA}"/>
-    <dgm:cxn modelId="{72EF35B7-2892-47C5-BD40-E72AF4B83AC1}" type="presOf" srcId="{B01C31C9-35B1-41F1-BCF9-106809662280}" destId="{5496AA36-6C29-4402-87AE-3BA3F7F7FB10}" srcOrd="0" destOrd="0" presId="urn:microsoft.com/office/officeart/2005/8/layout/hierarchy1"/>
-    <dgm:cxn modelId="{BAB63194-9FC5-482C-8A66-CFE2A15AC9F9}" type="presOf" srcId="{1D7B47C1-CE9C-4145-8E3E-F5FE9E4B38C8}" destId="{EECE5441-8010-4E85-A0EA-4D720BFCD8DD}" srcOrd="0" destOrd="0" presId="urn:microsoft.com/office/officeart/2005/8/layout/hierarchy1"/>
     <dgm:cxn modelId="{21DB823B-DB96-40AE-88AF-B742DABEFE3C}" type="presOf" srcId="{02BD72B2-4324-4F61-83C5-0DFF67562C8C}" destId="{D11E734E-FAAA-4665-B742-408D48ED0D2E}" srcOrd="0" destOrd="0" presId="urn:microsoft.com/office/officeart/2005/8/layout/hierarchy1"/>
     <dgm:cxn modelId="{FA43886A-A6C5-45E2-9123-2E46421AFB52}" type="presOf" srcId="{2F0FB5DE-5A9D-4D3D-A583-7FA014441C51}" destId="{23EF96DB-4BC4-4BFF-A0F6-595B9165E4CE}" srcOrd="0" destOrd="0" presId="urn:microsoft.com/office/officeart/2005/8/layout/hierarchy1"/>
-    <dgm:cxn modelId="{3D8D7E4B-CCCE-46D7-8221-B871CA37B3AC}" type="presOf" srcId="{95EA9144-B8E2-463C-B4F4-77B55A351B27}" destId="{F9404CB4-28B5-4983-A516-3F7A94617B67}" srcOrd="0" destOrd="0" presId="urn:microsoft.com/office/officeart/2005/8/layout/hierarchy1"/>
-    <dgm:cxn modelId="{10268D2F-DEE2-44F9-AC02-53D750D18985}" srcId="{2B827F71-BD4B-4C27-994F-A9FD012AAF72}" destId="{1D7B47C1-CE9C-4145-8E3E-F5FE9E4B38C8}" srcOrd="0" destOrd="0" parTransId="{02BD72B2-4324-4F61-83C5-0DFF67562C8C}" sibTransId="{2C1DB7DF-940F-4CDE-9D64-4491F483D566}"/>
-    <dgm:cxn modelId="{93151928-C641-448D-AB2D-314256462064}" srcId="{9D2A9343-514F-42AD-8709-9CF866F8BCB7}" destId="{138477FA-333B-4AB0-980B-48446CB1EFD2}" srcOrd="1" destOrd="0" parTransId="{B01C31C9-35B1-41F1-BCF9-106809662280}" sibTransId="{76334B11-A645-44C1-91E5-27DFE3A69752}"/>
-    <dgm:cxn modelId="{3576C16D-DF49-44CA-9075-24A9A42B31D4}" type="presOf" srcId="{BEAA0A0E-16F1-46B3-BD98-AE1752A63BC9}" destId="{62D23EA1-F578-4E79-8C47-28F032438B69}" srcOrd="0" destOrd="0" presId="urn:microsoft.com/office/officeart/2005/8/layout/hierarchy1"/>
     <dgm:cxn modelId="{ACD4CC39-A16C-49DC-932A-5FA09D8B364D}" type="presParOf" srcId="{62D23EA1-F578-4E79-8C47-28F032438B69}" destId="{2A2D0A1F-DF5B-4D62-8359-75FED3464955}" srcOrd="0" destOrd="0" presId="urn:microsoft.com/office/officeart/2005/8/layout/hierarchy1"/>
     <dgm:cxn modelId="{D2150FAA-9D0D-46A5-8E9D-B32E8E98428A}" type="presParOf" srcId="{2A2D0A1F-DF5B-4D62-8359-75FED3464955}" destId="{67DE11BD-B662-4088-8777-35F65D0117A2}" srcOrd="0" destOrd="0" presId="urn:microsoft.com/office/officeart/2005/8/layout/hierarchy1"/>
     <dgm:cxn modelId="{0421FB5F-99AE-45AD-A8D1-D45AA5473721}" type="presParOf" srcId="{67DE11BD-B662-4088-8777-35F65D0117A2}" destId="{E9198AC2-9187-42A7-8316-2334E731B4D9}" srcOrd="0" destOrd="0" presId="urn:microsoft.com/office/officeart/2005/8/layout/hierarchy1"/>
@@ -6394,26 +6707,6 @@
         </dgm:presLayoutVars>
       </dgm:prSet>
       <dgm:spPr/>
-    </dgm:pt>
-    <dgm:pt modelId="{2A2D0A1F-DF5B-4D62-8359-75FED3464955}" type="pres">
-      <dgm:prSet presAssocID="{9D2A9343-514F-42AD-8709-9CF866F8BCB7}" presName="hierRoot1" presStyleCnt="0"/>
-      <dgm:spPr/>
-    </dgm:pt>
-    <dgm:pt modelId="{67DE11BD-B662-4088-8777-35F65D0117A2}" type="pres">
-      <dgm:prSet presAssocID="{9D2A9343-514F-42AD-8709-9CF866F8BCB7}" presName="composite" presStyleCnt="0"/>
-      <dgm:spPr/>
-    </dgm:pt>
-    <dgm:pt modelId="{E9198AC2-9187-42A7-8316-2334E731B4D9}" type="pres">
-      <dgm:prSet presAssocID="{9D2A9343-514F-42AD-8709-9CF866F8BCB7}" presName="background" presStyleLbl="node0" presStyleIdx="0" presStyleCnt="1"/>
-      <dgm:spPr/>
-    </dgm:pt>
-    <dgm:pt modelId="{1BED93CD-BA7B-4499-826C-20AE6140A068}" type="pres">
-      <dgm:prSet presAssocID="{9D2A9343-514F-42AD-8709-9CF866F8BCB7}" presName="text" presStyleLbl="fgAcc0" presStyleIdx="0" presStyleCnt="1">
-        <dgm:presLayoutVars>
-          <dgm:chPref val="3"/>
-        </dgm:presLayoutVars>
-      </dgm:prSet>
-      <dgm:spPr/>
       <dgm:t>
         <a:bodyPr/>
         <a:lstStyle/>
@@ -6422,28 +6715,20 @@
         </a:p>
       </dgm:t>
     </dgm:pt>
-    <dgm:pt modelId="{106D85AC-B89C-441A-A093-C690B8A40C10}" type="pres">
-      <dgm:prSet presAssocID="{9D2A9343-514F-42AD-8709-9CF866F8BCB7}" presName="hierChild2" presStyleCnt="0"/>
-      <dgm:spPr/>
-    </dgm:pt>
-    <dgm:pt modelId="{C18B3AE3-C56B-4C46-B2FE-8FC0FF516083}" type="pres">
-      <dgm:prSet presAssocID="{2943FB02-01BF-4826-82C4-C47541C199F8}" presName="Name10" presStyleLbl="parChTrans1D2" presStyleIdx="0" presStyleCnt="2"/>
-      <dgm:spPr/>
-    </dgm:pt>
-    <dgm:pt modelId="{DE6675B3-14DB-4FEE-9B01-0C9CD90D5550}" type="pres">
-      <dgm:prSet presAssocID="{09A54D86-7716-42F8-9270-26C5A7FB1AB5}" presName="hierRoot2" presStyleCnt="0"/>
-      <dgm:spPr/>
-    </dgm:pt>
-    <dgm:pt modelId="{1C1140BA-586B-4D14-B29D-0094D68507D5}" type="pres">
-      <dgm:prSet presAssocID="{09A54D86-7716-42F8-9270-26C5A7FB1AB5}" presName="composite2" presStyleCnt="0"/>
-      <dgm:spPr/>
-    </dgm:pt>
-    <dgm:pt modelId="{0FAC0412-8017-4535-AC2C-8A81766BC88D}" type="pres">
-      <dgm:prSet presAssocID="{09A54D86-7716-42F8-9270-26C5A7FB1AB5}" presName="background2" presStyleLbl="node2" presStyleIdx="0" presStyleCnt="2"/>
-      <dgm:spPr/>
-    </dgm:pt>
-    <dgm:pt modelId="{6E6EC764-966F-4CBB-8AD4-11EFBFEC79FB}" type="pres">
-      <dgm:prSet presAssocID="{09A54D86-7716-42F8-9270-26C5A7FB1AB5}" presName="text2" presStyleLbl="fgAcc2" presStyleIdx="0" presStyleCnt="2">
+    <dgm:pt modelId="{2A2D0A1F-DF5B-4D62-8359-75FED3464955}" type="pres">
+      <dgm:prSet presAssocID="{9D2A9343-514F-42AD-8709-9CF866F8BCB7}" presName="hierRoot1" presStyleCnt="0"/>
+      <dgm:spPr/>
+    </dgm:pt>
+    <dgm:pt modelId="{67DE11BD-B662-4088-8777-35F65D0117A2}" type="pres">
+      <dgm:prSet presAssocID="{9D2A9343-514F-42AD-8709-9CF866F8BCB7}" presName="composite" presStyleCnt="0"/>
+      <dgm:spPr/>
+    </dgm:pt>
+    <dgm:pt modelId="{E9198AC2-9187-42A7-8316-2334E731B4D9}" type="pres">
+      <dgm:prSet presAssocID="{9D2A9343-514F-42AD-8709-9CF866F8BCB7}" presName="background" presStyleLbl="node0" presStyleIdx="0" presStyleCnt="1"/>
+      <dgm:spPr/>
+    </dgm:pt>
+    <dgm:pt modelId="{1BED93CD-BA7B-4499-826C-20AE6140A068}" type="pres">
+      <dgm:prSet presAssocID="{9D2A9343-514F-42AD-8709-9CF866F8BCB7}" presName="text" presStyleLbl="fgAcc0" presStyleIdx="0" presStyleCnt="1">
         <dgm:presLayoutVars>
           <dgm:chPref val="3"/>
         </dgm:presLayoutVars>
@@ -6457,32 +6742,12 @@
         </a:p>
       </dgm:t>
     </dgm:pt>
-    <dgm:pt modelId="{6E2EFEBF-C1AB-468A-B69E-A9A276A22E79}" type="pres">
-      <dgm:prSet presAssocID="{09A54D86-7716-42F8-9270-26C5A7FB1AB5}" presName="hierChild3" presStyleCnt="0"/>
-      <dgm:spPr/>
-    </dgm:pt>
-    <dgm:pt modelId="{F56E999E-66FD-4637-AD33-5AC8B79F1842}" type="pres">
-      <dgm:prSet presAssocID="{78BC4A45-6F56-4B87-AD3D-8766ED12A7E9}" presName="Name17" presStyleLbl="parChTrans1D3" presStyleIdx="0" presStyleCnt="3"/>
-      <dgm:spPr/>
-    </dgm:pt>
-    <dgm:pt modelId="{B6638D92-2FBA-4C12-A490-4C9FCAE716A5}" type="pres">
-      <dgm:prSet presAssocID="{2F0FB5DE-5A9D-4D3D-A583-7FA014441C51}" presName="hierRoot3" presStyleCnt="0"/>
-      <dgm:spPr/>
-    </dgm:pt>
-    <dgm:pt modelId="{6FD56B1B-E08A-4ADC-AC54-FD7C3C4FEF16}" type="pres">
-      <dgm:prSet presAssocID="{2F0FB5DE-5A9D-4D3D-A583-7FA014441C51}" presName="composite3" presStyleCnt="0"/>
-      <dgm:spPr/>
-    </dgm:pt>
-    <dgm:pt modelId="{D903AFF5-E5F6-4466-924A-0B5E49DA2031}" type="pres">
-      <dgm:prSet presAssocID="{2F0FB5DE-5A9D-4D3D-A583-7FA014441C51}" presName="background3" presStyleLbl="node3" presStyleIdx="0" presStyleCnt="3"/>
-      <dgm:spPr/>
-    </dgm:pt>
-    <dgm:pt modelId="{23EF96DB-4BC4-4BFF-A0F6-595B9165E4CE}" type="pres">
-      <dgm:prSet presAssocID="{2F0FB5DE-5A9D-4D3D-A583-7FA014441C51}" presName="text3" presStyleLbl="fgAcc3" presStyleIdx="0" presStyleCnt="3">
-        <dgm:presLayoutVars>
-          <dgm:chPref val="3"/>
-        </dgm:presLayoutVars>
-      </dgm:prSet>
+    <dgm:pt modelId="{106D85AC-B89C-441A-A093-C690B8A40C10}" type="pres">
+      <dgm:prSet presAssocID="{9D2A9343-514F-42AD-8709-9CF866F8BCB7}" presName="hierChild2" presStyleCnt="0"/>
+      <dgm:spPr/>
+    </dgm:pt>
+    <dgm:pt modelId="{C18B3AE3-C56B-4C46-B2FE-8FC0FF516083}" type="pres">
+      <dgm:prSet presAssocID="{2943FB02-01BF-4826-82C4-C47541C199F8}" presName="Name10" presStyleLbl="parChTrans1D2" presStyleIdx="0" presStyleCnt="2"/>
       <dgm:spPr/>
       <dgm:t>
         <a:bodyPr/>
@@ -6492,12 +6757,24 @@
         </a:p>
       </dgm:t>
     </dgm:pt>
-    <dgm:pt modelId="{F6DBD380-BAE3-4AE9-8336-45705DE240C3}" type="pres">
-      <dgm:prSet presAssocID="{2F0FB5DE-5A9D-4D3D-A583-7FA014441C51}" presName="hierChild4" presStyleCnt="0"/>
-      <dgm:spPr/>
-    </dgm:pt>
-    <dgm:pt modelId="{F9404CB4-28B5-4983-A516-3F7A94617B67}" type="pres">
-      <dgm:prSet presAssocID="{95EA9144-B8E2-463C-B4F4-77B55A351B27}" presName="Name23" presStyleLbl="parChTrans1D4" presStyleIdx="0" presStyleCnt="2"/>
+    <dgm:pt modelId="{DE6675B3-14DB-4FEE-9B01-0C9CD90D5550}" type="pres">
+      <dgm:prSet presAssocID="{09A54D86-7716-42F8-9270-26C5A7FB1AB5}" presName="hierRoot2" presStyleCnt="0"/>
+      <dgm:spPr/>
+    </dgm:pt>
+    <dgm:pt modelId="{1C1140BA-586B-4D14-B29D-0094D68507D5}" type="pres">
+      <dgm:prSet presAssocID="{09A54D86-7716-42F8-9270-26C5A7FB1AB5}" presName="composite2" presStyleCnt="0"/>
+      <dgm:spPr/>
+    </dgm:pt>
+    <dgm:pt modelId="{0FAC0412-8017-4535-AC2C-8A81766BC88D}" type="pres">
+      <dgm:prSet presAssocID="{09A54D86-7716-42F8-9270-26C5A7FB1AB5}" presName="background2" presStyleLbl="node2" presStyleIdx="0" presStyleCnt="2"/>
+      <dgm:spPr/>
+    </dgm:pt>
+    <dgm:pt modelId="{6E6EC764-966F-4CBB-8AD4-11EFBFEC79FB}" type="pres">
+      <dgm:prSet presAssocID="{09A54D86-7716-42F8-9270-26C5A7FB1AB5}" presName="text2" presStyleLbl="fgAcc2" presStyleIdx="0" presStyleCnt="2">
+        <dgm:presLayoutVars>
+          <dgm:chPref val="3"/>
+        </dgm:presLayoutVars>
+      </dgm:prSet>
       <dgm:spPr/>
       <dgm:t>
         <a:bodyPr/>
@@ -6507,24 +6784,12 @@
         </a:p>
       </dgm:t>
     </dgm:pt>
-    <dgm:pt modelId="{1B725075-70F9-4A0C-AC8F-4DB3427A3707}" type="pres">
-      <dgm:prSet presAssocID="{A9C2D848-281E-42B3-84EF-C2D5CFE7CF11}" presName="hierRoot4" presStyleCnt="0"/>
-      <dgm:spPr/>
-    </dgm:pt>
-    <dgm:pt modelId="{BBECFC40-0CF1-46A5-91DB-AEE8B855E0FA}" type="pres">
-      <dgm:prSet presAssocID="{A9C2D848-281E-42B3-84EF-C2D5CFE7CF11}" presName="composite4" presStyleCnt="0"/>
-      <dgm:spPr/>
-    </dgm:pt>
-    <dgm:pt modelId="{4F97DA0F-CA2C-4DFC-94D7-D273FB7AF9D3}" type="pres">
-      <dgm:prSet presAssocID="{A9C2D848-281E-42B3-84EF-C2D5CFE7CF11}" presName="background4" presStyleLbl="node4" presStyleIdx="0" presStyleCnt="2"/>
-      <dgm:spPr/>
-    </dgm:pt>
-    <dgm:pt modelId="{1DA59ED9-F503-4A52-82DA-D69BBEAAF564}" type="pres">
-      <dgm:prSet presAssocID="{A9C2D848-281E-42B3-84EF-C2D5CFE7CF11}" presName="text4" presStyleLbl="fgAcc4" presStyleIdx="0" presStyleCnt="2">
-        <dgm:presLayoutVars>
-          <dgm:chPref val="3"/>
-        </dgm:presLayoutVars>
-      </dgm:prSet>
+    <dgm:pt modelId="{6E2EFEBF-C1AB-468A-B69E-A9A276A22E79}" type="pres">
+      <dgm:prSet presAssocID="{09A54D86-7716-42F8-9270-26C5A7FB1AB5}" presName="hierChild3" presStyleCnt="0"/>
+      <dgm:spPr/>
+    </dgm:pt>
+    <dgm:pt modelId="{F56E999E-66FD-4637-AD33-5AC8B79F1842}" type="pres">
+      <dgm:prSet presAssocID="{78BC4A45-6F56-4B87-AD3D-8766ED12A7E9}" presName="Name17" presStyleLbl="parChTrans1D3" presStyleIdx="0" presStyleCnt="3"/>
       <dgm:spPr/>
       <dgm:t>
         <a:bodyPr/>
@@ -6534,28 +6799,20 @@
         </a:p>
       </dgm:t>
     </dgm:pt>
-    <dgm:pt modelId="{889553DA-DBD6-4F6E-AD63-8C2DBAF05D8D}" type="pres">
-      <dgm:prSet presAssocID="{A9C2D848-281E-42B3-84EF-C2D5CFE7CF11}" presName="hierChild5" presStyleCnt="0"/>
-      <dgm:spPr/>
-    </dgm:pt>
-    <dgm:pt modelId="{5496AA36-6C29-4402-87AE-3BA3F7F7FB10}" type="pres">
-      <dgm:prSet presAssocID="{B01C31C9-35B1-41F1-BCF9-106809662280}" presName="Name10" presStyleLbl="parChTrans1D2" presStyleIdx="1" presStyleCnt="2"/>
-      <dgm:spPr/>
-    </dgm:pt>
-    <dgm:pt modelId="{58841F15-3EB7-41D3-9DF7-7216900091F0}" type="pres">
-      <dgm:prSet presAssocID="{138477FA-333B-4AB0-980B-48446CB1EFD2}" presName="hierRoot2" presStyleCnt="0"/>
-      <dgm:spPr/>
-    </dgm:pt>
-    <dgm:pt modelId="{D92DC0EA-997F-46D2-A194-A91315686FA1}" type="pres">
-      <dgm:prSet presAssocID="{138477FA-333B-4AB0-980B-48446CB1EFD2}" presName="composite2" presStyleCnt="0"/>
-      <dgm:spPr/>
-    </dgm:pt>
-    <dgm:pt modelId="{989D2EA1-9439-4DA1-8943-DD924ED047AB}" type="pres">
-      <dgm:prSet presAssocID="{138477FA-333B-4AB0-980B-48446CB1EFD2}" presName="background2" presStyleLbl="node2" presStyleIdx="1" presStyleCnt="2"/>
-      <dgm:spPr/>
-    </dgm:pt>
-    <dgm:pt modelId="{A16E1DCD-7FAB-448D-A679-39CB0A27E971}" type="pres">
-      <dgm:prSet presAssocID="{138477FA-333B-4AB0-980B-48446CB1EFD2}" presName="text2" presStyleLbl="fgAcc2" presStyleIdx="1" presStyleCnt="2">
+    <dgm:pt modelId="{B6638D92-2FBA-4C12-A490-4C9FCAE716A5}" type="pres">
+      <dgm:prSet presAssocID="{2F0FB5DE-5A9D-4D3D-A583-7FA014441C51}" presName="hierRoot3" presStyleCnt="0"/>
+      <dgm:spPr/>
+    </dgm:pt>
+    <dgm:pt modelId="{6FD56B1B-E08A-4ADC-AC54-FD7C3C4FEF16}" type="pres">
+      <dgm:prSet presAssocID="{2F0FB5DE-5A9D-4D3D-A583-7FA014441C51}" presName="composite3" presStyleCnt="0"/>
+      <dgm:spPr/>
+    </dgm:pt>
+    <dgm:pt modelId="{D903AFF5-E5F6-4466-924A-0B5E49DA2031}" type="pres">
+      <dgm:prSet presAssocID="{2F0FB5DE-5A9D-4D3D-A583-7FA014441C51}" presName="background3" presStyleLbl="node3" presStyleIdx="0" presStyleCnt="3"/>
+      <dgm:spPr/>
+    </dgm:pt>
+    <dgm:pt modelId="{23EF96DB-4BC4-4BFF-A0F6-595B9165E4CE}" type="pres">
+      <dgm:prSet presAssocID="{2F0FB5DE-5A9D-4D3D-A583-7FA014441C51}" presName="text3" presStyleLbl="fgAcc3" presStyleIdx="0" presStyleCnt="3">
         <dgm:presLayoutVars>
           <dgm:chPref val="3"/>
         </dgm:presLayoutVars>
@@ -6569,32 +6826,12 @@
         </a:p>
       </dgm:t>
     </dgm:pt>
-    <dgm:pt modelId="{42307C8F-5818-451A-A249-204823F3327D}" type="pres">
-      <dgm:prSet presAssocID="{138477FA-333B-4AB0-980B-48446CB1EFD2}" presName="hierChild3" presStyleCnt="0"/>
-      <dgm:spPr/>
-    </dgm:pt>
-    <dgm:pt modelId="{4FA11906-E566-4FBA-ACC9-2A1AECDE4F2F}" type="pres">
-      <dgm:prSet presAssocID="{9E490765-B107-4D33-8C25-09342EA16EDF}" presName="Name17" presStyleLbl="parChTrans1D3" presStyleIdx="1" presStyleCnt="3"/>
-      <dgm:spPr/>
-    </dgm:pt>
-    <dgm:pt modelId="{878C2DF1-C024-4EBB-A618-AC11647947CA}" type="pres">
-      <dgm:prSet presAssocID="{33E532F8-23C7-459D-894E-03E7C25C999D}" presName="hierRoot3" presStyleCnt="0"/>
-      <dgm:spPr/>
-    </dgm:pt>
-    <dgm:pt modelId="{FE30D32E-D736-4706-8F67-24B7F331E0D3}" type="pres">
-      <dgm:prSet presAssocID="{33E532F8-23C7-459D-894E-03E7C25C999D}" presName="composite3" presStyleCnt="0"/>
-      <dgm:spPr/>
-    </dgm:pt>
-    <dgm:pt modelId="{B218574D-9AA9-4FC6-ACD5-705527619D50}" type="pres">
-      <dgm:prSet presAssocID="{33E532F8-23C7-459D-894E-03E7C25C999D}" presName="background3" presStyleLbl="node3" presStyleIdx="1" presStyleCnt="3"/>
-      <dgm:spPr/>
-    </dgm:pt>
-    <dgm:pt modelId="{3D02BFF2-8FFC-4ECE-A7B4-049869A6D83E}" type="pres">
-      <dgm:prSet presAssocID="{33E532F8-23C7-459D-894E-03E7C25C999D}" presName="text3" presStyleLbl="fgAcc3" presStyleIdx="1" presStyleCnt="3">
-        <dgm:presLayoutVars>
-          <dgm:chPref val="3"/>
-        </dgm:presLayoutVars>
-      </dgm:prSet>
+    <dgm:pt modelId="{F6DBD380-BAE3-4AE9-8336-45705DE240C3}" type="pres">
+      <dgm:prSet presAssocID="{2F0FB5DE-5A9D-4D3D-A583-7FA014441C51}" presName="hierChild4" presStyleCnt="0"/>
+      <dgm:spPr/>
+    </dgm:pt>
+    <dgm:pt modelId="{F9404CB4-28B5-4983-A516-3F7A94617B67}" type="pres">
+      <dgm:prSet presAssocID="{95EA9144-B8E2-463C-B4F4-77B55A351B27}" presName="Name23" presStyleLbl="parChTrans1D4" presStyleIdx="0" presStyleCnt="2"/>
       <dgm:spPr/>
       <dgm:t>
         <a:bodyPr/>
@@ -6604,6 +6841,117 @@
         </a:p>
       </dgm:t>
     </dgm:pt>
+    <dgm:pt modelId="{1B725075-70F9-4A0C-AC8F-4DB3427A3707}" type="pres">
+      <dgm:prSet presAssocID="{A9C2D848-281E-42B3-84EF-C2D5CFE7CF11}" presName="hierRoot4" presStyleCnt="0"/>
+      <dgm:spPr/>
+    </dgm:pt>
+    <dgm:pt modelId="{BBECFC40-0CF1-46A5-91DB-AEE8B855E0FA}" type="pres">
+      <dgm:prSet presAssocID="{A9C2D848-281E-42B3-84EF-C2D5CFE7CF11}" presName="composite4" presStyleCnt="0"/>
+      <dgm:spPr/>
+    </dgm:pt>
+    <dgm:pt modelId="{4F97DA0F-CA2C-4DFC-94D7-D273FB7AF9D3}" type="pres">
+      <dgm:prSet presAssocID="{A9C2D848-281E-42B3-84EF-C2D5CFE7CF11}" presName="background4" presStyleLbl="node4" presStyleIdx="0" presStyleCnt="2"/>
+      <dgm:spPr/>
+    </dgm:pt>
+    <dgm:pt modelId="{1DA59ED9-F503-4A52-82DA-D69BBEAAF564}" type="pres">
+      <dgm:prSet presAssocID="{A9C2D848-281E-42B3-84EF-C2D5CFE7CF11}" presName="text4" presStyleLbl="fgAcc4" presStyleIdx="0" presStyleCnt="2">
+        <dgm:presLayoutVars>
+          <dgm:chPref val="3"/>
+        </dgm:presLayoutVars>
+      </dgm:prSet>
+      <dgm:spPr/>
+      <dgm:t>
+        <a:bodyPr/>
+        <a:lstStyle/>
+        <a:p>
+          <a:endParaRPr lang="en-US"/>
+        </a:p>
+      </dgm:t>
+    </dgm:pt>
+    <dgm:pt modelId="{889553DA-DBD6-4F6E-AD63-8C2DBAF05D8D}" type="pres">
+      <dgm:prSet presAssocID="{A9C2D848-281E-42B3-84EF-C2D5CFE7CF11}" presName="hierChild5" presStyleCnt="0"/>
+      <dgm:spPr/>
+    </dgm:pt>
+    <dgm:pt modelId="{5496AA36-6C29-4402-87AE-3BA3F7F7FB10}" type="pres">
+      <dgm:prSet presAssocID="{B01C31C9-35B1-41F1-BCF9-106809662280}" presName="Name10" presStyleLbl="parChTrans1D2" presStyleIdx="1" presStyleCnt="2"/>
+      <dgm:spPr/>
+      <dgm:t>
+        <a:bodyPr/>
+        <a:lstStyle/>
+        <a:p>
+          <a:endParaRPr lang="en-US"/>
+        </a:p>
+      </dgm:t>
+    </dgm:pt>
+    <dgm:pt modelId="{58841F15-3EB7-41D3-9DF7-7216900091F0}" type="pres">
+      <dgm:prSet presAssocID="{138477FA-333B-4AB0-980B-48446CB1EFD2}" presName="hierRoot2" presStyleCnt="0"/>
+      <dgm:spPr/>
+    </dgm:pt>
+    <dgm:pt modelId="{D92DC0EA-997F-46D2-A194-A91315686FA1}" type="pres">
+      <dgm:prSet presAssocID="{138477FA-333B-4AB0-980B-48446CB1EFD2}" presName="composite2" presStyleCnt="0"/>
+      <dgm:spPr/>
+    </dgm:pt>
+    <dgm:pt modelId="{989D2EA1-9439-4DA1-8943-DD924ED047AB}" type="pres">
+      <dgm:prSet presAssocID="{138477FA-333B-4AB0-980B-48446CB1EFD2}" presName="background2" presStyleLbl="node2" presStyleIdx="1" presStyleCnt="2"/>
+      <dgm:spPr/>
+    </dgm:pt>
+    <dgm:pt modelId="{A16E1DCD-7FAB-448D-A679-39CB0A27E971}" type="pres">
+      <dgm:prSet presAssocID="{138477FA-333B-4AB0-980B-48446CB1EFD2}" presName="text2" presStyleLbl="fgAcc2" presStyleIdx="1" presStyleCnt="2">
+        <dgm:presLayoutVars>
+          <dgm:chPref val="3"/>
+        </dgm:presLayoutVars>
+      </dgm:prSet>
+      <dgm:spPr/>
+      <dgm:t>
+        <a:bodyPr/>
+        <a:lstStyle/>
+        <a:p>
+          <a:endParaRPr lang="en-US"/>
+        </a:p>
+      </dgm:t>
+    </dgm:pt>
+    <dgm:pt modelId="{42307C8F-5818-451A-A249-204823F3327D}" type="pres">
+      <dgm:prSet presAssocID="{138477FA-333B-4AB0-980B-48446CB1EFD2}" presName="hierChild3" presStyleCnt="0"/>
+      <dgm:spPr/>
+    </dgm:pt>
+    <dgm:pt modelId="{4FA11906-E566-4FBA-ACC9-2A1AECDE4F2F}" type="pres">
+      <dgm:prSet presAssocID="{9E490765-B107-4D33-8C25-09342EA16EDF}" presName="Name17" presStyleLbl="parChTrans1D3" presStyleIdx="1" presStyleCnt="3"/>
+      <dgm:spPr/>
+      <dgm:t>
+        <a:bodyPr/>
+        <a:lstStyle/>
+        <a:p>
+          <a:endParaRPr lang="en-US"/>
+        </a:p>
+      </dgm:t>
+    </dgm:pt>
+    <dgm:pt modelId="{878C2DF1-C024-4EBB-A618-AC11647947CA}" type="pres">
+      <dgm:prSet presAssocID="{33E532F8-23C7-459D-894E-03E7C25C999D}" presName="hierRoot3" presStyleCnt="0"/>
+      <dgm:spPr/>
+    </dgm:pt>
+    <dgm:pt modelId="{FE30D32E-D736-4706-8F67-24B7F331E0D3}" type="pres">
+      <dgm:prSet presAssocID="{33E532F8-23C7-459D-894E-03E7C25C999D}" presName="composite3" presStyleCnt="0"/>
+      <dgm:spPr/>
+    </dgm:pt>
+    <dgm:pt modelId="{B218574D-9AA9-4FC6-ACD5-705527619D50}" type="pres">
+      <dgm:prSet presAssocID="{33E532F8-23C7-459D-894E-03E7C25C999D}" presName="background3" presStyleLbl="node3" presStyleIdx="1" presStyleCnt="3"/>
+      <dgm:spPr/>
+    </dgm:pt>
+    <dgm:pt modelId="{3D02BFF2-8FFC-4ECE-A7B4-049869A6D83E}" type="pres">
+      <dgm:prSet presAssocID="{33E532F8-23C7-459D-894E-03E7C25C999D}" presName="text3" presStyleLbl="fgAcc3" presStyleIdx="1" presStyleCnt="3">
+        <dgm:presLayoutVars>
+          <dgm:chPref val="3"/>
+        </dgm:presLayoutVars>
+      </dgm:prSet>
+      <dgm:spPr/>
+      <dgm:t>
+        <a:bodyPr/>
+        <a:lstStyle/>
+        <a:p>
+          <a:endParaRPr lang="en-US"/>
+        </a:p>
+      </dgm:t>
+    </dgm:pt>
     <dgm:pt modelId="{0646CF82-5900-4DE4-BC64-16FDAC37F3B8}" type="pres">
       <dgm:prSet presAssocID="{33E532F8-23C7-459D-894E-03E7C25C999D}" presName="hierChild4" presStyleCnt="0"/>
       <dgm:spPr/>
@@ -6611,6 +6959,13 @@
     <dgm:pt modelId="{73529E22-9C5D-4C56-A4DA-969CA61D2202}" type="pres">
       <dgm:prSet presAssocID="{72407010-6A36-4322-AFC6-C956746DE043}" presName="Name23" presStyleLbl="parChTrans1D4" presStyleIdx="1" presStyleCnt="2"/>
       <dgm:spPr/>
+      <dgm:t>
+        <a:bodyPr/>
+        <a:lstStyle/>
+        <a:p>
+          <a:endParaRPr lang="en-US"/>
+        </a:p>
+      </dgm:t>
     </dgm:pt>
     <dgm:pt modelId="{0233885E-7852-49F0-A6EE-CF2A74F72C40}" type="pres">
       <dgm:prSet presAssocID="{03ADC67A-ED97-4090-B744-AA9FF2A68AA7}" presName="hierRoot4" presStyleCnt="0"/>
@@ -6631,6 +6986,13 @@
         </dgm:presLayoutVars>
       </dgm:prSet>
       <dgm:spPr/>
+      <dgm:t>
+        <a:bodyPr/>
+        <a:lstStyle/>
+        <a:p>
+          <a:endParaRPr lang="en-US"/>
+        </a:p>
+      </dgm:t>
     </dgm:pt>
     <dgm:pt modelId="{309F2F4E-3500-4F0F-A440-27E0704867D1}" type="pres">
       <dgm:prSet presAssocID="{03ADC67A-ED97-4090-B744-AA9FF2A68AA7}" presName="hierChild5" presStyleCnt="0"/>
@@ -6639,6 +7001,13 @@
     <dgm:pt modelId="{D582469F-B300-4441-8B7A-811F2944BE7C}" type="pres">
       <dgm:prSet presAssocID="{B59F3437-6872-40D3-9770-9B57C873B960}" presName="Name17" presStyleLbl="parChTrans1D3" presStyleIdx="2" presStyleCnt="3"/>
       <dgm:spPr/>
+      <dgm:t>
+        <a:bodyPr/>
+        <a:lstStyle/>
+        <a:p>
+          <a:endParaRPr lang="en-US"/>
+        </a:p>
+      </dgm:t>
     </dgm:pt>
     <dgm:pt modelId="{137CD1A6-429F-4472-8075-2AAC931240C2}" type="pres">
       <dgm:prSet presAssocID="{2B827F71-BD4B-4C27-994F-A9FD012AAF72}" presName="hierRoot3" presStyleCnt="0"/>
@@ -6659,6 +7028,13 @@
         </dgm:presLayoutVars>
       </dgm:prSet>
       <dgm:spPr/>
+      <dgm:t>
+        <a:bodyPr/>
+        <a:lstStyle/>
+        <a:p>
+          <a:endParaRPr lang="en-US"/>
+        </a:p>
+      </dgm:t>
     </dgm:pt>
     <dgm:pt modelId="{41E9E1B3-C577-4E7F-86D7-C65D8EC836C8}" type="pres">
       <dgm:prSet presAssocID="{2B827F71-BD4B-4C27-994F-A9FD012AAF72}" presName="hierChild4" presStyleCnt="0"/>
@@ -6676,8 +7052,8 @@
     <dgm:cxn modelId="{C12B0FCA-D3A9-4FFA-93CF-4EE7A6398712}" type="presOf" srcId="{2F0FB5DE-5A9D-4D3D-A583-7FA014441C51}" destId="{23EF96DB-4BC4-4BFF-A0F6-595B9165E4CE}" srcOrd="0" destOrd="0" presId="urn:microsoft.com/office/officeart/2005/8/layout/hierarchy1"/>
     <dgm:cxn modelId="{BAD836F9-3597-4730-A1E8-4C2259977C0A}" type="presOf" srcId="{9E490765-B107-4D33-8C25-09342EA16EDF}" destId="{4FA11906-E566-4FBA-ACC9-2A1AECDE4F2F}" srcOrd="0" destOrd="0" presId="urn:microsoft.com/office/officeart/2005/8/layout/hierarchy1"/>
     <dgm:cxn modelId="{326D1F0E-A188-47AB-BF1B-A10426648C9F}" srcId="{138477FA-333B-4AB0-980B-48446CB1EFD2}" destId="{33E532F8-23C7-459D-894E-03E7C25C999D}" srcOrd="0" destOrd="0" parTransId="{9E490765-B107-4D33-8C25-09342EA16EDF}" sibTransId="{1321FB34-4A4B-4543-BFBE-962014D012EA}"/>
+    <dgm:cxn modelId="{E5F6B916-4CB8-4A7C-92C9-97FFD76C8726}" type="presOf" srcId="{78BC4A45-6F56-4B87-AD3D-8766ED12A7E9}" destId="{F56E999E-66FD-4637-AD33-5AC8B79F1842}" srcOrd="0" destOrd="0" presId="urn:microsoft.com/office/officeart/2005/8/layout/hierarchy1"/>
     <dgm:cxn modelId="{ECA55D15-8523-4D8B-816B-5C9452C52141}" type="presOf" srcId="{2943FB02-01BF-4826-82C4-C47541C199F8}" destId="{C18B3AE3-C56B-4C46-B2FE-8FC0FF516083}" srcOrd="0" destOrd="0" presId="urn:microsoft.com/office/officeart/2005/8/layout/hierarchy1"/>
-    <dgm:cxn modelId="{E5F6B916-4CB8-4A7C-92C9-97FFD76C8726}" type="presOf" srcId="{78BC4A45-6F56-4B87-AD3D-8766ED12A7E9}" destId="{F56E999E-66FD-4637-AD33-5AC8B79F1842}" srcOrd="0" destOrd="0" presId="urn:microsoft.com/office/officeart/2005/8/layout/hierarchy1"/>
     <dgm:cxn modelId="{A1314E36-9F5C-4FFB-A7EF-A5F734DE7357}" type="presOf" srcId="{BEAA0A0E-16F1-46B3-BD98-AE1752A63BC9}" destId="{62D23EA1-F578-4E79-8C47-28F032438B69}" srcOrd="0" destOrd="0" presId="urn:microsoft.com/office/officeart/2005/8/layout/hierarchy1"/>
     <dgm:cxn modelId="{85D244F6-55FF-432D-AC33-C7E3BC56A145}" type="presOf" srcId="{138477FA-333B-4AB0-980B-48446CB1EFD2}" destId="{A16E1DCD-7FAB-448D-A679-39CB0A27E971}" srcOrd="0" destOrd="0" presId="urn:microsoft.com/office/officeart/2005/8/layout/hierarchy1"/>
     <dgm:cxn modelId="{A42C3C2D-20FB-422F-8D94-5C0F62C5A012}" type="presOf" srcId="{09A54D86-7716-42F8-9270-26C5A7FB1AB5}" destId="{6E6EC764-966F-4CBB-8AD4-11EFBFEC79FB}" srcOrd="0" destOrd="0" presId="urn:microsoft.com/office/officeart/2005/8/layout/hierarchy1"/>
@@ -7032,26 +7408,6 @@
         </dgm:presLayoutVars>
       </dgm:prSet>
       <dgm:spPr/>
-    </dgm:pt>
-    <dgm:pt modelId="{2A2D0A1F-DF5B-4D62-8359-75FED3464955}" type="pres">
-      <dgm:prSet presAssocID="{9D2A9343-514F-42AD-8709-9CF866F8BCB7}" presName="hierRoot1" presStyleCnt="0"/>
-      <dgm:spPr/>
-    </dgm:pt>
-    <dgm:pt modelId="{67DE11BD-B662-4088-8777-35F65D0117A2}" type="pres">
-      <dgm:prSet presAssocID="{9D2A9343-514F-42AD-8709-9CF866F8BCB7}" presName="composite" presStyleCnt="0"/>
-      <dgm:spPr/>
-    </dgm:pt>
-    <dgm:pt modelId="{E9198AC2-9187-42A7-8316-2334E731B4D9}" type="pres">
-      <dgm:prSet presAssocID="{9D2A9343-514F-42AD-8709-9CF866F8BCB7}" presName="background" presStyleLbl="node0" presStyleIdx="0" presStyleCnt="1"/>
-      <dgm:spPr/>
-    </dgm:pt>
-    <dgm:pt modelId="{1BED93CD-BA7B-4499-826C-20AE6140A068}" type="pres">
-      <dgm:prSet presAssocID="{9D2A9343-514F-42AD-8709-9CF866F8BCB7}" presName="text" presStyleLbl="fgAcc0" presStyleIdx="0" presStyleCnt="1">
-        <dgm:presLayoutVars>
-          <dgm:chPref val="3"/>
-        </dgm:presLayoutVars>
-      </dgm:prSet>
-      <dgm:spPr/>
       <dgm:t>
         <a:bodyPr/>
         <a:lstStyle/>
@@ -7060,28 +7416,20 @@
         </a:p>
       </dgm:t>
     </dgm:pt>
-    <dgm:pt modelId="{106D85AC-B89C-441A-A093-C690B8A40C10}" type="pres">
-      <dgm:prSet presAssocID="{9D2A9343-514F-42AD-8709-9CF866F8BCB7}" presName="hierChild2" presStyleCnt="0"/>
-      <dgm:spPr/>
-    </dgm:pt>
-    <dgm:pt modelId="{C18B3AE3-C56B-4C46-B2FE-8FC0FF516083}" type="pres">
-      <dgm:prSet presAssocID="{2943FB02-01BF-4826-82C4-C47541C199F8}" presName="Name10" presStyleLbl="parChTrans1D2" presStyleIdx="0" presStyleCnt="2"/>
-      <dgm:spPr/>
-    </dgm:pt>
-    <dgm:pt modelId="{DE6675B3-14DB-4FEE-9B01-0C9CD90D5550}" type="pres">
-      <dgm:prSet presAssocID="{09A54D86-7716-42F8-9270-26C5A7FB1AB5}" presName="hierRoot2" presStyleCnt="0"/>
-      <dgm:spPr/>
-    </dgm:pt>
-    <dgm:pt modelId="{1C1140BA-586B-4D14-B29D-0094D68507D5}" type="pres">
-      <dgm:prSet presAssocID="{09A54D86-7716-42F8-9270-26C5A7FB1AB5}" presName="composite2" presStyleCnt="0"/>
-      <dgm:spPr/>
-    </dgm:pt>
-    <dgm:pt modelId="{0FAC0412-8017-4535-AC2C-8A81766BC88D}" type="pres">
-      <dgm:prSet presAssocID="{09A54D86-7716-42F8-9270-26C5A7FB1AB5}" presName="background2" presStyleLbl="node2" presStyleIdx="0" presStyleCnt="2"/>
-      <dgm:spPr/>
-    </dgm:pt>
-    <dgm:pt modelId="{6E6EC764-966F-4CBB-8AD4-11EFBFEC79FB}" type="pres">
-      <dgm:prSet presAssocID="{09A54D86-7716-42F8-9270-26C5A7FB1AB5}" presName="text2" presStyleLbl="fgAcc2" presStyleIdx="0" presStyleCnt="2">
+    <dgm:pt modelId="{2A2D0A1F-DF5B-4D62-8359-75FED3464955}" type="pres">
+      <dgm:prSet presAssocID="{9D2A9343-514F-42AD-8709-9CF866F8BCB7}" presName="hierRoot1" presStyleCnt="0"/>
+      <dgm:spPr/>
+    </dgm:pt>
+    <dgm:pt modelId="{67DE11BD-B662-4088-8777-35F65D0117A2}" type="pres">
+      <dgm:prSet presAssocID="{9D2A9343-514F-42AD-8709-9CF866F8BCB7}" presName="composite" presStyleCnt="0"/>
+      <dgm:spPr/>
+    </dgm:pt>
+    <dgm:pt modelId="{E9198AC2-9187-42A7-8316-2334E731B4D9}" type="pres">
+      <dgm:prSet presAssocID="{9D2A9343-514F-42AD-8709-9CF866F8BCB7}" presName="background" presStyleLbl="node0" presStyleIdx="0" presStyleCnt="1"/>
+      <dgm:spPr/>
+    </dgm:pt>
+    <dgm:pt modelId="{1BED93CD-BA7B-4499-826C-20AE6140A068}" type="pres">
+      <dgm:prSet presAssocID="{9D2A9343-514F-42AD-8709-9CF866F8BCB7}" presName="text" presStyleLbl="fgAcc0" presStyleIdx="0" presStyleCnt="1">
         <dgm:presLayoutVars>
           <dgm:chPref val="3"/>
         </dgm:presLayoutVars>
@@ -7095,32 +7443,12 @@
         </a:p>
       </dgm:t>
     </dgm:pt>
-    <dgm:pt modelId="{6E2EFEBF-C1AB-468A-B69E-A9A276A22E79}" type="pres">
-      <dgm:prSet presAssocID="{09A54D86-7716-42F8-9270-26C5A7FB1AB5}" presName="hierChild3" presStyleCnt="0"/>
-      <dgm:spPr/>
-    </dgm:pt>
-    <dgm:pt modelId="{F56E999E-66FD-4637-AD33-5AC8B79F1842}" type="pres">
-      <dgm:prSet presAssocID="{78BC4A45-6F56-4B87-AD3D-8766ED12A7E9}" presName="Name17" presStyleLbl="parChTrans1D3" presStyleIdx="0" presStyleCnt="2"/>
-      <dgm:spPr/>
-    </dgm:pt>
-    <dgm:pt modelId="{B6638D92-2FBA-4C12-A490-4C9FCAE716A5}" type="pres">
-      <dgm:prSet presAssocID="{2F0FB5DE-5A9D-4D3D-A583-7FA014441C51}" presName="hierRoot3" presStyleCnt="0"/>
-      <dgm:spPr/>
-    </dgm:pt>
-    <dgm:pt modelId="{6FD56B1B-E08A-4ADC-AC54-FD7C3C4FEF16}" type="pres">
-      <dgm:prSet presAssocID="{2F0FB5DE-5A9D-4D3D-A583-7FA014441C51}" presName="composite3" presStyleCnt="0"/>
-      <dgm:spPr/>
-    </dgm:pt>
-    <dgm:pt modelId="{D903AFF5-E5F6-4466-924A-0B5E49DA2031}" type="pres">
-      <dgm:prSet presAssocID="{2F0FB5DE-5A9D-4D3D-A583-7FA014441C51}" presName="background3" presStyleLbl="node3" presStyleIdx="0" presStyleCnt="2"/>
-      <dgm:spPr/>
-    </dgm:pt>
-    <dgm:pt modelId="{23EF96DB-4BC4-4BFF-A0F6-595B9165E4CE}" type="pres">
-      <dgm:prSet presAssocID="{2F0FB5DE-5A9D-4D3D-A583-7FA014441C51}" presName="text3" presStyleLbl="fgAcc3" presStyleIdx="0" presStyleCnt="2">
-        <dgm:presLayoutVars>
-          <dgm:chPref val="3"/>
-        </dgm:presLayoutVars>
-      </dgm:prSet>
+    <dgm:pt modelId="{106D85AC-B89C-441A-A093-C690B8A40C10}" type="pres">
+      <dgm:prSet presAssocID="{9D2A9343-514F-42AD-8709-9CF866F8BCB7}" presName="hierChild2" presStyleCnt="0"/>
+      <dgm:spPr/>
+    </dgm:pt>
+    <dgm:pt modelId="{C18B3AE3-C56B-4C46-B2FE-8FC0FF516083}" type="pres">
+      <dgm:prSet presAssocID="{2943FB02-01BF-4826-82C4-C47541C199F8}" presName="Name10" presStyleLbl="parChTrans1D2" presStyleIdx="0" presStyleCnt="2"/>
       <dgm:spPr/>
       <dgm:t>
         <a:bodyPr/>
@@ -7130,12 +7458,24 @@
         </a:p>
       </dgm:t>
     </dgm:pt>
-    <dgm:pt modelId="{F6DBD380-BAE3-4AE9-8336-45705DE240C3}" type="pres">
-      <dgm:prSet presAssocID="{2F0FB5DE-5A9D-4D3D-A583-7FA014441C51}" presName="hierChild4" presStyleCnt="0"/>
-      <dgm:spPr/>
-    </dgm:pt>
-    <dgm:pt modelId="{F9404CB4-28B5-4983-A516-3F7A94617B67}" type="pres">
-      <dgm:prSet presAssocID="{95EA9144-B8E2-463C-B4F4-77B55A351B27}" presName="Name23" presStyleLbl="parChTrans1D4" presStyleIdx="0" presStyleCnt="2"/>
+    <dgm:pt modelId="{DE6675B3-14DB-4FEE-9B01-0C9CD90D5550}" type="pres">
+      <dgm:prSet presAssocID="{09A54D86-7716-42F8-9270-26C5A7FB1AB5}" presName="hierRoot2" presStyleCnt="0"/>
+      <dgm:spPr/>
+    </dgm:pt>
+    <dgm:pt modelId="{1C1140BA-586B-4D14-B29D-0094D68507D5}" type="pres">
+      <dgm:prSet presAssocID="{09A54D86-7716-42F8-9270-26C5A7FB1AB5}" presName="composite2" presStyleCnt="0"/>
+      <dgm:spPr/>
+    </dgm:pt>
+    <dgm:pt modelId="{0FAC0412-8017-4535-AC2C-8A81766BC88D}" type="pres">
+      <dgm:prSet presAssocID="{09A54D86-7716-42F8-9270-26C5A7FB1AB5}" presName="background2" presStyleLbl="node2" presStyleIdx="0" presStyleCnt="2"/>
+      <dgm:spPr/>
+    </dgm:pt>
+    <dgm:pt modelId="{6E6EC764-966F-4CBB-8AD4-11EFBFEC79FB}" type="pres">
+      <dgm:prSet presAssocID="{09A54D86-7716-42F8-9270-26C5A7FB1AB5}" presName="text2" presStyleLbl="fgAcc2" presStyleIdx="0" presStyleCnt="2">
+        <dgm:presLayoutVars>
+          <dgm:chPref val="3"/>
+        </dgm:presLayoutVars>
+      </dgm:prSet>
       <dgm:spPr/>
       <dgm:t>
         <a:bodyPr/>
@@ -7145,24 +7485,12 @@
         </a:p>
       </dgm:t>
     </dgm:pt>
-    <dgm:pt modelId="{1B725075-70F9-4A0C-AC8F-4DB3427A3707}" type="pres">
-      <dgm:prSet presAssocID="{A9C2D848-281E-42B3-84EF-C2D5CFE7CF11}" presName="hierRoot4" presStyleCnt="0"/>
-      <dgm:spPr/>
-    </dgm:pt>
-    <dgm:pt modelId="{BBECFC40-0CF1-46A5-91DB-AEE8B855E0FA}" type="pres">
-      <dgm:prSet presAssocID="{A9C2D848-281E-42B3-84EF-C2D5CFE7CF11}" presName="composite4" presStyleCnt="0"/>
-      <dgm:spPr/>
-    </dgm:pt>
-    <dgm:pt modelId="{4F97DA0F-CA2C-4DFC-94D7-D273FB7AF9D3}" type="pres">
-      <dgm:prSet presAssocID="{A9C2D848-281E-42B3-84EF-C2D5CFE7CF11}" presName="background4" presStyleLbl="node4" presStyleIdx="0" presStyleCnt="2"/>
-      <dgm:spPr/>
-    </dgm:pt>
-    <dgm:pt modelId="{1DA59ED9-F503-4A52-82DA-D69BBEAAF564}" type="pres">
-      <dgm:prSet presAssocID="{A9C2D848-281E-42B3-84EF-C2D5CFE7CF11}" presName="text4" presStyleLbl="fgAcc4" presStyleIdx="0" presStyleCnt="2">
-        <dgm:presLayoutVars>
-          <dgm:chPref val="3"/>
-        </dgm:presLayoutVars>
-      </dgm:prSet>
+    <dgm:pt modelId="{6E2EFEBF-C1AB-468A-B69E-A9A276A22E79}" type="pres">
+      <dgm:prSet presAssocID="{09A54D86-7716-42F8-9270-26C5A7FB1AB5}" presName="hierChild3" presStyleCnt="0"/>
+      <dgm:spPr/>
+    </dgm:pt>
+    <dgm:pt modelId="{F56E999E-66FD-4637-AD33-5AC8B79F1842}" type="pres">
+      <dgm:prSet presAssocID="{78BC4A45-6F56-4B87-AD3D-8766ED12A7E9}" presName="Name17" presStyleLbl="parChTrans1D3" presStyleIdx="0" presStyleCnt="2"/>
       <dgm:spPr/>
       <dgm:t>
         <a:bodyPr/>
@@ -7172,6 +7500,75 @@
         </a:p>
       </dgm:t>
     </dgm:pt>
+    <dgm:pt modelId="{B6638D92-2FBA-4C12-A490-4C9FCAE716A5}" type="pres">
+      <dgm:prSet presAssocID="{2F0FB5DE-5A9D-4D3D-A583-7FA014441C51}" presName="hierRoot3" presStyleCnt="0"/>
+      <dgm:spPr/>
+    </dgm:pt>
+    <dgm:pt modelId="{6FD56B1B-E08A-4ADC-AC54-FD7C3C4FEF16}" type="pres">
+      <dgm:prSet presAssocID="{2F0FB5DE-5A9D-4D3D-A583-7FA014441C51}" presName="composite3" presStyleCnt="0"/>
+      <dgm:spPr/>
+    </dgm:pt>
+    <dgm:pt modelId="{D903AFF5-E5F6-4466-924A-0B5E49DA2031}" type="pres">
+      <dgm:prSet presAssocID="{2F0FB5DE-5A9D-4D3D-A583-7FA014441C51}" presName="background3" presStyleLbl="node3" presStyleIdx="0" presStyleCnt="2"/>
+      <dgm:spPr/>
+    </dgm:pt>
+    <dgm:pt modelId="{23EF96DB-4BC4-4BFF-A0F6-595B9165E4CE}" type="pres">
+      <dgm:prSet presAssocID="{2F0FB5DE-5A9D-4D3D-A583-7FA014441C51}" presName="text3" presStyleLbl="fgAcc3" presStyleIdx="0" presStyleCnt="2">
+        <dgm:presLayoutVars>
+          <dgm:chPref val="3"/>
+        </dgm:presLayoutVars>
+      </dgm:prSet>
+      <dgm:spPr/>
+      <dgm:t>
+        <a:bodyPr/>
+        <a:lstStyle/>
+        <a:p>
+          <a:endParaRPr lang="en-US"/>
+        </a:p>
+      </dgm:t>
+    </dgm:pt>
+    <dgm:pt modelId="{F6DBD380-BAE3-4AE9-8336-45705DE240C3}" type="pres">
+      <dgm:prSet presAssocID="{2F0FB5DE-5A9D-4D3D-A583-7FA014441C51}" presName="hierChild4" presStyleCnt="0"/>
+      <dgm:spPr/>
+    </dgm:pt>
+    <dgm:pt modelId="{F9404CB4-28B5-4983-A516-3F7A94617B67}" type="pres">
+      <dgm:prSet presAssocID="{95EA9144-B8E2-463C-B4F4-77B55A351B27}" presName="Name23" presStyleLbl="parChTrans1D4" presStyleIdx="0" presStyleCnt="2"/>
+      <dgm:spPr/>
+      <dgm:t>
+        <a:bodyPr/>
+        <a:lstStyle/>
+        <a:p>
+          <a:endParaRPr lang="en-US"/>
+        </a:p>
+      </dgm:t>
+    </dgm:pt>
+    <dgm:pt modelId="{1B725075-70F9-4A0C-AC8F-4DB3427A3707}" type="pres">
+      <dgm:prSet presAssocID="{A9C2D848-281E-42B3-84EF-C2D5CFE7CF11}" presName="hierRoot4" presStyleCnt="0"/>
+      <dgm:spPr/>
+    </dgm:pt>
+    <dgm:pt modelId="{BBECFC40-0CF1-46A5-91DB-AEE8B855E0FA}" type="pres">
+      <dgm:prSet presAssocID="{A9C2D848-281E-42B3-84EF-C2D5CFE7CF11}" presName="composite4" presStyleCnt="0"/>
+      <dgm:spPr/>
+    </dgm:pt>
+    <dgm:pt modelId="{4F97DA0F-CA2C-4DFC-94D7-D273FB7AF9D3}" type="pres">
+      <dgm:prSet presAssocID="{A9C2D848-281E-42B3-84EF-C2D5CFE7CF11}" presName="background4" presStyleLbl="node4" presStyleIdx="0" presStyleCnt="2"/>
+      <dgm:spPr/>
+    </dgm:pt>
+    <dgm:pt modelId="{1DA59ED9-F503-4A52-82DA-D69BBEAAF564}" type="pres">
+      <dgm:prSet presAssocID="{A9C2D848-281E-42B3-84EF-C2D5CFE7CF11}" presName="text4" presStyleLbl="fgAcc4" presStyleIdx="0" presStyleCnt="2">
+        <dgm:presLayoutVars>
+          <dgm:chPref val="3"/>
+        </dgm:presLayoutVars>
+      </dgm:prSet>
+      <dgm:spPr/>
+      <dgm:t>
+        <a:bodyPr/>
+        <a:lstStyle/>
+        <a:p>
+          <a:endParaRPr lang="en-US"/>
+        </a:p>
+      </dgm:t>
+    </dgm:pt>
     <dgm:pt modelId="{889553DA-DBD6-4F6E-AD63-8C2DBAF05D8D}" type="pres">
       <dgm:prSet presAssocID="{A9C2D848-281E-42B3-84EF-C2D5CFE7CF11}" presName="hierChild5" presStyleCnt="0"/>
       <dgm:spPr/>
@@ -7179,6 +7576,13 @@
     <dgm:pt modelId="{5496AA36-6C29-4402-87AE-3BA3F7F7FB10}" type="pres">
       <dgm:prSet presAssocID="{B01C31C9-35B1-41F1-BCF9-106809662280}" presName="Name10" presStyleLbl="parChTrans1D2" presStyleIdx="1" presStyleCnt="2"/>
       <dgm:spPr/>
+      <dgm:t>
+        <a:bodyPr/>
+        <a:lstStyle/>
+        <a:p>
+          <a:endParaRPr lang="en-US"/>
+        </a:p>
+      </dgm:t>
     </dgm:pt>
     <dgm:pt modelId="{58841F15-3EB7-41D3-9DF7-7216900091F0}" type="pres">
       <dgm:prSet presAssocID="{138477FA-333B-4AB0-980B-48446CB1EFD2}" presName="hierRoot2" presStyleCnt="0"/>
@@ -7199,6 +7603,13 @@
         </dgm:presLayoutVars>
       </dgm:prSet>
       <dgm:spPr/>
+      <dgm:t>
+        <a:bodyPr/>
+        <a:lstStyle/>
+        <a:p>
+          <a:endParaRPr lang="en-US"/>
+        </a:p>
+      </dgm:t>
     </dgm:pt>
     <dgm:pt modelId="{42307C8F-5818-451A-A249-204823F3327D}" type="pres">
       <dgm:prSet presAssocID="{138477FA-333B-4AB0-980B-48446CB1EFD2}" presName="hierChild3" presStyleCnt="0"/>
@@ -7207,6 +7618,13 @@
     <dgm:pt modelId="{D582469F-B300-4441-8B7A-811F2944BE7C}" type="pres">
       <dgm:prSet presAssocID="{B59F3437-6872-40D3-9770-9B57C873B960}" presName="Name17" presStyleLbl="parChTrans1D3" presStyleIdx="1" presStyleCnt="2"/>
       <dgm:spPr/>
+      <dgm:t>
+        <a:bodyPr/>
+        <a:lstStyle/>
+        <a:p>
+          <a:endParaRPr lang="en-US"/>
+        </a:p>
+      </dgm:t>
     </dgm:pt>
     <dgm:pt modelId="{137CD1A6-429F-4472-8075-2AAC931240C2}" type="pres">
       <dgm:prSet presAssocID="{2B827F71-BD4B-4C27-994F-A9FD012AAF72}" presName="hierRoot3" presStyleCnt="0"/>
@@ -7227,6 +7645,13 @@
         </dgm:presLayoutVars>
       </dgm:prSet>
       <dgm:spPr/>
+      <dgm:t>
+        <a:bodyPr/>
+        <a:lstStyle/>
+        <a:p>
+          <a:endParaRPr lang="en-US"/>
+        </a:p>
+      </dgm:t>
     </dgm:pt>
     <dgm:pt modelId="{41E9E1B3-C577-4E7F-86D7-C65D8EC836C8}" type="pres">
       <dgm:prSet presAssocID="{2B827F71-BD4B-4C27-994F-A9FD012AAF72}" presName="hierChild4" presStyleCnt="0"/>
@@ -7235,6 +7660,13 @@
     <dgm:pt modelId="{D11E734E-FAAA-4665-B742-408D48ED0D2E}" type="pres">
       <dgm:prSet presAssocID="{02BD72B2-4324-4F61-83C5-0DFF67562C8C}" presName="Name23" presStyleLbl="parChTrans1D4" presStyleIdx="1" presStyleCnt="2"/>
       <dgm:spPr/>
+      <dgm:t>
+        <a:bodyPr/>
+        <a:lstStyle/>
+        <a:p>
+          <a:endParaRPr lang="en-US"/>
+        </a:p>
+      </dgm:t>
     </dgm:pt>
     <dgm:pt modelId="{8A04CED9-F4FD-4809-A6DB-543821E2C10B}" type="pres">
       <dgm:prSet presAssocID="{1D7B47C1-CE9C-4145-8E3E-F5FE9E4B38C8}" presName="hierRoot4" presStyleCnt="0"/>
@@ -7255,6 +7687,13 @@
         </dgm:presLayoutVars>
       </dgm:prSet>
       <dgm:spPr/>
+      <dgm:t>
+        <a:bodyPr/>
+        <a:lstStyle/>
+        <a:p>
+          <a:endParaRPr lang="en-US"/>
+        </a:p>
+      </dgm:t>
     </dgm:pt>
     <dgm:pt modelId="{C88432AB-59D3-4C3B-BB71-CEDEB87C876F}" type="pres">
       <dgm:prSet presAssocID="{1D7B47C1-CE9C-4145-8E3E-F5FE9E4B38C8}" presName="hierChild5" presStyleCnt="0"/>
@@ -7262,27 +7701,27 @@
     </dgm:pt>
   </dgm:ptLst>
   <dgm:cxnLst>
+    <dgm:cxn modelId="{B1B38C92-BD8A-499B-86C3-B3CE4DAA9765}" srcId="{BEAA0A0E-16F1-46B3-BD98-AE1752A63BC9}" destId="{9D2A9343-514F-42AD-8709-9CF866F8BCB7}" srcOrd="0" destOrd="0" parTransId="{96054D28-CADE-4A78-B891-56F3D6FFCF15}" sibTransId="{8C62D617-D94B-4FDA-93A5-DCA7BD708CC5}"/>
+    <dgm:cxn modelId="{49133831-3802-457A-950F-838146DD8465}" type="presOf" srcId="{78BC4A45-6F56-4B87-AD3D-8766ED12A7E9}" destId="{F56E999E-66FD-4637-AD33-5AC8B79F1842}" srcOrd="0" destOrd="0" presId="urn:microsoft.com/office/officeart/2005/8/layout/hierarchy1"/>
+    <dgm:cxn modelId="{877BEF89-00B9-41DB-9170-0BEC4F97533D}" type="presOf" srcId="{95EA9144-B8E2-463C-B4F4-77B55A351B27}" destId="{F9404CB4-28B5-4983-A516-3F7A94617B67}" srcOrd="0" destOrd="0" presId="urn:microsoft.com/office/officeart/2005/8/layout/hierarchy1"/>
+    <dgm:cxn modelId="{1E131E78-88A3-4601-A5C5-D364D01AB7CD}" type="presOf" srcId="{B59F3437-6872-40D3-9770-9B57C873B960}" destId="{D582469F-B300-4441-8B7A-811F2944BE7C}" srcOrd="0" destOrd="0" presId="urn:microsoft.com/office/officeart/2005/8/layout/hierarchy1"/>
     <dgm:cxn modelId="{22972E9B-FF84-45A7-958B-D792324B92A3}" type="presOf" srcId="{9D2A9343-514F-42AD-8709-9CF866F8BCB7}" destId="{1BED93CD-BA7B-4499-826C-20AE6140A068}" srcOrd="0" destOrd="0" presId="urn:microsoft.com/office/officeart/2005/8/layout/hierarchy1"/>
-    <dgm:cxn modelId="{B131B415-C377-499C-899D-1AB270CC6269}" srcId="{138477FA-333B-4AB0-980B-48446CB1EFD2}" destId="{2B827F71-BD4B-4C27-994F-A9FD012AAF72}" srcOrd="0" destOrd="0" parTransId="{B59F3437-6872-40D3-9770-9B57C873B960}" sibTransId="{0866DAB3-A626-4CA3-A6C2-FAE162BE0ABC}"/>
-    <dgm:cxn modelId="{B1B38C92-BD8A-499B-86C3-B3CE4DAA9765}" srcId="{BEAA0A0E-16F1-46B3-BD98-AE1752A63BC9}" destId="{9D2A9343-514F-42AD-8709-9CF866F8BCB7}" srcOrd="0" destOrd="0" parTransId="{96054D28-CADE-4A78-B891-56F3D6FFCF15}" sibTransId="{8C62D617-D94B-4FDA-93A5-DCA7BD708CC5}"/>
-    <dgm:cxn modelId="{1E131E78-88A3-4601-A5C5-D364D01AB7CD}" type="presOf" srcId="{B59F3437-6872-40D3-9770-9B57C873B960}" destId="{D582469F-B300-4441-8B7A-811F2944BE7C}" srcOrd="0" destOrd="0" presId="urn:microsoft.com/office/officeart/2005/8/layout/hierarchy1"/>
+    <dgm:cxn modelId="{5E7D29A7-14DA-496D-B5DA-CAFA7C94FB8D}" srcId="{9D2A9343-514F-42AD-8709-9CF866F8BCB7}" destId="{09A54D86-7716-42F8-9270-26C5A7FB1AB5}" srcOrd="0" destOrd="0" parTransId="{2943FB02-01BF-4826-82C4-C47541C199F8}" sibTransId="{14552CD9-63B0-4C89-8D4C-6E71B622B796}"/>
+    <dgm:cxn modelId="{F7F54900-8205-4EC9-9C79-D690313112AD}" type="presOf" srcId="{2F0FB5DE-5A9D-4D3D-A583-7FA014441C51}" destId="{23EF96DB-4BC4-4BFF-A0F6-595B9165E4CE}" srcOrd="0" destOrd="0" presId="urn:microsoft.com/office/officeart/2005/8/layout/hierarchy1"/>
+    <dgm:cxn modelId="{3B4050D9-64F6-4726-B42B-00B2735B917A}" type="presOf" srcId="{2943FB02-01BF-4826-82C4-C47541C199F8}" destId="{C18B3AE3-C56B-4C46-B2FE-8FC0FF516083}" srcOrd="0" destOrd="0" presId="urn:microsoft.com/office/officeart/2005/8/layout/hierarchy1"/>
+    <dgm:cxn modelId="{0FD1317F-6DED-4D3F-899F-D3650617716A}" type="presOf" srcId="{2B827F71-BD4B-4C27-994F-A9FD012AAF72}" destId="{1BD4006F-235B-45D5-96E7-76BD89EC9013}" srcOrd="0" destOrd="0" presId="urn:microsoft.com/office/officeart/2005/8/layout/hierarchy1"/>
     <dgm:cxn modelId="{6B6B19B4-F507-4136-9DD9-8086B996F430}" srcId="{09A54D86-7716-42F8-9270-26C5A7FB1AB5}" destId="{2F0FB5DE-5A9D-4D3D-A583-7FA014441C51}" srcOrd="0" destOrd="0" parTransId="{78BC4A45-6F56-4B87-AD3D-8766ED12A7E9}" sibTransId="{ABC218F2-924F-48AC-A41C-EDBE8497CEFA}"/>
-    <dgm:cxn modelId="{10268D2F-DEE2-44F9-AC02-53D750D18985}" srcId="{2B827F71-BD4B-4C27-994F-A9FD012AAF72}" destId="{1D7B47C1-CE9C-4145-8E3E-F5FE9E4B38C8}" srcOrd="0" destOrd="0" parTransId="{02BD72B2-4324-4F61-83C5-0DFF67562C8C}" sibTransId="{2C1DB7DF-940F-4CDE-9D64-4491F483D566}"/>
-    <dgm:cxn modelId="{F7F54900-8205-4EC9-9C79-D690313112AD}" type="presOf" srcId="{2F0FB5DE-5A9D-4D3D-A583-7FA014441C51}" destId="{23EF96DB-4BC4-4BFF-A0F6-595B9165E4CE}" srcOrd="0" destOrd="0" presId="urn:microsoft.com/office/officeart/2005/8/layout/hierarchy1"/>
-    <dgm:cxn modelId="{877BEF89-00B9-41DB-9170-0BEC4F97533D}" type="presOf" srcId="{95EA9144-B8E2-463C-B4F4-77B55A351B27}" destId="{F9404CB4-28B5-4983-A516-3F7A94617B67}" srcOrd="0" destOrd="0" presId="urn:microsoft.com/office/officeart/2005/8/layout/hierarchy1"/>
+    <dgm:cxn modelId="{E843F7BD-BA56-46C2-B719-3E3B5C90564A}" type="presOf" srcId="{A9C2D848-281E-42B3-84EF-C2D5CFE7CF11}" destId="{1DA59ED9-F503-4A52-82DA-D69BBEAAF564}" srcOrd="0" destOrd="0" presId="urn:microsoft.com/office/officeart/2005/8/layout/hierarchy1"/>
+    <dgm:cxn modelId="{D70A325A-0A11-47F8-9405-CED62FE17E5B}" type="presOf" srcId="{BEAA0A0E-16F1-46B3-BD98-AE1752A63BC9}" destId="{62D23EA1-F578-4E79-8C47-28F032438B69}" srcOrd="0" destOrd="0" presId="urn:microsoft.com/office/officeart/2005/8/layout/hierarchy1"/>
+    <dgm:cxn modelId="{C725B614-5BDF-40C5-9B20-AC74B4925AB8}" type="presOf" srcId="{B01C31C9-35B1-41F1-BCF9-106809662280}" destId="{5496AA36-6C29-4402-87AE-3BA3F7F7FB10}" srcOrd="0" destOrd="0" presId="urn:microsoft.com/office/officeart/2005/8/layout/hierarchy1"/>
+    <dgm:cxn modelId="{7F70BFB1-C64B-4350-AD4E-5C991B7A0FD6}" type="presOf" srcId="{09A54D86-7716-42F8-9270-26C5A7FB1AB5}" destId="{6E6EC764-966F-4CBB-8AD4-11EFBFEC79FB}" srcOrd="0" destOrd="0" presId="urn:microsoft.com/office/officeart/2005/8/layout/hierarchy1"/>
     <dgm:cxn modelId="{4716D915-A422-4FC2-B8D9-44AADC3B1CBC}" type="presOf" srcId="{138477FA-333B-4AB0-980B-48446CB1EFD2}" destId="{A16E1DCD-7FAB-448D-A679-39CB0A27E971}" srcOrd="0" destOrd="0" presId="urn:microsoft.com/office/officeart/2005/8/layout/hierarchy1"/>
     <dgm:cxn modelId="{93151928-C641-448D-AB2D-314256462064}" srcId="{9D2A9343-514F-42AD-8709-9CF866F8BCB7}" destId="{138477FA-333B-4AB0-980B-48446CB1EFD2}" srcOrd="1" destOrd="0" parTransId="{B01C31C9-35B1-41F1-BCF9-106809662280}" sibTransId="{76334B11-A645-44C1-91E5-27DFE3A69752}"/>
-    <dgm:cxn modelId="{7F70BFB1-C64B-4350-AD4E-5C991B7A0FD6}" type="presOf" srcId="{09A54D86-7716-42F8-9270-26C5A7FB1AB5}" destId="{6E6EC764-966F-4CBB-8AD4-11EFBFEC79FB}" srcOrd="0" destOrd="0" presId="urn:microsoft.com/office/officeart/2005/8/layout/hierarchy1"/>
-    <dgm:cxn modelId="{5E7D29A7-14DA-496D-B5DA-CAFA7C94FB8D}" srcId="{9D2A9343-514F-42AD-8709-9CF866F8BCB7}" destId="{09A54D86-7716-42F8-9270-26C5A7FB1AB5}" srcOrd="0" destOrd="0" parTransId="{2943FB02-01BF-4826-82C4-C47541C199F8}" sibTransId="{14552CD9-63B0-4C89-8D4C-6E71B622B796}"/>
-    <dgm:cxn modelId="{D70A325A-0A11-47F8-9405-CED62FE17E5B}" type="presOf" srcId="{BEAA0A0E-16F1-46B3-BD98-AE1752A63BC9}" destId="{62D23EA1-F578-4E79-8C47-28F032438B69}" srcOrd="0" destOrd="0" presId="urn:microsoft.com/office/officeart/2005/8/layout/hierarchy1"/>
-    <dgm:cxn modelId="{0FD1317F-6DED-4D3F-899F-D3650617716A}" type="presOf" srcId="{2B827F71-BD4B-4C27-994F-A9FD012AAF72}" destId="{1BD4006F-235B-45D5-96E7-76BD89EC9013}" srcOrd="0" destOrd="0" presId="urn:microsoft.com/office/officeart/2005/8/layout/hierarchy1"/>
-    <dgm:cxn modelId="{C725B614-5BDF-40C5-9B20-AC74B4925AB8}" type="presOf" srcId="{B01C31C9-35B1-41F1-BCF9-106809662280}" destId="{5496AA36-6C29-4402-87AE-3BA3F7F7FB10}" srcOrd="0" destOrd="0" presId="urn:microsoft.com/office/officeart/2005/8/layout/hierarchy1"/>
+    <dgm:cxn modelId="{10268D2F-DEE2-44F9-AC02-53D750D18985}" srcId="{2B827F71-BD4B-4C27-994F-A9FD012AAF72}" destId="{1D7B47C1-CE9C-4145-8E3E-F5FE9E4B38C8}" srcOrd="0" destOrd="0" parTransId="{02BD72B2-4324-4F61-83C5-0DFF67562C8C}" sibTransId="{2C1DB7DF-940F-4CDE-9D64-4491F483D566}"/>
+    <dgm:cxn modelId="{61CBF262-1701-4942-8215-72BAECA4F836}" srcId="{2F0FB5DE-5A9D-4D3D-A583-7FA014441C51}" destId="{A9C2D848-281E-42B3-84EF-C2D5CFE7CF11}" srcOrd="0" destOrd="0" parTransId="{95EA9144-B8E2-463C-B4F4-77B55A351B27}" sibTransId="{A3039733-AC89-4195-BC42-F5D851217324}"/>
     <dgm:cxn modelId="{822937B6-9DE9-4B5C-BE5A-1815255A6F73}" type="presOf" srcId="{02BD72B2-4324-4F61-83C5-0DFF67562C8C}" destId="{D11E734E-FAAA-4665-B742-408D48ED0D2E}" srcOrd="0" destOrd="0" presId="urn:microsoft.com/office/officeart/2005/8/layout/hierarchy1"/>
-    <dgm:cxn modelId="{E843F7BD-BA56-46C2-B719-3E3B5C90564A}" type="presOf" srcId="{A9C2D848-281E-42B3-84EF-C2D5CFE7CF11}" destId="{1DA59ED9-F503-4A52-82DA-D69BBEAAF564}" srcOrd="0" destOrd="0" presId="urn:microsoft.com/office/officeart/2005/8/layout/hierarchy1"/>
     <dgm:cxn modelId="{A228F6CF-12FF-430D-9FB1-F78E632C6601}" type="presOf" srcId="{1D7B47C1-CE9C-4145-8E3E-F5FE9E4B38C8}" destId="{EECE5441-8010-4E85-A0EA-4D720BFCD8DD}" srcOrd="0" destOrd="0" presId="urn:microsoft.com/office/officeart/2005/8/layout/hierarchy1"/>
-    <dgm:cxn modelId="{61CBF262-1701-4942-8215-72BAECA4F836}" srcId="{2F0FB5DE-5A9D-4D3D-A583-7FA014441C51}" destId="{A9C2D848-281E-42B3-84EF-C2D5CFE7CF11}" srcOrd="0" destOrd="0" parTransId="{95EA9144-B8E2-463C-B4F4-77B55A351B27}" sibTransId="{A3039733-AC89-4195-BC42-F5D851217324}"/>
-    <dgm:cxn modelId="{49133831-3802-457A-950F-838146DD8465}" type="presOf" srcId="{78BC4A45-6F56-4B87-AD3D-8766ED12A7E9}" destId="{F56E999E-66FD-4637-AD33-5AC8B79F1842}" srcOrd="0" destOrd="0" presId="urn:microsoft.com/office/officeart/2005/8/layout/hierarchy1"/>
-    <dgm:cxn modelId="{3B4050D9-64F6-4726-B42B-00B2735B917A}" type="presOf" srcId="{2943FB02-01BF-4826-82C4-C47541C199F8}" destId="{C18B3AE3-C56B-4C46-B2FE-8FC0FF516083}" srcOrd="0" destOrd="0" presId="urn:microsoft.com/office/officeart/2005/8/layout/hierarchy1"/>
+    <dgm:cxn modelId="{B131B415-C377-499C-899D-1AB270CC6269}" srcId="{138477FA-333B-4AB0-980B-48446CB1EFD2}" destId="{2B827F71-BD4B-4C27-994F-A9FD012AAF72}" srcOrd="0" destOrd="0" parTransId="{B59F3437-6872-40D3-9770-9B57C873B960}" sibTransId="{0866DAB3-A626-4CA3-A6C2-FAE162BE0ABC}"/>
     <dgm:cxn modelId="{B8CF81C7-1E5B-4CD0-8FBF-9888415C2D7A}" type="presParOf" srcId="{62D23EA1-F578-4E79-8C47-28F032438B69}" destId="{2A2D0A1F-DF5B-4D62-8359-75FED3464955}" srcOrd="0" destOrd="0" presId="urn:microsoft.com/office/officeart/2005/8/layout/hierarchy1"/>
     <dgm:cxn modelId="{540EA61D-56BF-4485-B222-1250F5B47067}" type="presParOf" srcId="{2A2D0A1F-DF5B-4D62-8359-75FED3464955}" destId="{67DE11BD-B662-4088-8777-35F65D0117A2}" srcOrd="0" destOrd="0" presId="urn:microsoft.com/office/officeart/2005/8/layout/hierarchy1"/>
     <dgm:cxn modelId="{D65A5EB0-925D-4CDF-823B-50922AD3FBA5}" type="presParOf" srcId="{67DE11BD-B662-4088-8777-35F65D0117A2}" destId="{E9198AC2-9187-42A7-8316-2334E731B4D9}" srcOrd="0" destOrd="0" presId="urn:microsoft.com/office/officeart/2005/8/layout/hierarchy1"/>
@@ -7582,26 +8021,6 @@
         </dgm:presLayoutVars>
       </dgm:prSet>
       <dgm:spPr/>
-    </dgm:pt>
-    <dgm:pt modelId="{2A2D0A1F-DF5B-4D62-8359-75FED3464955}" type="pres">
-      <dgm:prSet presAssocID="{9D2A9343-514F-42AD-8709-9CF866F8BCB7}" presName="hierRoot1" presStyleCnt="0"/>
-      <dgm:spPr/>
-    </dgm:pt>
-    <dgm:pt modelId="{67DE11BD-B662-4088-8777-35F65D0117A2}" type="pres">
-      <dgm:prSet presAssocID="{9D2A9343-514F-42AD-8709-9CF866F8BCB7}" presName="composite" presStyleCnt="0"/>
-      <dgm:spPr/>
-    </dgm:pt>
-    <dgm:pt modelId="{E9198AC2-9187-42A7-8316-2334E731B4D9}" type="pres">
-      <dgm:prSet presAssocID="{9D2A9343-514F-42AD-8709-9CF866F8BCB7}" presName="background" presStyleLbl="node0" presStyleIdx="0" presStyleCnt="1"/>
-      <dgm:spPr/>
-    </dgm:pt>
-    <dgm:pt modelId="{1BED93CD-BA7B-4499-826C-20AE6140A068}" type="pres">
-      <dgm:prSet presAssocID="{9D2A9343-514F-42AD-8709-9CF866F8BCB7}" presName="text" presStyleLbl="fgAcc0" presStyleIdx="0" presStyleCnt="1">
-        <dgm:presLayoutVars>
-          <dgm:chPref val="3"/>
-        </dgm:presLayoutVars>
-      </dgm:prSet>
-      <dgm:spPr/>
       <dgm:t>
         <a:bodyPr/>
         <a:lstStyle/>
@@ -7610,28 +8029,20 @@
         </a:p>
       </dgm:t>
     </dgm:pt>
-    <dgm:pt modelId="{106D85AC-B89C-441A-A093-C690B8A40C10}" type="pres">
-      <dgm:prSet presAssocID="{9D2A9343-514F-42AD-8709-9CF866F8BCB7}" presName="hierChild2" presStyleCnt="0"/>
-      <dgm:spPr/>
-    </dgm:pt>
-    <dgm:pt modelId="{C18B3AE3-C56B-4C46-B2FE-8FC0FF516083}" type="pres">
-      <dgm:prSet presAssocID="{2943FB02-01BF-4826-82C4-C47541C199F8}" presName="Name10" presStyleLbl="parChTrans1D2" presStyleIdx="0" presStyleCnt="2"/>
-      <dgm:spPr/>
-    </dgm:pt>
-    <dgm:pt modelId="{DE6675B3-14DB-4FEE-9B01-0C9CD90D5550}" type="pres">
-      <dgm:prSet presAssocID="{09A54D86-7716-42F8-9270-26C5A7FB1AB5}" presName="hierRoot2" presStyleCnt="0"/>
-      <dgm:spPr/>
-    </dgm:pt>
-    <dgm:pt modelId="{1C1140BA-586B-4D14-B29D-0094D68507D5}" type="pres">
-      <dgm:prSet presAssocID="{09A54D86-7716-42F8-9270-26C5A7FB1AB5}" presName="composite2" presStyleCnt="0"/>
-      <dgm:spPr/>
-    </dgm:pt>
-    <dgm:pt modelId="{0FAC0412-8017-4535-AC2C-8A81766BC88D}" type="pres">
-      <dgm:prSet presAssocID="{09A54D86-7716-42F8-9270-26C5A7FB1AB5}" presName="background2" presStyleLbl="node2" presStyleIdx="0" presStyleCnt="2"/>
-      <dgm:spPr/>
-    </dgm:pt>
-    <dgm:pt modelId="{6E6EC764-966F-4CBB-8AD4-11EFBFEC79FB}" type="pres">
-      <dgm:prSet presAssocID="{09A54D86-7716-42F8-9270-26C5A7FB1AB5}" presName="text2" presStyleLbl="fgAcc2" presStyleIdx="0" presStyleCnt="2">
+    <dgm:pt modelId="{2A2D0A1F-DF5B-4D62-8359-75FED3464955}" type="pres">
+      <dgm:prSet presAssocID="{9D2A9343-514F-42AD-8709-9CF866F8BCB7}" presName="hierRoot1" presStyleCnt="0"/>
+      <dgm:spPr/>
+    </dgm:pt>
+    <dgm:pt modelId="{67DE11BD-B662-4088-8777-35F65D0117A2}" type="pres">
+      <dgm:prSet presAssocID="{9D2A9343-514F-42AD-8709-9CF866F8BCB7}" presName="composite" presStyleCnt="0"/>
+      <dgm:spPr/>
+    </dgm:pt>
+    <dgm:pt modelId="{E9198AC2-9187-42A7-8316-2334E731B4D9}" type="pres">
+      <dgm:prSet presAssocID="{9D2A9343-514F-42AD-8709-9CF866F8BCB7}" presName="background" presStyleLbl="node0" presStyleIdx="0" presStyleCnt="1"/>
+      <dgm:spPr/>
+    </dgm:pt>
+    <dgm:pt modelId="{1BED93CD-BA7B-4499-826C-20AE6140A068}" type="pres">
+      <dgm:prSet presAssocID="{9D2A9343-514F-42AD-8709-9CF866F8BCB7}" presName="text" presStyleLbl="fgAcc0" presStyleIdx="0" presStyleCnt="1">
         <dgm:presLayoutVars>
           <dgm:chPref val="3"/>
         </dgm:presLayoutVars>
@@ -7645,32 +8056,12 @@
         </a:p>
       </dgm:t>
     </dgm:pt>
-    <dgm:pt modelId="{6E2EFEBF-C1AB-468A-B69E-A9A276A22E79}" type="pres">
-      <dgm:prSet presAssocID="{09A54D86-7716-42F8-9270-26C5A7FB1AB5}" presName="hierChild3" presStyleCnt="0"/>
-      <dgm:spPr/>
-    </dgm:pt>
-    <dgm:pt modelId="{F56E999E-66FD-4637-AD33-5AC8B79F1842}" type="pres">
-      <dgm:prSet presAssocID="{78BC4A45-6F56-4B87-AD3D-8766ED12A7E9}" presName="Name17" presStyleLbl="parChTrans1D3" presStyleIdx="0" presStyleCnt="2"/>
-      <dgm:spPr/>
-    </dgm:pt>
-    <dgm:pt modelId="{B6638D92-2FBA-4C12-A490-4C9FCAE716A5}" type="pres">
-      <dgm:prSet presAssocID="{2F0FB5DE-5A9D-4D3D-A583-7FA014441C51}" presName="hierRoot3" presStyleCnt="0"/>
-      <dgm:spPr/>
-    </dgm:pt>
-    <dgm:pt modelId="{6FD56B1B-E08A-4ADC-AC54-FD7C3C4FEF16}" type="pres">
-      <dgm:prSet presAssocID="{2F0FB5DE-5A9D-4D3D-A583-7FA014441C51}" presName="composite3" presStyleCnt="0"/>
-      <dgm:spPr/>
-    </dgm:pt>
-    <dgm:pt modelId="{D903AFF5-E5F6-4466-924A-0B5E49DA2031}" type="pres">
-      <dgm:prSet presAssocID="{2F0FB5DE-5A9D-4D3D-A583-7FA014441C51}" presName="background3" presStyleLbl="node3" presStyleIdx="0" presStyleCnt="2"/>
-      <dgm:spPr/>
-    </dgm:pt>
-    <dgm:pt modelId="{23EF96DB-4BC4-4BFF-A0F6-595B9165E4CE}" type="pres">
-      <dgm:prSet presAssocID="{2F0FB5DE-5A9D-4D3D-A583-7FA014441C51}" presName="text3" presStyleLbl="fgAcc3" presStyleIdx="0" presStyleCnt="2">
-        <dgm:presLayoutVars>
-          <dgm:chPref val="3"/>
-        </dgm:presLayoutVars>
-      </dgm:prSet>
+    <dgm:pt modelId="{106D85AC-B89C-441A-A093-C690B8A40C10}" type="pres">
+      <dgm:prSet presAssocID="{9D2A9343-514F-42AD-8709-9CF866F8BCB7}" presName="hierChild2" presStyleCnt="0"/>
+      <dgm:spPr/>
+    </dgm:pt>
+    <dgm:pt modelId="{C18B3AE3-C56B-4C46-B2FE-8FC0FF516083}" type="pres">
+      <dgm:prSet presAssocID="{2943FB02-01BF-4826-82C4-C47541C199F8}" presName="Name10" presStyleLbl="parChTrans1D2" presStyleIdx="0" presStyleCnt="2"/>
       <dgm:spPr/>
       <dgm:t>
         <a:bodyPr/>
@@ -7680,12 +8071,24 @@
         </a:p>
       </dgm:t>
     </dgm:pt>
-    <dgm:pt modelId="{F6DBD380-BAE3-4AE9-8336-45705DE240C3}" type="pres">
-      <dgm:prSet presAssocID="{2F0FB5DE-5A9D-4D3D-A583-7FA014441C51}" presName="hierChild4" presStyleCnt="0"/>
-      <dgm:spPr/>
-    </dgm:pt>
-    <dgm:pt modelId="{F9404CB4-28B5-4983-A516-3F7A94617B67}" type="pres">
-      <dgm:prSet presAssocID="{95EA9144-B8E2-463C-B4F4-77B55A351B27}" presName="Name23" presStyleLbl="parChTrans1D4" presStyleIdx="0" presStyleCnt="1"/>
+    <dgm:pt modelId="{DE6675B3-14DB-4FEE-9B01-0C9CD90D5550}" type="pres">
+      <dgm:prSet presAssocID="{09A54D86-7716-42F8-9270-26C5A7FB1AB5}" presName="hierRoot2" presStyleCnt="0"/>
+      <dgm:spPr/>
+    </dgm:pt>
+    <dgm:pt modelId="{1C1140BA-586B-4D14-B29D-0094D68507D5}" type="pres">
+      <dgm:prSet presAssocID="{09A54D86-7716-42F8-9270-26C5A7FB1AB5}" presName="composite2" presStyleCnt="0"/>
+      <dgm:spPr/>
+    </dgm:pt>
+    <dgm:pt modelId="{0FAC0412-8017-4535-AC2C-8A81766BC88D}" type="pres">
+      <dgm:prSet presAssocID="{09A54D86-7716-42F8-9270-26C5A7FB1AB5}" presName="background2" presStyleLbl="node2" presStyleIdx="0" presStyleCnt="2"/>
+      <dgm:spPr/>
+    </dgm:pt>
+    <dgm:pt modelId="{6E6EC764-966F-4CBB-8AD4-11EFBFEC79FB}" type="pres">
+      <dgm:prSet presAssocID="{09A54D86-7716-42F8-9270-26C5A7FB1AB5}" presName="text2" presStyleLbl="fgAcc2" presStyleIdx="0" presStyleCnt="2">
+        <dgm:presLayoutVars>
+          <dgm:chPref val="3"/>
+        </dgm:presLayoutVars>
+      </dgm:prSet>
       <dgm:spPr/>
       <dgm:t>
         <a:bodyPr/>
@@ -7695,24 +8098,12 @@
         </a:p>
       </dgm:t>
     </dgm:pt>
-    <dgm:pt modelId="{1B725075-70F9-4A0C-AC8F-4DB3427A3707}" type="pres">
-      <dgm:prSet presAssocID="{A9C2D848-281E-42B3-84EF-C2D5CFE7CF11}" presName="hierRoot4" presStyleCnt="0"/>
-      <dgm:spPr/>
-    </dgm:pt>
-    <dgm:pt modelId="{BBECFC40-0CF1-46A5-91DB-AEE8B855E0FA}" type="pres">
-      <dgm:prSet presAssocID="{A9C2D848-281E-42B3-84EF-C2D5CFE7CF11}" presName="composite4" presStyleCnt="0"/>
-      <dgm:spPr/>
-    </dgm:pt>
-    <dgm:pt modelId="{4F97DA0F-CA2C-4DFC-94D7-D273FB7AF9D3}" type="pres">
-      <dgm:prSet presAssocID="{A9C2D848-281E-42B3-84EF-C2D5CFE7CF11}" presName="background4" presStyleLbl="node4" presStyleIdx="0" presStyleCnt="1"/>
-      <dgm:spPr/>
-    </dgm:pt>
-    <dgm:pt modelId="{1DA59ED9-F503-4A52-82DA-D69BBEAAF564}" type="pres">
-      <dgm:prSet presAssocID="{A9C2D848-281E-42B3-84EF-C2D5CFE7CF11}" presName="text4" presStyleLbl="fgAcc4" presStyleIdx="0" presStyleCnt="1">
-        <dgm:presLayoutVars>
-          <dgm:chPref val="3"/>
-        </dgm:presLayoutVars>
-      </dgm:prSet>
+    <dgm:pt modelId="{6E2EFEBF-C1AB-468A-B69E-A9A276A22E79}" type="pres">
+      <dgm:prSet presAssocID="{09A54D86-7716-42F8-9270-26C5A7FB1AB5}" presName="hierChild3" presStyleCnt="0"/>
+      <dgm:spPr/>
+    </dgm:pt>
+    <dgm:pt modelId="{F56E999E-66FD-4637-AD33-5AC8B79F1842}" type="pres">
+      <dgm:prSet presAssocID="{78BC4A45-6F56-4B87-AD3D-8766ED12A7E9}" presName="Name17" presStyleLbl="parChTrans1D3" presStyleIdx="0" presStyleCnt="2"/>
       <dgm:spPr/>
       <dgm:t>
         <a:bodyPr/>
@@ -7722,28 +8113,20 @@
         </a:p>
       </dgm:t>
     </dgm:pt>
-    <dgm:pt modelId="{889553DA-DBD6-4F6E-AD63-8C2DBAF05D8D}" type="pres">
-      <dgm:prSet presAssocID="{A9C2D848-281E-42B3-84EF-C2D5CFE7CF11}" presName="hierChild5" presStyleCnt="0"/>
-      <dgm:spPr/>
-    </dgm:pt>
-    <dgm:pt modelId="{5496AA36-6C29-4402-87AE-3BA3F7F7FB10}" type="pres">
-      <dgm:prSet presAssocID="{B01C31C9-35B1-41F1-BCF9-106809662280}" presName="Name10" presStyleLbl="parChTrans1D2" presStyleIdx="1" presStyleCnt="2"/>
-      <dgm:spPr/>
-    </dgm:pt>
-    <dgm:pt modelId="{58841F15-3EB7-41D3-9DF7-7216900091F0}" type="pres">
-      <dgm:prSet presAssocID="{138477FA-333B-4AB0-980B-48446CB1EFD2}" presName="hierRoot2" presStyleCnt="0"/>
-      <dgm:spPr/>
-    </dgm:pt>
-    <dgm:pt modelId="{D92DC0EA-997F-46D2-A194-A91315686FA1}" type="pres">
-      <dgm:prSet presAssocID="{138477FA-333B-4AB0-980B-48446CB1EFD2}" presName="composite2" presStyleCnt="0"/>
-      <dgm:spPr/>
-    </dgm:pt>
-    <dgm:pt modelId="{989D2EA1-9439-4DA1-8943-DD924ED047AB}" type="pres">
-      <dgm:prSet presAssocID="{138477FA-333B-4AB0-980B-48446CB1EFD2}" presName="background2" presStyleLbl="node2" presStyleIdx="1" presStyleCnt="2"/>
-      <dgm:spPr/>
-    </dgm:pt>
-    <dgm:pt modelId="{A16E1DCD-7FAB-448D-A679-39CB0A27E971}" type="pres">
-      <dgm:prSet presAssocID="{138477FA-333B-4AB0-980B-48446CB1EFD2}" presName="text2" presStyleLbl="fgAcc2" presStyleIdx="1" presStyleCnt="2">
+    <dgm:pt modelId="{B6638D92-2FBA-4C12-A490-4C9FCAE716A5}" type="pres">
+      <dgm:prSet presAssocID="{2F0FB5DE-5A9D-4D3D-A583-7FA014441C51}" presName="hierRoot3" presStyleCnt="0"/>
+      <dgm:spPr/>
+    </dgm:pt>
+    <dgm:pt modelId="{6FD56B1B-E08A-4ADC-AC54-FD7C3C4FEF16}" type="pres">
+      <dgm:prSet presAssocID="{2F0FB5DE-5A9D-4D3D-A583-7FA014441C51}" presName="composite3" presStyleCnt="0"/>
+      <dgm:spPr/>
+    </dgm:pt>
+    <dgm:pt modelId="{D903AFF5-E5F6-4466-924A-0B5E49DA2031}" type="pres">
+      <dgm:prSet presAssocID="{2F0FB5DE-5A9D-4D3D-A583-7FA014441C51}" presName="background3" presStyleLbl="node3" presStyleIdx="0" presStyleCnt="2"/>
+      <dgm:spPr/>
+    </dgm:pt>
+    <dgm:pt modelId="{23EF96DB-4BC4-4BFF-A0F6-595B9165E4CE}" type="pres">
+      <dgm:prSet presAssocID="{2F0FB5DE-5A9D-4D3D-A583-7FA014441C51}" presName="text3" presStyleLbl="fgAcc3" presStyleIdx="0" presStyleCnt="2">
         <dgm:presLayoutVars>
           <dgm:chPref val="3"/>
         </dgm:presLayoutVars>
@@ -7757,6 +8140,90 @@
         </a:p>
       </dgm:t>
     </dgm:pt>
+    <dgm:pt modelId="{F6DBD380-BAE3-4AE9-8336-45705DE240C3}" type="pres">
+      <dgm:prSet presAssocID="{2F0FB5DE-5A9D-4D3D-A583-7FA014441C51}" presName="hierChild4" presStyleCnt="0"/>
+      <dgm:spPr/>
+    </dgm:pt>
+    <dgm:pt modelId="{F9404CB4-28B5-4983-A516-3F7A94617B67}" type="pres">
+      <dgm:prSet presAssocID="{95EA9144-B8E2-463C-B4F4-77B55A351B27}" presName="Name23" presStyleLbl="parChTrans1D4" presStyleIdx="0" presStyleCnt="1"/>
+      <dgm:spPr/>
+      <dgm:t>
+        <a:bodyPr/>
+        <a:lstStyle/>
+        <a:p>
+          <a:endParaRPr lang="en-US"/>
+        </a:p>
+      </dgm:t>
+    </dgm:pt>
+    <dgm:pt modelId="{1B725075-70F9-4A0C-AC8F-4DB3427A3707}" type="pres">
+      <dgm:prSet presAssocID="{A9C2D848-281E-42B3-84EF-C2D5CFE7CF11}" presName="hierRoot4" presStyleCnt="0"/>
+      <dgm:spPr/>
+    </dgm:pt>
+    <dgm:pt modelId="{BBECFC40-0CF1-46A5-91DB-AEE8B855E0FA}" type="pres">
+      <dgm:prSet presAssocID="{A9C2D848-281E-42B3-84EF-C2D5CFE7CF11}" presName="composite4" presStyleCnt="0"/>
+      <dgm:spPr/>
+    </dgm:pt>
+    <dgm:pt modelId="{4F97DA0F-CA2C-4DFC-94D7-D273FB7AF9D3}" type="pres">
+      <dgm:prSet presAssocID="{A9C2D848-281E-42B3-84EF-C2D5CFE7CF11}" presName="background4" presStyleLbl="node4" presStyleIdx="0" presStyleCnt="1"/>
+      <dgm:spPr/>
+    </dgm:pt>
+    <dgm:pt modelId="{1DA59ED9-F503-4A52-82DA-D69BBEAAF564}" type="pres">
+      <dgm:prSet presAssocID="{A9C2D848-281E-42B3-84EF-C2D5CFE7CF11}" presName="text4" presStyleLbl="fgAcc4" presStyleIdx="0" presStyleCnt="1">
+        <dgm:presLayoutVars>
+          <dgm:chPref val="3"/>
+        </dgm:presLayoutVars>
+      </dgm:prSet>
+      <dgm:spPr/>
+      <dgm:t>
+        <a:bodyPr/>
+        <a:lstStyle/>
+        <a:p>
+          <a:endParaRPr lang="en-US"/>
+        </a:p>
+      </dgm:t>
+    </dgm:pt>
+    <dgm:pt modelId="{889553DA-DBD6-4F6E-AD63-8C2DBAF05D8D}" type="pres">
+      <dgm:prSet presAssocID="{A9C2D848-281E-42B3-84EF-C2D5CFE7CF11}" presName="hierChild5" presStyleCnt="0"/>
+      <dgm:spPr/>
+    </dgm:pt>
+    <dgm:pt modelId="{5496AA36-6C29-4402-87AE-3BA3F7F7FB10}" type="pres">
+      <dgm:prSet presAssocID="{B01C31C9-35B1-41F1-BCF9-106809662280}" presName="Name10" presStyleLbl="parChTrans1D2" presStyleIdx="1" presStyleCnt="2"/>
+      <dgm:spPr/>
+      <dgm:t>
+        <a:bodyPr/>
+        <a:lstStyle/>
+        <a:p>
+          <a:endParaRPr lang="en-US"/>
+        </a:p>
+      </dgm:t>
+    </dgm:pt>
+    <dgm:pt modelId="{58841F15-3EB7-41D3-9DF7-7216900091F0}" type="pres">
+      <dgm:prSet presAssocID="{138477FA-333B-4AB0-980B-48446CB1EFD2}" presName="hierRoot2" presStyleCnt="0"/>
+      <dgm:spPr/>
+    </dgm:pt>
+    <dgm:pt modelId="{D92DC0EA-997F-46D2-A194-A91315686FA1}" type="pres">
+      <dgm:prSet presAssocID="{138477FA-333B-4AB0-980B-48446CB1EFD2}" presName="composite2" presStyleCnt="0"/>
+      <dgm:spPr/>
+    </dgm:pt>
+    <dgm:pt modelId="{989D2EA1-9439-4DA1-8943-DD924ED047AB}" type="pres">
+      <dgm:prSet presAssocID="{138477FA-333B-4AB0-980B-48446CB1EFD2}" presName="background2" presStyleLbl="node2" presStyleIdx="1" presStyleCnt="2"/>
+      <dgm:spPr/>
+    </dgm:pt>
+    <dgm:pt modelId="{A16E1DCD-7FAB-448D-A679-39CB0A27E971}" type="pres">
+      <dgm:prSet presAssocID="{138477FA-333B-4AB0-980B-48446CB1EFD2}" presName="text2" presStyleLbl="fgAcc2" presStyleIdx="1" presStyleCnt="2">
+        <dgm:presLayoutVars>
+          <dgm:chPref val="3"/>
+        </dgm:presLayoutVars>
+      </dgm:prSet>
+      <dgm:spPr/>
+      <dgm:t>
+        <a:bodyPr/>
+        <a:lstStyle/>
+        <a:p>
+          <a:endParaRPr lang="en-US"/>
+        </a:p>
+      </dgm:t>
+    </dgm:pt>
     <dgm:pt modelId="{42307C8F-5818-451A-A249-204823F3327D}" type="pres">
       <dgm:prSet presAssocID="{138477FA-333B-4AB0-980B-48446CB1EFD2}" presName="hierChild3" presStyleCnt="0"/>
       <dgm:spPr/>
@@ -7764,6 +8231,13 @@
     <dgm:pt modelId="{D582469F-B300-4441-8B7A-811F2944BE7C}" type="pres">
       <dgm:prSet presAssocID="{B59F3437-6872-40D3-9770-9B57C873B960}" presName="Name17" presStyleLbl="parChTrans1D3" presStyleIdx="1" presStyleCnt="2"/>
       <dgm:spPr/>
+      <dgm:t>
+        <a:bodyPr/>
+        <a:lstStyle/>
+        <a:p>
+          <a:endParaRPr lang="en-US"/>
+        </a:p>
+      </dgm:t>
     </dgm:pt>
     <dgm:pt modelId="{137CD1A6-429F-4472-8075-2AAC931240C2}" type="pres">
       <dgm:prSet presAssocID="{2B827F71-BD4B-4C27-994F-A9FD012AAF72}" presName="hierRoot3" presStyleCnt="0"/>
@@ -7784,6 +8258,13 @@
         </dgm:presLayoutVars>
       </dgm:prSet>
       <dgm:spPr/>
+      <dgm:t>
+        <a:bodyPr/>
+        <a:lstStyle/>
+        <a:p>
+          <a:endParaRPr lang="en-US"/>
+        </a:p>
+      </dgm:t>
     </dgm:pt>
     <dgm:pt modelId="{41E9E1B3-C577-4E7F-86D7-C65D8EC836C8}" type="pres">
       <dgm:prSet presAssocID="{2B827F71-BD4B-4C27-994F-A9FD012AAF72}" presName="hierChild4" presStyleCnt="0"/>
@@ -7791,24 +8272,24 @@
     </dgm:pt>
   </dgm:ptLst>
   <dgm:cxnLst>
+    <dgm:cxn modelId="{44CF9609-7357-458E-993B-B90786F53DF8}" type="presOf" srcId="{2B827F71-BD4B-4C27-994F-A9FD012AAF72}" destId="{1BD4006F-235B-45D5-96E7-76BD89EC9013}" srcOrd="0" destOrd="0" presId="urn:microsoft.com/office/officeart/2005/8/layout/hierarchy1"/>
+    <dgm:cxn modelId="{B131B415-C377-499C-899D-1AB270CC6269}" srcId="{138477FA-333B-4AB0-980B-48446CB1EFD2}" destId="{2B827F71-BD4B-4C27-994F-A9FD012AAF72}" srcOrd="0" destOrd="0" parTransId="{B59F3437-6872-40D3-9770-9B57C873B960}" sibTransId="{0866DAB3-A626-4CA3-A6C2-FAE162BE0ABC}"/>
     <dgm:cxn modelId="{B1B38C92-BD8A-499B-86C3-B3CE4DAA9765}" srcId="{BEAA0A0E-16F1-46B3-BD98-AE1752A63BC9}" destId="{9D2A9343-514F-42AD-8709-9CF866F8BCB7}" srcOrd="0" destOrd="0" parTransId="{96054D28-CADE-4A78-B891-56F3D6FFCF15}" sibTransId="{8C62D617-D94B-4FDA-93A5-DCA7BD708CC5}"/>
     <dgm:cxn modelId="{D9BCA4F9-EFA3-456D-88DD-04643036E848}" type="presOf" srcId="{95EA9144-B8E2-463C-B4F4-77B55A351B27}" destId="{F9404CB4-28B5-4983-A516-3F7A94617B67}" srcOrd="0" destOrd="0" presId="urn:microsoft.com/office/officeart/2005/8/layout/hierarchy1"/>
     <dgm:cxn modelId="{4C5C38E1-C3DF-4DB8-B1EB-97CD3699BF19}" type="presOf" srcId="{2F0FB5DE-5A9D-4D3D-A583-7FA014441C51}" destId="{23EF96DB-4BC4-4BFF-A0F6-595B9165E4CE}" srcOrd="0" destOrd="0" presId="urn:microsoft.com/office/officeart/2005/8/layout/hierarchy1"/>
+    <dgm:cxn modelId="{A06B2A7C-1E89-40A2-9916-3E3EF92571B0}" type="presOf" srcId="{2943FB02-01BF-4826-82C4-C47541C199F8}" destId="{C18B3AE3-C56B-4C46-B2FE-8FC0FF516083}" srcOrd="0" destOrd="0" presId="urn:microsoft.com/office/officeart/2005/8/layout/hierarchy1"/>
+    <dgm:cxn modelId="{6B6B19B4-F507-4136-9DD9-8086B996F430}" srcId="{09A54D86-7716-42F8-9270-26C5A7FB1AB5}" destId="{2F0FB5DE-5A9D-4D3D-A583-7FA014441C51}" srcOrd="0" destOrd="0" parTransId="{78BC4A45-6F56-4B87-AD3D-8766ED12A7E9}" sibTransId="{ABC218F2-924F-48AC-A41C-EDBE8497CEFA}"/>
+    <dgm:cxn modelId="{1E711AA0-877B-4DF1-A450-0ED3E8C42AEB}" type="presOf" srcId="{BEAA0A0E-16F1-46B3-BD98-AE1752A63BC9}" destId="{62D23EA1-F578-4E79-8C47-28F032438B69}" srcOrd="0" destOrd="0" presId="urn:microsoft.com/office/officeart/2005/8/layout/hierarchy1"/>
+    <dgm:cxn modelId="{8482B5AB-4E07-4A81-8359-81476D8A7FE1}" type="presOf" srcId="{B01C31C9-35B1-41F1-BCF9-106809662280}" destId="{5496AA36-6C29-4402-87AE-3BA3F7F7FB10}" srcOrd="0" destOrd="0" presId="urn:microsoft.com/office/officeart/2005/8/layout/hierarchy1"/>
+    <dgm:cxn modelId="{FB28B352-C757-4638-BA26-893AA03887A8}" type="presOf" srcId="{138477FA-333B-4AB0-980B-48446CB1EFD2}" destId="{A16E1DCD-7FAB-448D-A679-39CB0A27E971}" srcOrd="0" destOrd="0" presId="urn:microsoft.com/office/officeart/2005/8/layout/hierarchy1"/>
+    <dgm:cxn modelId="{93151928-C641-448D-AB2D-314256462064}" srcId="{9D2A9343-514F-42AD-8709-9CF866F8BCB7}" destId="{138477FA-333B-4AB0-980B-48446CB1EFD2}" srcOrd="1" destOrd="0" parTransId="{B01C31C9-35B1-41F1-BCF9-106809662280}" sibTransId="{76334B11-A645-44C1-91E5-27DFE3A69752}"/>
     <dgm:cxn modelId="{C35DF5F8-B79E-4D9A-9EF7-BC06F64C2976}" type="presOf" srcId="{B59F3437-6872-40D3-9770-9B57C873B960}" destId="{D582469F-B300-4441-8B7A-811F2944BE7C}" srcOrd="0" destOrd="0" presId="urn:microsoft.com/office/officeart/2005/8/layout/hierarchy1"/>
+    <dgm:cxn modelId="{5E7D29A7-14DA-496D-B5DA-CAFA7C94FB8D}" srcId="{9D2A9343-514F-42AD-8709-9CF866F8BCB7}" destId="{09A54D86-7716-42F8-9270-26C5A7FB1AB5}" srcOrd="0" destOrd="0" parTransId="{2943FB02-01BF-4826-82C4-C47541C199F8}" sibTransId="{14552CD9-63B0-4C89-8D4C-6E71B622B796}"/>
+    <dgm:cxn modelId="{EC650186-E44C-4A8F-AED1-D88B62A48988}" type="presOf" srcId="{A9C2D848-281E-42B3-84EF-C2D5CFE7CF11}" destId="{1DA59ED9-F503-4A52-82DA-D69BBEAAF564}" srcOrd="0" destOrd="0" presId="urn:microsoft.com/office/officeart/2005/8/layout/hierarchy1"/>
+    <dgm:cxn modelId="{974F73E1-A0BF-4B43-8FD8-B5CDFF47A13B}" type="presOf" srcId="{78BC4A45-6F56-4B87-AD3D-8766ED12A7E9}" destId="{F56E999E-66FD-4637-AD33-5AC8B79F1842}" srcOrd="0" destOrd="0" presId="urn:microsoft.com/office/officeart/2005/8/layout/hierarchy1"/>
+    <dgm:cxn modelId="{61CBF262-1701-4942-8215-72BAECA4F836}" srcId="{2F0FB5DE-5A9D-4D3D-A583-7FA014441C51}" destId="{A9C2D848-281E-42B3-84EF-C2D5CFE7CF11}" srcOrd="0" destOrd="0" parTransId="{95EA9144-B8E2-463C-B4F4-77B55A351B27}" sibTransId="{A3039733-AC89-4195-BC42-F5D851217324}"/>
     <dgm:cxn modelId="{2B228472-07E9-4078-A79E-7EA8DF5711A5}" type="presOf" srcId="{09A54D86-7716-42F8-9270-26C5A7FB1AB5}" destId="{6E6EC764-966F-4CBB-8AD4-11EFBFEC79FB}" srcOrd="0" destOrd="0" presId="urn:microsoft.com/office/officeart/2005/8/layout/hierarchy1"/>
-    <dgm:cxn modelId="{5E7D29A7-14DA-496D-B5DA-CAFA7C94FB8D}" srcId="{9D2A9343-514F-42AD-8709-9CF866F8BCB7}" destId="{09A54D86-7716-42F8-9270-26C5A7FB1AB5}" srcOrd="0" destOrd="0" parTransId="{2943FB02-01BF-4826-82C4-C47541C199F8}" sibTransId="{14552CD9-63B0-4C89-8D4C-6E71B622B796}"/>
-    <dgm:cxn modelId="{44CF9609-7357-458E-993B-B90786F53DF8}" type="presOf" srcId="{2B827F71-BD4B-4C27-994F-A9FD012AAF72}" destId="{1BD4006F-235B-45D5-96E7-76BD89EC9013}" srcOrd="0" destOrd="0" presId="urn:microsoft.com/office/officeart/2005/8/layout/hierarchy1"/>
-    <dgm:cxn modelId="{1E711AA0-877B-4DF1-A450-0ED3E8C42AEB}" type="presOf" srcId="{BEAA0A0E-16F1-46B3-BD98-AE1752A63BC9}" destId="{62D23EA1-F578-4E79-8C47-28F032438B69}" srcOrd="0" destOrd="0" presId="urn:microsoft.com/office/officeart/2005/8/layout/hierarchy1"/>
     <dgm:cxn modelId="{C30E85CA-D78F-4348-B31D-21CB587141E2}" type="presOf" srcId="{9D2A9343-514F-42AD-8709-9CF866F8BCB7}" destId="{1BED93CD-BA7B-4499-826C-20AE6140A068}" srcOrd="0" destOrd="0" presId="urn:microsoft.com/office/officeart/2005/8/layout/hierarchy1"/>
-    <dgm:cxn modelId="{FB28B352-C757-4638-BA26-893AA03887A8}" type="presOf" srcId="{138477FA-333B-4AB0-980B-48446CB1EFD2}" destId="{A16E1DCD-7FAB-448D-A679-39CB0A27E971}" srcOrd="0" destOrd="0" presId="urn:microsoft.com/office/officeart/2005/8/layout/hierarchy1"/>
-    <dgm:cxn modelId="{8482B5AB-4E07-4A81-8359-81476D8A7FE1}" type="presOf" srcId="{B01C31C9-35B1-41F1-BCF9-106809662280}" destId="{5496AA36-6C29-4402-87AE-3BA3F7F7FB10}" srcOrd="0" destOrd="0" presId="urn:microsoft.com/office/officeart/2005/8/layout/hierarchy1"/>
-    <dgm:cxn modelId="{A06B2A7C-1E89-40A2-9916-3E3EF92571B0}" type="presOf" srcId="{2943FB02-01BF-4826-82C4-C47541C199F8}" destId="{C18B3AE3-C56B-4C46-B2FE-8FC0FF516083}" srcOrd="0" destOrd="0" presId="urn:microsoft.com/office/officeart/2005/8/layout/hierarchy1"/>
-    <dgm:cxn modelId="{974F73E1-A0BF-4B43-8FD8-B5CDFF47A13B}" type="presOf" srcId="{78BC4A45-6F56-4B87-AD3D-8766ED12A7E9}" destId="{F56E999E-66FD-4637-AD33-5AC8B79F1842}" srcOrd="0" destOrd="0" presId="urn:microsoft.com/office/officeart/2005/8/layout/hierarchy1"/>
-    <dgm:cxn modelId="{EC650186-E44C-4A8F-AED1-D88B62A48988}" type="presOf" srcId="{A9C2D848-281E-42B3-84EF-C2D5CFE7CF11}" destId="{1DA59ED9-F503-4A52-82DA-D69BBEAAF564}" srcOrd="0" destOrd="0" presId="urn:microsoft.com/office/officeart/2005/8/layout/hierarchy1"/>
-    <dgm:cxn modelId="{6B6B19B4-F507-4136-9DD9-8086B996F430}" srcId="{09A54D86-7716-42F8-9270-26C5A7FB1AB5}" destId="{2F0FB5DE-5A9D-4D3D-A583-7FA014441C51}" srcOrd="0" destOrd="0" parTransId="{78BC4A45-6F56-4B87-AD3D-8766ED12A7E9}" sibTransId="{ABC218F2-924F-48AC-A41C-EDBE8497CEFA}"/>
-    <dgm:cxn modelId="{93151928-C641-448D-AB2D-314256462064}" srcId="{9D2A9343-514F-42AD-8709-9CF866F8BCB7}" destId="{138477FA-333B-4AB0-980B-48446CB1EFD2}" srcOrd="1" destOrd="0" parTransId="{B01C31C9-35B1-41F1-BCF9-106809662280}" sibTransId="{76334B11-A645-44C1-91E5-27DFE3A69752}"/>
-    <dgm:cxn modelId="{61CBF262-1701-4942-8215-72BAECA4F836}" srcId="{2F0FB5DE-5A9D-4D3D-A583-7FA014441C51}" destId="{A9C2D848-281E-42B3-84EF-C2D5CFE7CF11}" srcOrd="0" destOrd="0" parTransId="{95EA9144-B8E2-463C-B4F4-77B55A351B27}" sibTransId="{A3039733-AC89-4195-BC42-F5D851217324}"/>
-    <dgm:cxn modelId="{B131B415-C377-499C-899D-1AB270CC6269}" srcId="{138477FA-333B-4AB0-980B-48446CB1EFD2}" destId="{2B827F71-BD4B-4C27-994F-A9FD012AAF72}" srcOrd="0" destOrd="0" parTransId="{B59F3437-6872-40D3-9770-9B57C873B960}" sibTransId="{0866DAB3-A626-4CA3-A6C2-FAE162BE0ABC}"/>
     <dgm:cxn modelId="{6A219AFE-7D84-4126-A1A8-AA3C4FF4D79B}" type="presParOf" srcId="{62D23EA1-F578-4E79-8C47-28F032438B69}" destId="{2A2D0A1F-DF5B-4D62-8359-75FED3464955}" srcOrd="0" destOrd="0" presId="urn:microsoft.com/office/officeart/2005/8/layout/hierarchy1"/>
     <dgm:cxn modelId="{D506CE78-3872-46F7-B5BB-8F16E42B3438}" type="presParOf" srcId="{2A2D0A1F-DF5B-4D62-8359-75FED3464955}" destId="{67DE11BD-B662-4088-8777-35F65D0117A2}" srcOrd="0" destOrd="0" presId="urn:microsoft.com/office/officeart/2005/8/layout/hierarchy1"/>
     <dgm:cxn modelId="{573962E7-D3A7-47A7-A266-05B32738D693}" type="presParOf" srcId="{67DE11BD-B662-4088-8777-35F65D0117A2}" destId="{E9198AC2-9187-42A7-8316-2334E731B4D9}" srcOrd="0" destOrd="0" presId="urn:microsoft.com/office/officeart/2005/8/layout/hierarchy1"/>
@@ -30934,15 +31415,19 @@
           <a:p>
             <a:r>
               <a:rPr lang="en-US" dirty="0" smtClean="0"/>
-              <a:t>What’s an Information </a:t>
-            </a:r>
-            <a:r>
-              <a:rPr lang="en-US" dirty="0" err="1" smtClean="0"/>
-              <a:t>Retrival</a:t>
+              <a:t>What is </a:t>
             </a:r>
             <a:r>
               <a:rPr lang="en-US" dirty="0" smtClean="0"/>
-              <a:t> System?</a:t>
+              <a:t>an Information </a:t>
+            </a:r>
+            <a:r>
+              <a:rPr lang="en-US" dirty="0" smtClean="0"/>
+              <a:t>Retrieval </a:t>
+            </a:r>
+            <a:r>
+              <a:rPr lang="en-US" dirty="0" smtClean="0"/>
+              <a:t>System?</a:t>
             </a:r>
             <a:endParaRPr lang="en-US" dirty="0"/>
           </a:p>
@@ -32145,7 +32630,6 @@
               <a:rPr lang="en-US" dirty="0"/>
               <a:t>2</a:t>
             </a:r>
-            <a:endParaRPr lang="en-US" dirty="0"/>
           </a:p>
         </p:txBody>
       </p:sp>
@@ -33593,7 +34077,6 @@
                   <a:rPr lang="en-US" dirty="0"/>
                   <a:t>2</a:t>
                 </a:r>
-                <a:endParaRPr lang="en-US" dirty="0"/>
               </a:p>
             </p:txBody>
           </p:sp>
@@ -33693,7 +34176,6 @@
                 <a:rPr lang="en-US" dirty="0"/>
                 <a:t>3</a:t>
               </a:r>
-              <a:endParaRPr lang="en-US" dirty="0"/>
             </a:p>
           </p:txBody>
         </p:sp>
@@ -33723,7 +34205,6 @@
                 <a:rPr lang="en-US" dirty="0"/>
                 <a:t>2</a:t>
               </a:r>
-              <a:endParaRPr lang="en-US" dirty="0"/>
             </a:p>
           </p:txBody>
         </p:sp>
@@ -33753,7 +34234,6 @@
                 <a:rPr lang="en-US" dirty="0"/>
                 <a:t>2</a:t>
               </a:r>
-              <a:endParaRPr lang="en-US" dirty="0"/>
             </a:p>
           </p:txBody>
         </p:sp>
@@ -34035,9 +34515,6 @@
                     <p:cTn id="3" fill="hold">
                       <p:stCondLst>
                         <p:cond delay="indefinite"/>
-                        <p:cond evt="onBegin" delay="0">
-                          <p:tn val="2"/>
-                        </p:cond>
                       </p:stCondLst>
                       <p:childTnLst>
                         <p:par>
@@ -34047,7 +34524,7 @@
                             </p:stCondLst>
                             <p:childTnLst>
                               <p:par>
-                                <p:cTn id="5" presetID="1" presetClass="entr" presetSubtype="0" fill="hold" grpId="0" nodeType="withEffect">
+                                <p:cTn id="5" presetID="1" presetClass="entr" presetSubtype="0" fill="hold" nodeType="clickEffect">
                                   <p:stCondLst>
                                     <p:cond delay="0"/>
                                   </p:stCondLst>
@@ -34060,7 +34537,7 @@
                                           </p:stCondLst>
                                         </p:cTn>
                                         <p:tgtEl>
-                                          <p:spTgt spid="36"/>
+                                          <p:spTgt spid="28"/>
                                         </p:tgtEl>
                                         <p:attrNameLst>
                                           <p:attrName>style.visibility</p:attrName>
@@ -34087,61 +34564,7 @@
                                           </p:stCondLst>
                                         </p:cTn>
                                         <p:tgtEl>
-                                          <p:spTgt spid="37"/>
-                                        </p:tgtEl>
-                                        <p:attrNameLst>
-                                          <p:attrName>style.visibility</p:attrName>
-                                        </p:attrNameLst>
-                                      </p:cBhvr>
-                                      <p:to>
-                                        <p:strVal val="visible"/>
-                                      </p:to>
-                                    </p:set>
-                                  </p:childTnLst>
-                                </p:cTn>
-                              </p:par>
-                              <p:par>
-                                <p:cTn id="9" presetID="1" presetClass="entr" presetSubtype="0" fill="hold" grpId="0" nodeType="withEffect">
-                                  <p:stCondLst>
-                                    <p:cond delay="0"/>
-                                  </p:stCondLst>
-                                  <p:childTnLst>
-                                    <p:set>
-                                      <p:cBhvr>
-                                        <p:cTn id="10" dur="1" fill="hold">
-                                          <p:stCondLst>
-                                            <p:cond delay="0"/>
-                                          </p:stCondLst>
-                                        </p:cTn>
-                                        <p:tgtEl>
-                                          <p:spTgt spid="38"/>
-                                        </p:tgtEl>
-                                        <p:attrNameLst>
-                                          <p:attrName>style.visibility</p:attrName>
-                                        </p:attrNameLst>
-                                      </p:cBhvr>
-                                      <p:to>
-                                        <p:strVal val="visible"/>
-                                      </p:to>
-                                    </p:set>
-                                  </p:childTnLst>
-                                </p:cTn>
-                              </p:par>
-                              <p:par>
-                                <p:cTn id="11" presetID="1" presetClass="entr" presetSubtype="0" fill="hold" grpId="0" nodeType="withEffect">
-                                  <p:stCondLst>
-                                    <p:cond delay="0"/>
-                                  </p:stCondLst>
-                                  <p:childTnLst>
-                                    <p:set>
-                                      <p:cBhvr>
-                                        <p:cTn id="12" dur="1" fill="hold">
-                                          <p:stCondLst>
-                                            <p:cond delay="0"/>
-                                          </p:stCondLst>
-                                        </p:cTn>
-                                        <p:tgtEl>
-                                          <p:spTgt spid="39"/>
+                                          <p:spTgt spid="19"/>
                                         </p:tgtEl>
                                         <p:attrNameLst>
                                           <p:attrName>style.visibility</p:attrName>
@@ -34182,10 +34605,9 @@
       </p:par>
     </p:tnLst>
     <p:bldLst>
-      <p:bldP spid="36" grpId="0"/>
-      <p:bldP spid="37" grpId="0"/>
-      <p:bldP spid="38" grpId="0"/>
-      <p:bldP spid="39" grpId="0"/>
+      <p:bldGraphic spid="19" grpId="0">
+        <p:bldAsOne/>
+      </p:bldGraphic>
     </p:bldLst>
   </p:timing>
 </p:sld>

</xml_diff>